<commit_message>
Atualiza slides Web Services
</commit_message>
<xml_diff>
--- a/projects/08-webservices/webservices.pptx
+++ b/projects/08-webservices/webservices.pptx
@@ -15047,7 +15047,14 @@
             </a:pPr>
             <a:r>
               <a:rPr lang="pt-BR" sz="2400" dirty="0"/>
-              <a:t>Exemplo de envio de requisição SOAP sobre HTTP: cabeçalho HTTP e envelope (mensagem) SOAP</a:t>
+              <a:t>Exemplo de envio de requisição SOAP sobre HTTP: </a:t>
+            </a:r>
+            <a:br>
+              <a:rPr lang="pt-BR" sz="2400" dirty="0"/>
+            </a:br>
+            <a:r>
+              <a:rPr lang="pt-BR" sz="2400" dirty="0"/>
+              <a:t>cabeçalho HTTP e envelope (mensagem) SOAP</a:t>
             </a:r>
           </a:p>
         </p:txBody>
@@ -15263,11 +15270,97 @@
           <a:p>
             <a:r>
               <a:rPr lang="en-US" dirty="0"/>
-              <a:t>      &lt;</a:t>
+              <a:t>      </a:t>
+            </a:r>
+            <a:r>
+              <a:rPr lang="en-US" dirty="0">
+                <a:solidFill>
+                  <a:schemeClr val="accent6"/>
+                </a:solidFill>
+              </a:rPr>
+              <a:t>&lt;</a:t>
+            </a:r>
+            <a:r>
+              <a:rPr lang="en-US" dirty="0" err="1">
+                <a:solidFill>
+                  <a:schemeClr val="accent6"/>
+                </a:solidFill>
+              </a:rPr>
+              <a:t>consultaCEP</a:t>
+            </a:r>
+            <a:r>
+              <a:rPr lang="en-US" dirty="0">
+                <a:solidFill>
+                  <a:schemeClr val="accent6"/>
+                </a:solidFill>
+              </a:rPr>
+              <a:t>&gt;</a:t>
+            </a:r>
+          </a:p>
+          <a:p>
+            <a:r>
+              <a:rPr lang="en-US" dirty="0"/>
+              <a:t>         </a:t>
+            </a:r>
+            <a:r>
+              <a:rPr lang="en-US" dirty="0">
+                <a:solidFill>
+                  <a:schemeClr val="accent6"/>
+                </a:solidFill>
+              </a:rPr>
+              <a:t>&lt;cep&gt;</a:t>
+            </a:r>
+            <a:r>
+              <a:rPr lang="en-US" b="1" dirty="0"/>
+              <a:t>77.021-090</a:t>
+            </a:r>
+            <a:r>
+              <a:rPr lang="en-US" dirty="0">
+                <a:solidFill>
+                  <a:schemeClr val="accent6"/>
+                </a:solidFill>
+              </a:rPr>
+              <a:t>&lt;/cep&gt;</a:t>
+            </a:r>
+          </a:p>
+          <a:p>
+            <a:r>
+              <a:rPr lang="en-US" dirty="0"/>
+              <a:t>      </a:t>
+            </a:r>
+            <a:r>
+              <a:rPr lang="en-US" dirty="0">
+                <a:solidFill>
+                  <a:schemeClr val="accent6"/>
+                </a:solidFill>
+              </a:rPr>
+              <a:t>&lt;/</a:t>
+            </a:r>
+            <a:r>
+              <a:rPr lang="en-US" dirty="0" err="1">
+                <a:solidFill>
+                  <a:schemeClr val="accent6"/>
+                </a:solidFill>
+              </a:rPr>
+              <a:t>consultaCEP</a:t>
+            </a:r>
+            <a:r>
+              <a:rPr lang="en-US" dirty="0">
+                <a:solidFill>
+                  <a:schemeClr val="accent6"/>
+                </a:solidFill>
+              </a:rPr>
+              <a:t>&gt;</a:t>
+            </a:r>
+          </a:p>
+          <a:p>
+            <a:r>
+              <a:rPr lang="en-US" dirty="0"/>
+              <a:t>   &lt;/</a:t>
             </a:r>
             <a:r>
               <a:rPr lang="en-US" dirty="0" err="1"/>
-              <a:t>cli:consultaCEP</a:t>
+              <a:t>soapenv:Body</a:t>
             </a:r>
             <a:r>
               <a:rPr lang="en-US" dirty="0"/>
@@ -15277,51 +15370,70 @@
           <a:p>
             <a:r>
               <a:rPr lang="en-US" dirty="0"/>
-              <a:t>         &lt;cep&gt;77.021-090&lt;/cep&gt;</a:t>
-            </a:r>
-          </a:p>
-          <a:p>
-            <a:r>
-              <a:rPr lang="en-US" dirty="0"/>
-              <a:t>      &lt;/</a:t>
+              <a:t>&lt;/</a:t>
             </a:r>
             <a:r>
               <a:rPr lang="en-US" dirty="0" err="1"/>
-              <a:t>cli:consultaCEP</a:t>
+              <a:t>soapenv:Envelope</a:t>
             </a:r>
             <a:r>
               <a:rPr lang="en-US" dirty="0"/>
               <a:t>&gt;</a:t>
             </a:r>
-          </a:p>
-          <a:p>
+            <a:endParaRPr lang="pt-BR" i="1" dirty="0"/>
+          </a:p>
+        </p:txBody>
+      </p:sp>
+      <p:sp>
+        <p:nvSpPr>
+          <p:cNvPr id="5" name="TextBox 4">
+            <a:extLst>
+              <a:ext uri="{FF2B5EF4-FFF2-40B4-BE49-F238E27FC236}">
+                <a16:creationId xmlns:a16="http://schemas.microsoft.com/office/drawing/2014/main" id="{E3850DF9-7A4B-E148-B81C-A28CAD2B448E}"/>
+              </a:ext>
+            </a:extLst>
+          </p:cNvPr>
+          <p:cNvSpPr txBox="1"/>
+          <p:nvPr/>
+        </p:nvSpPr>
+        <p:spPr>
+          <a:xfrm>
+            <a:off x="566638" y="6130978"/>
+            <a:ext cx="10937973" cy="369332"/>
+          </a:xfrm>
+          <a:prstGeom prst="rect">
+            <a:avLst/>
+          </a:prstGeom>
+          <a:noFill/>
+        </p:spPr>
+        <p:txBody>
+          <a:bodyPr wrap="square" rtlCol="0">
+            <a:spAutoFit/>
+          </a:bodyPr>
+          <a:lstStyle/>
+          <a:p>
+            <a:pPr algn="ctr"/>
+            <a:r>
+              <a:rPr lang="pt-BR" dirty="0"/>
+              <a:t>Baixe um script para testar o envio de requisições HTTP para tal WS em </a:t>
+            </a:r>
             <a:r>
               <a:rPr lang="en-US" dirty="0"/>
-              <a:t>   &lt;/</a:t>
+              <a:t>https://</a:t>
             </a:r>
             <a:r>
               <a:rPr lang="en-US" dirty="0" err="1"/>
-              <a:t>soapenv:Body</a:t>
+              <a:t>goo.gl</a:t>
             </a:r>
             <a:r>
               <a:rPr lang="en-US" dirty="0"/>
-              <a:t>&gt;</a:t>
-            </a:r>
-          </a:p>
-          <a:p>
-            <a:r>
-              <a:rPr lang="en-US" dirty="0"/>
-              <a:t>&lt;/</a:t>
+              <a:t>/</a:t>
             </a:r>
             <a:r>
               <a:rPr lang="en-US" dirty="0" err="1"/>
-              <a:t>soapenv:Envelope</a:t>
-            </a:r>
-            <a:r>
-              <a:rPr lang="en-US" dirty="0"/>
-              <a:t>&gt;</a:t>
-            </a:r>
-            <a:endParaRPr lang="pt-BR" i="1" dirty="0"/>
+              <a:t>TBKeLq</a:t>
+            </a:r>
+            <a:endParaRPr lang="pt-BR" dirty="0"/>
           </a:p>
         </p:txBody>
       </p:sp>
@@ -15399,7 +15511,7 @@
                                 </p:cTn>
                               </p:par>
                               <p:par>
-                                <p:cTn id="8" presetID="42" presetClass="entr" presetSubtype="0" fill="hold" grpId="0" nodeType="withEffect">
+                                <p:cTn id="8" presetID="2" presetClass="entr" presetSubtype="8" fill="hold" grpId="0" nodeType="withEffect">
                                   <p:stCondLst>
                                     <p:cond delay="0"/>
                                   </p:stCondLst>
@@ -15422,17 +15534,9 @@
                                         <p:strVal val="visible"/>
                                       </p:to>
                                     </p:set>
-                                    <p:animEffect transition="in" filter="fade">
-                                      <p:cBhvr>
-                                        <p:cTn id="10" dur="1000"/>
-                                        <p:tgtEl>
-                                          <p:spTgt spid="2"/>
-                                        </p:tgtEl>
-                                      </p:cBhvr>
-                                    </p:animEffect>
                                     <p:anim calcmode="lin" valueType="num">
-                                      <p:cBhvr>
-                                        <p:cTn id="11" dur="1000" fill="hold"/>
+                                      <p:cBhvr additive="base">
+                                        <p:cTn id="10" dur="500" fill="hold"/>
                                         <p:tgtEl>
                                           <p:spTgt spid="2"/>
                                         </p:tgtEl>
@@ -15443,7 +15547,7 @@
                                       <p:tavLst>
                                         <p:tav tm="0">
                                           <p:val>
-                                            <p:strVal val="#ppt_x"/>
+                                            <p:strVal val="0-#ppt_w/2"/>
                                           </p:val>
                                         </p:tav>
                                         <p:tav tm="100000">
@@ -15454,8 +15558,8 @@
                                       </p:tavLst>
                                     </p:anim>
                                     <p:anim calcmode="lin" valueType="num">
-                                      <p:cBhvr>
-                                        <p:cTn id="12" dur="1000" fill="hold"/>
+                                      <p:cBhvr additive="base">
+                                        <p:cTn id="11" dur="500" fill="hold"/>
                                         <p:tgtEl>
                                           <p:spTgt spid="2"/>
                                         </p:tgtEl>
@@ -15466,7 +15570,7 @@
                                       <p:tavLst>
                                         <p:tav tm="0">
                                           <p:val>
-                                            <p:strVal val="#ppt_y+.1"/>
+                                            <p:strVal val="#ppt_y"/>
                                           </p:val>
                                         </p:tav>
                                         <p:tav tm="100000">
@@ -15476,6 +15580,42 @@
                                         </p:tav>
                                       </p:tavLst>
                                     </p:anim>
+                                  </p:childTnLst>
+                                </p:cTn>
+                              </p:par>
+                            </p:childTnLst>
+                          </p:cTn>
+                        </p:par>
+                        <p:par>
+                          <p:cTn id="12" fill="hold">
+                            <p:stCondLst>
+                              <p:cond delay="500"/>
+                            </p:stCondLst>
+                            <p:childTnLst>
+                              <p:par>
+                                <p:cTn id="13" presetID="1" presetClass="entr" presetSubtype="0" fill="hold" grpId="1" nodeType="afterEffect">
+                                  <p:stCondLst>
+                                    <p:cond delay="500"/>
+                                  </p:stCondLst>
+                                  <p:childTnLst>
+                                    <p:set>
+                                      <p:cBhvr>
+                                        <p:cTn id="14" dur="1" fill="hold">
+                                          <p:stCondLst>
+                                            <p:cond delay="0"/>
+                                          </p:stCondLst>
+                                        </p:cTn>
+                                        <p:tgtEl>
+                                          <p:spTgt spid="5"/>
+                                        </p:tgtEl>
+                                        <p:attrNameLst>
+                                          <p:attrName>style.visibility</p:attrName>
+                                        </p:attrNameLst>
+                                      </p:cBhvr>
+                                      <p:to>
+                                        <p:strVal val="visible"/>
+                                      </p:to>
+                                    </p:set>
                                   </p:childTnLst>
                                 </p:cTn>
                               </p:par>
@@ -15509,6 +15649,7 @@
     <p:bldLst>
       <p:bldP spid="3" grpId="0" uiExpand="1" build="p"/>
       <p:bldP spid="2" grpId="0" animBg="1"/>
+      <p:bldP spid="5" grpId="1"/>
     </p:bldLst>
   </p:timing>
 </p:sld>
@@ -15654,7 +15795,7 @@
         <p:spPr>
           <a:xfrm>
             <a:off x="566638" y="2229683"/>
-            <a:ext cx="11139588" cy="3970318"/>
+            <a:ext cx="11139588" cy="3693319"/>
           </a:xfrm>
           <a:prstGeom prst="rect">
             <a:avLst/>
@@ -15732,105 +15873,263 @@
           <a:p>
             <a:r>
               <a:rPr lang="en-US" dirty="0"/>
-              <a:t>         &lt;return&gt;</a:t>
+              <a:t>         </a:t>
+            </a:r>
+            <a:r>
+              <a:rPr lang="en-US" dirty="0">
+                <a:solidFill>
+                  <a:schemeClr val="accent6"/>
+                </a:solidFill>
+              </a:rPr>
+              <a:t>&lt;return&gt;</a:t>
             </a:r>
           </a:p>
           <a:p>
             <a:r>
               <a:rPr lang="en-US" dirty="0"/>
-              <a:t>            &lt;</a:t>
-            </a:r>
-            <a:r>
-              <a:rPr lang="en-US" dirty="0" err="1"/>
+              <a:t>            </a:t>
+            </a:r>
+            <a:r>
+              <a:rPr lang="en-US" dirty="0">
+                <a:solidFill>
+                  <a:schemeClr val="accent6"/>
+                </a:solidFill>
+              </a:rPr>
+              <a:t>&lt;</a:t>
+            </a:r>
+            <a:r>
+              <a:rPr lang="en-US" dirty="0" err="1">
+                <a:solidFill>
+                  <a:schemeClr val="accent6"/>
+                </a:solidFill>
+              </a:rPr>
               <a:t>bairro</a:t>
             </a:r>
             <a:r>
+              <a:rPr lang="en-US" dirty="0">
+                <a:solidFill>
+                  <a:schemeClr val="accent6"/>
+                </a:solidFill>
+              </a:rPr>
+              <a:t>&gt;</a:t>
+            </a:r>
+            <a:r>
+              <a:rPr lang="en-US" b="1" dirty="0"/>
+              <a:t>Plano </a:t>
+            </a:r>
+            <a:r>
+              <a:rPr lang="en-US" b="1" dirty="0" err="1"/>
+              <a:t>Diretor</a:t>
+            </a:r>
+            <a:r>
+              <a:rPr lang="en-US" b="1" dirty="0"/>
+              <a:t> Sul</a:t>
+            </a:r>
+            <a:r>
+              <a:rPr lang="en-US" dirty="0">
+                <a:solidFill>
+                  <a:schemeClr val="accent6"/>
+                </a:solidFill>
+              </a:rPr>
+              <a:t>&lt;/</a:t>
+            </a:r>
+            <a:r>
+              <a:rPr lang="en-US" dirty="0" err="1">
+                <a:solidFill>
+                  <a:schemeClr val="accent6"/>
+                </a:solidFill>
+              </a:rPr>
+              <a:t>bairro</a:t>
+            </a:r>
+            <a:r>
+              <a:rPr lang="en-US" dirty="0">
+                <a:solidFill>
+                  <a:schemeClr val="accent6"/>
+                </a:solidFill>
+              </a:rPr>
+              <a:t>&gt;</a:t>
+            </a:r>
+          </a:p>
+          <a:p>
+            <a:r>
               <a:rPr lang="en-US" dirty="0"/>
-              <a:t>&gt;Plano </a:t>
-            </a:r>
-            <a:r>
-              <a:rPr lang="en-US" dirty="0" err="1"/>
-              <a:t>Diretor</a:t>
-            </a:r>
+              <a:t>            </a:t>
+            </a:r>
+            <a:r>
+              <a:rPr lang="en-US" dirty="0">
+                <a:solidFill>
+                  <a:schemeClr val="accent6"/>
+                </a:solidFill>
+              </a:rPr>
+              <a:t>&lt;cep&gt;</a:t>
+            </a:r>
+            <a:r>
+              <a:rPr lang="en-US" b="1" dirty="0"/>
+              <a:t>77021090</a:t>
+            </a:r>
+            <a:r>
+              <a:rPr lang="en-US" dirty="0">
+                <a:solidFill>
+                  <a:schemeClr val="accent6"/>
+                </a:solidFill>
+              </a:rPr>
+              <a:t>&lt;/cep&gt;</a:t>
+            </a:r>
+          </a:p>
+          <a:p>
             <a:r>
               <a:rPr lang="en-US" dirty="0"/>
-              <a:t> Sul&lt;/</a:t>
-            </a:r>
-            <a:r>
-              <a:rPr lang="en-US" dirty="0" err="1"/>
-              <a:t>bairro</a:t>
-            </a:r>
+              <a:t>            </a:t>
+            </a:r>
+            <a:r>
+              <a:rPr lang="en-US" dirty="0">
+                <a:solidFill>
+                  <a:schemeClr val="accent6"/>
+                </a:solidFill>
+              </a:rPr>
+              <a:t>&lt;</a:t>
+            </a:r>
+            <a:r>
+              <a:rPr lang="en-US" dirty="0" err="1">
+                <a:solidFill>
+                  <a:schemeClr val="accent6"/>
+                </a:solidFill>
+              </a:rPr>
+              <a:t>cidade</a:t>
+            </a:r>
+            <a:r>
+              <a:rPr lang="en-US" dirty="0">
+                <a:solidFill>
+                  <a:schemeClr val="accent6"/>
+                </a:solidFill>
+              </a:rPr>
+              <a:t>&gt;</a:t>
+            </a:r>
+            <a:r>
+              <a:rPr lang="en-US" b="1" dirty="0"/>
+              <a:t>Palmas</a:t>
+            </a:r>
+            <a:r>
+              <a:rPr lang="en-US" dirty="0">
+                <a:solidFill>
+                  <a:schemeClr val="accent6"/>
+                </a:solidFill>
+              </a:rPr>
+              <a:t>&lt;/</a:t>
+            </a:r>
+            <a:r>
+              <a:rPr lang="en-US" dirty="0" err="1">
+                <a:solidFill>
+                  <a:schemeClr val="accent6"/>
+                </a:solidFill>
+              </a:rPr>
+              <a:t>cidade</a:t>
+            </a:r>
+            <a:r>
+              <a:rPr lang="en-US" dirty="0">
+                <a:solidFill>
+                  <a:schemeClr val="accent6"/>
+                </a:solidFill>
+              </a:rPr>
+              <a:t>&gt;</a:t>
+            </a:r>
+          </a:p>
+          <a:p>
             <a:r>
               <a:rPr lang="en-US" dirty="0"/>
+              <a:t>            </a:t>
+            </a:r>
+            <a:r>
+              <a:rPr lang="en-US" dirty="0">
+                <a:solidFill>
+                  <a:schemeClr val="accent6"/>
+                </a:solidFill>
+              </a:rPr>
+              <a:t>&lt;end&gt;</a:t>
+            </a:r>
+            <a:r>
+              <a:rPr lang="en-US" b="1" dirty="0"/>
+              <a:t>AE 310 Sul Avenida NS 10</a:t>
+            </a:r>
+            <a:r>
+              <a:rPr lang="en-US" dirty="0">
+                <a:solidFill>
+                  <a:schemeClr val="accent6"/>
+                </a:solidFill>
+              </a:rPr>
+              <a:t>&lt;/end&gt;</a:t>
+            </a:r>
+          </a:p>
+          <a:p>
+            <a:r>
+              <a:rPr lang="en-US" dirty="0"/>
+              <a:t>            </a:t>
+            </a:r>
+            <a:r>
+              <a:rPr lang="en-US" dirty="0">
+                <a:solidFill>
+                  <a:schemeClr val="accent6"/>
+                </a:solidFill>
+              </a:rPr>
+              <a:t>&lt;</a:t>
+            </a:r>
+            <a:r>
+              <a:rPr lang="en-US" dirty="0" err="1">
+                <a:solidFill>
+                  <a:schemeClr val="accent6"/>
+                </a:solidFill>
+              </a:rPr>
+              <a:t>uf</a:t>
+            </a:r>
+            <a:r>
+              <a:rPr lang="en-US" dirty="0">
+                <a:solidFill>
+                  <a:schemeClr val="accent6"/>
+                </a:solidFill>
+              </a:rPr>
               <a:t>&gt;</a:t>
             </a:r>
+            <a:r>
+              <a:rPr lang="en-US" b="1" dirty="0"/>
+              <a:t>TO</a:t>
+            </a:r>
+            <a:r>
+              <a:rPr lang="en-US" dirty="0">
+                <a:solidFill>
+                  <a:schemeClr val="accent6"/>
+                </a:solidFill>
+              </a:rPr>
+              <a:t>&lt;/</a:t>
+            </a:r>
+            <a:r>
+              <a:rPr lang="en-US" dirty="0" err="1">
+                <a:solidFill>
+                  <a:schemeClr val="accent6"/>
+                </a:solidFill>
+              </a:rPr>
+              <a:t>uf</a:t>
+            </a:r>
+            <a:r>
+              <a:rPr lang="en-US" dirty="0">
+                <a:solidFill>
+                  <a:schemeClr val="accent6"/>
+                </a:solidFill>
+              </a:rPr>
+              <a:t>&gt;</a:t>
+            </a:r>
           </a:p>
           <a:p>
             <a:r>
               <a:rPr lang="en-US" dirty="0"/>
-              <a:t>            &lt;cep&gt;77021090&lt;/cep&gt;</a:t>
-            </a:r>
-          </a:p>
-          <a:p>
-            <a:r>
-              <a:rPr lang="en-US" dirty="0"/>
-              <a:t>            &lt;</a:t>
-            </a:r>
-            <a:r>
-              <a:rPr lang="en-US" dirty="0" err="1"/>
-              <a:t>cidade</a:t>
-            </a:r>
-            <a:r>
-              <a:rPr lang="en-US" dirty="0"/>
-              <a:t>&gt;Palmas&lt;/</a:t>
-            </a:r>
-            <a:r>
-              <a:rPr lang="en-US" dirty="0" err="1"/>
-              <a:t>cidade</a:t>
-            </a:r>
-            <a:r>
-              <a:rPr lang="en-US" dirty="0"/>
-              <a:t>&gt;</a:t>
-            </a:r>
-          </a:p>
-          <a:p>
-            <a:r>
-              <a:rPr lang="en-US" dirty="0"/>
-              <a:t>            &lt;complemento2/&gt;</a:t>
-            </a:r>
-          </a:p>
-          <a:p>
-            <a:r>
-              <a:rPr lang="en-US" dirty="0"/>
-              <a:t>            &lt;end&gt;AE 310 Sul Avenida NS 10&lt;/end&gt;</a:t>
-            </a:r>
-          </a:p>
-          <a:p>
-            <a:r>
-              <a:rPr lang="en-US" dirty="0"/>
-              <a:t>            &lt;</a:t>
-            </a:r>
-            <a:r>
-              <a:rPr lang="en-US" dirty="0" err="1"/>
-              <a:t>uf</a:t>
-            </a:r>
-            <a:r>
-              <a:rPr lang="en-US" dirty="0"/>
-              <a:t>&gt;TO&lt;/</a:t>
-            </a:r>
-            <a:r>
-              <a:rPr lang="en-US" dirty="0" err="1"/>
-              <a:t>uf</a:t>
-            </a:r>
-            <a:r>
-              <a:rPr lang="en-US" dirty="0"/>
-              <a:t>&gt;</a:t>
-            </a:r>
-          </a:p>
-          <a:p>
-            <a:r>
-              <a:rPr lang="en-US" dirty="0"/>
-              <a:t>         &lt;/return&gt;</a:t>
+              <a:t>         </a:t>
+            </a:r>
+            <a:r>
+              <a:rPr lang="en-US" dirty="0">
+                <a:solidFill>
+                  <a:schemeClr val="accent6"/>
+                </a:solidFill>
+              </a:rPr>
+              <a:t>&lt;/return&gt;</a:t>
             </a:r>
           </a:p>
           <a:p>
@@ -15944,7 +16243,7 @@
                                 </p:cTn>
                               </p:par>
                               <p:par>
-                                <p:cTn id="8" presetID="42" presetClass="entr" presetSubtype="0" fill="hold" grpId="0" nodeType="withEffect">
+                                <p:cTn id="8" presetID="2" presetClass="entr" presetSubtype="2" fill="hold" grpId="0" nodeType="withEffect">
                                   <p:stCondLst>
                                     <p:cond delay="0"/>
                                   </p:stCondLst>
@@ -15967,17 +16266,9 @@
                                         <p:strVal val="visible"/>
                                       </p:to>
                                     </p:set>
-                                    <p:animEffect transition="in" filter="fade">
-                                      <p:cBhvr>
-                                        <p:cTn id="10" dur="1000"/>
-                                        <p:tgtEl>
-                                          <p:spTgt spid="2"/>
-                                        </p:tgtEl>
-                                      </p:cBhvr>
-                                    </p:animEffect>
                                     <p:anim calcmode="lin" valueType="num">
-                                      <p:cBhvr>
-                                        <p:cTn id="11" dur="1000" fill="hold"/>
+                                      <p:cBhvr additive="base">
+                                        <p:cTn id="10" dur="500" fill="hold"/>
                                         <p:tgtEl>
                                           <p:spTgt spid="2"/>
                                         </p:tgtEl>
@@ -15988,7 +16279,7 @@
                                       <p:tavLst>
                                         <p:tav tm="0">
                                           <p:val>
-                                            <p:strVal val="#ppt_x"/>
+                                            <p:strVal val="1+#ppt_w/2"/>
                                           </p:val>
                                         </p:tav>
                                         <p:tav tm="100000">
@@ -15999,8 +16290,8 @@
                                       </p:tavLst>
                                     </p:anim>
                                     <p:anim calcmode="lin" valueType="num">
-                                      <p:cBhvr>
-                                        <p:cTn id="12" dur="1000" fill="hold"/>
+                                      <p:cBhvr additive="base">
+                                        <p:cTn id="11" dur="500" fill="hold"/>
                                         <p:tgtEl>
                                           <p:spTgt spid="2"/>
                                         </p:tgtEl>
@@ -16011,7 +16302,7 @@
                                       <p:tavLst>
                                         <p:tav tm="0">
                                           <p:val>
-                                            <p:strVal val="#ppt_y+.1"/>
+                                            <p:strVal val="#ppt_y"/>
                                           </p:val>
                                         </p:tav>
                                         <p:tav tm="100000">

</xml_diff>

<commit_message>
Adiciona projeto de cliente SOAP
</commit_message>
<xml_diff>
--- a/projects/08-webservices/webservices.pptx
+++ b/projects/08-webservices/webservices.pptx
@@ -220,7 +220,7 @@
           <a:p>
             <a:fld id="{7497B6E1-7C5B-524D-B5EB-5E6695205380}" type="datetimeFigureOut">
               <a:rPr lang="pt-BR" smtClean="0"/>
-              <a:t>27/11/2018</a:t>
+              <a:t>29/11/2018</a:t>
             </a:fld>
             <a:endParaRPr lang="pt-BR" dirty="0"/>
           </a:p>
@@ -658,7 +658,7 @@
           <a:p>
             <a:fld id="{19E7D63B-43B5-8A4C-BD12-76889BE136BD}" type="datetime1">
               <a:rPr lang="en-US" smtClean="0"/>
-              <a:t>11/27/18</a:t>
+              <a:t>11/29/18</a:t>
             </a:fld>
             <a:endParaRPr lang="en-US" dirty="0"/>
           </a:p>
@@ -924,7 +924,7 @@
           <a:p>
             <a:fld id="{124E9894-F119-A64C-B7CB-D7CE860A73BE}" type="datetime1">
               <a:rPr lang="en-US" smtClean="0"/>
-              <a:t>11/27/18</a:t>
+              <a:t>11/29/18</a:t>
             </a:fld>
             <a:endParaRPr lang="en-US" dirty="0"/>
           </a:p>
@@ -1156,7 +1156,7 @@
           <a:p>
             <a:fld id="{124E9894-F119-A64C-B7CB-D7CE860A73BE}" type="datetime1">
               <a:rPr lang="en-US" smtClean="0"/>
-              <a:t>11/27/18</a:t>
+              <a:t>11/29/18</a:t>
             </a:fld>
             <a:endParaRPr lang="en-US" dirty="0"/>
           </a:p>
@@ -1467,7 +1467,7 @@
           <a:p>
             <a:fld id="{124E9894-F119-A64C-B7CB-D7CE860A73BE}" type="datetime1">
               <a:rPr lang="en-US" smtClean="0"/>
-              <a:t>11/27/18</a:t>
+              <a:t>11/29/18</a:t>
             </a:fld>
             <a:endParaRPr lang="en-US" dirty="0"/>
           </a:p>
@@ -1941,7 +1941,7 @@
           <a:p>
             <a:fld id="{B4BBB50B-BAA3-9748-978F-08A7877AB7D9}" type="datetime1">
               <a:rPr lang="en-US" smtClean="0"/>
-              <a:t>11/27/18</a:t>
+              <a:t>11/29/18</a:t>
             </a:fld>
             <a:endParaRPr lang="en-US" dirty="0"/>
           </a:p>
@@ -2488,7 +2488,7 @@
           <a:p>
             <a:fld id="{124E9894-F119-A64C-B7CB-D7CE860A73BE}" type="datetime1">
               <a:rPr lang="en-US" smtClean="0"/>
-              <a:t>11/27/18</a:t>
+              <a:t>11/29/18</a:t>
             </a:fld>
             <a:endParaRPr lang="en-US" dirty="0"/>
           </a:p>
@@ -3260,7 +3260,7 @@
           <a:p>
             <a:fld id="{124E9894-F119-A64C-B7CB-D7CE860A73BE}" type="datetime1">
               <a:rPr lang="en-US" smtClean="0"/>
-              <a:t>11/27/18</a:t>
+              <a:t>11/29/18</a:t>
             </a:fld>
             <a:endParaRPr lang="en-US" dirty="0"/>
           </a:p>
@@ -3436,7 +3436,7 @@
           <a:p>
             <a:fld id="{45040DEA-CE02-EF42-8F10-34F709D8505D}" type="datetime1">
               <a:rPr lang="en-US" smtClean="0"/>
-              <a:t>11/27/18</a:t>
+              <a:t>11/29/18</a:t>
             </a:fld>
             <a:endParaRPr lang="en-US" dirty="0"/>
           </a:p>
@@ -3659,7 +3659,7 @@
           <a:p>
             <a:fld id="{A0C1C801-5706-434E-AB65-DDFBCF1F55D2}" type="datetime1">
               <a:rPr lang="en-US" smtClean="0"/>
-              <a:t>11/27/18</a:t>
+              <a:t>11/29/18</a:t>
             </a:fld>
             <a:endParaRPr lang="en-US" dirty="0"/>
           </a:p>
@@ -3839,7 +3839,7 @@
           <a:p>
             <a:fld id="{39AE0FD8-7D7B-EA4F-8AF8-8B97820A0C5D}" type="datetime1">
               <a:rPr lang="en-US" smtClean="0"/>
-              <a:t>11/27/18</a:t>
+              <a:t>11/29/18</a:t>
             </a:fld>
             <a:endParaRPr lang="en-US" dirty="0"/>
           </a:p>
@@ -4128,7 +4128,7 @@
           <a:p>
             <a:fld id="{7FC94D43-3F68-DC43-8EF0-95FB3D51CCCF}" type="datetime1">
               <a:rPr lang="en-US" smtClean="0"/>
-              <a:t>11/27/18</a:t>
+              <a:t>11/29/18</a:t>
             </a:fld>
             <a:endParaRPr lang="en-US" dirty="0"/>
           </a:p>
@@ -4370,7 +4370,7 @@
           <a:p>
             <a:fld id="{BD42CFC2-1CE8-9045-8C9C-0F183F0FB455}" type="datetime1">
               <a:rPr lang="en-US" smtClean="0"/>
-              <a:t>11/27/18</a:t>
+              <a:t>11/29/18</a:t>
             </a:fld>
             <a:endParaRPr lang="en-US" dirty="0"/>
           </a:p>
@@ -4749,7 +4749,7 @@
           <a:p>
             <a:fld id="{F1B5C6E2-D044-C748-9C41-86C9B2F84EB9}" type="datetime1">
               <a:rPr lang="en-US" smtClean="0"/>
-              <a:t>11/27/18</a:t>
+              <a:t>11/29/18</a:t>
             </a:fld>
             <a:endParaRPr lang="en-US" dirty="0"/>
           </a:p>
@@ -4867,7 +4867,7 @@
           <a:p>
             <a:fld id="{359C32BA-C166-AC45-9FCD-8BF0F43629D9}" type="datetime1">
               <a:rPr lang="en-US" smtClean="0"/>
-              <a:t>11/27/18</a:t>
+              <a:t>11/29/18</a:t>
             </a:fld>
             <a:endParaRPr lang="en-US" dirty="0"/>
           </a:p>
@@ -4962,7 +4962,7 @@
           <a:p>
             <a:fld id="{E5D0D591-4B92-A44B-A0EA-798E76AD0368}" type="datetime1">
               <a:rPr lang="en-US" smtClean="0"/>
-              <a:t>11/27/18</a:t>
+              <a:t>11/29/18</a:t>
             </a:fld>
             <a:endParaRPr lang="en-US" dirty="0"/>
           </a:p>
@@ -5211,7 +5211,7 @@
           <a:p>
             <a:fld id="{8201F472-E17F-4B47-A44B-A2249FA27ED2}" type="datetime1">
               <a:rPr lang="en-US" smtClean="0"/>
-              <a:t>11/27/18</a:t>
+              <a:t>11/29/18</a:t>
             </a:fld>
             <a:endParaRPr lang="en-US" dirty="0"/>
           </a:p>
@@ -5467,7 +5467,7 @@
           <a:p>
             <a:fld id="{8BEFB9EE-CDF2-6F49-80F4-278D1604F10C}" type="datetime1">
               <a:rPr lang="en-US" smtClean="0"/>
-              <a:t>11/27/18</a:t>
+              <a:t>11/29/18</a:t>
             </a:fld>
             <a:endParaRPr lang="en-US" dirty="0"/>
           </a:p>
@@ -5710,7 +5710,7 @@
           <a:p>
             <a:fld id="{124E9894-F119-A64C-B7CB-D7CE860A73BE}" type="datetime1">
               <a:rPr lang="en-US" smtClean="0"/>
-              <a:t>11/27/18</a:t>
+              <a:t>11/29/18</a:t>
             </a:fld>
             <a:endParaRPr lang="en-US" dirty="0"/>
           </a:p>

</xml_diff>

<commit_message>
Atualiza README dos projetos de WebService e inclui Capítulo 2 da minha dissertação de mestrado.
</commit_message>
<xml_diff>
--- a/projects/08-webservices/webservices.pptx
+++ b/projects/08-webservices/webservices.pptx
@@ -220,7 +220,7 @@
           <a:p>
             <a:fld id="{7497B6E1-7C5B-524D-B5EB-5E6695205380}" type="datetimeFigureOut">
               <a:rPr lang="pt-BR" smtClean="0"/>
-              <a:t>29/11/2018</a:t>
+              <a:t>30/11/2018</a:t>
             </a:fld>
             <a:endParaRPr lang="pt-BR" dirty="0"/>
           </a:p>
@@ -658,7 +658,7 @@
           <a:p>
             <a:fld id="{19E7D63B-43B5-8A4C-BD12-76889BE136BD}" type="datetime1">
               <a:rPr lang="en-US" smtClean="0"/>
-              <a:t>11/29/18</a:t>
+              <a:t>11/30/18</a:t>
             </a:fld>
             <a:endParaRPr lang="en-US" dirty="0"/>
           </a:p>
@@ -924,7 +924,7 @@
           <a:p>
             <a:fld id="{124E9894-F119-A64C-B7CB-D7CE860A73BE}" type="datetime1">
               <a:rPr lang="en-US" smtClean="0"/>
-              <a:t>11/29/18</a:t>
+              <a:t>11/30/18</a:t>
             </a:fld>
             <a:endParaRPr lang="en-US" dirty="0"/>
           </a:p>
@@ -1156,7 +1156,7 @@
           <a:p>
             <a:fld id="{124E9894-F119-A64C-B7CB-D7CE860A73BE}" type="datetime1">
               <a:rPr lang="en-US" smtClean="0"/>
-              <a:t>11/29/18</a:t>
+              <a:t>11/30/18</a:t>
             </a:fld>
             <a:endParaRPr lang="en-US" dirty="0"/>
           </a:p>
@@ -1467,7 +1467,7 @@
           <a:p>
             <a:fld id="{124E9894-F119-A64C-B7CB-D7CE860A73BE}" type="datetime1">
               <a:rPr lang="en-US" smtClean="0"/>
-              <a:t>11/29/18</a:t>
+              <a:t>11/30/18</a:t>
             </a:fld>
             <a:endParaRPr lang="en-US" dirty="0"/>
           </a:p>
@@ -1941,7 +1941,7 @@
           <a:p>
             <a:fld id="{B4BBB50B-BAA3-9748-978F-08A7877AB7D9}" type="datetime1">
               <a:rPr lang="en-US" smtClean="0"/>
-              <a:t>11/29/18</a:t>
+              <a:t>11/30/18</a:t>
             </a:fld>
             <a:endParaRPr lang="en-US" dirty="0"/>
           </a:p>
@@ -2488,7 +2488,7 @@
           <a:p>
             <a:fld id="{124E9894-F119-A64C-B7CB-D7CE860A73BE}" type="datetime1">
               <a:rPr lang="en-US" smtClean="0"/>
-              <a:t>11/29/18</a:t>
+              <a:t>11/30/18</a:t>
             </a:fld>
             <a:endParaRPr lang="en-US" dirty="0"/>
           </a:p>
@@ -3260,7 +3260,7 @@
           <a:p>
             <a:fld id="{124E9894-F119-A64C-B7CB-D7CE860A73BE}" type="datetime1">
               <a:rPr lang="en-US" smtClean="0"/>
-              <a:t>11/29/18</a:t>
+              <a:t>11/30/18</a:t>
             </a:fld>
             <a:endParaRPr lang="en-US" dirty="0"/>
           </a:p>
@@ -3436,7 +3436,7 @@
           <a:p>
             <a:fld id="{45040DEA-CE02-EF42-8F10-34F709D8505D}" type="datetime1">
               <a:rPr lang="en-US" smtClean="0"/>
-              <a:t>11/29/18</a:t>
+              <a:t>11/30/18</a:t>
             </a:fld>
             <a:endParaRPr lang="en-US" dirty="0"/>
           </a:p>
@@ -3659,7 +3659,7 @@
           <a:p>
             <a:fld id="{A0C1C801-5706-434E-AB65-DDFBCF1F55D2}" type="datetime1">
               <a:rPr lang="en-US" smtClean="0"/>
-              <a:t>11/29/18</a:t>
+              <a:t>11/30/18</a:t>
             </a:fld>
             <a:endParaRPr lang="en-US" dirty="0"/>
           </a:p>
@@ -3839,7 +3839,7 @@
           <a:p>
             <a:fld id="{39AE0FD8-7D7B-EA4F-8AF8-8B97820A0C5D}" type="datetime1">
               <a:rPr lang="en-US" smtClean="0"/>
-              <a:t>11/29/18</a:t>
+              <a:t>11/30/18</a:t>
             </a:fld>
             <a:endParaRPr lang="en-US" dirty="0"/>
           </a:p>
@@ -4128,7 +4128,7 @@
           <a:p>
             <a:fld id="{7FC94D43-3F68-DC43-8EF0-95FB3D51CCCF}" type="datetime1">
               <a:rPr lang="en-US" smtClean="0"/>
-              <a:t>11/29/18</a:t>
+              <a:t>11/30/18</a:t>
             </a:fld>
             <a:endParaRPr lang="en-US" dirty="0"/>
           </a:p>
@@ -4370,7 +4370,7 @@
           <a:p>
             <a:fld id="{BD42CFC2-1CE8-9045-8C9C-0F183F0FB455}" type="datetime1">
               <a:rPr lang="en-US" smtClean="0"/>
-              <a:t>11/29/18</a:t>
+              <a:t>11/30/18</a:t>
             </a:fld>
             <a:endParaRPr lang="en-US" dirty="0"/>
           </a:p>
@@ -4749,7 +4749,7 @@
           <a:p>
             <a:fld id="{F1B5C6E2-D044-C748-9C41-86C9B2F84EB9}" type="datetime1">
               <a:rPr lang="en-US" smtClean="0"/>
-              <a:t>11/29/18</a:t>
+              <a:t>11/30/18</a:t>
             </a:fld>
             <a:endParaRPr lang="en-US" dirty="0"/>
           </a:p>
@@ -4867,7 +4867,7 @@
           <a:p>
             <a:fld id="{359C32BA-C166-AC45-9FCD-8BF0F43629D9}" type="datetime1">
               <a:rPr lang="en-US" smtClean="0"/>
-              <a:t>11/29/18</a:t>
+              <a:t>11/30/18</a:t>
             </a:fld>
             <a:endParaRPr lang="en-US" dirty="0"/>
           </a:p>
@@ -4962,7 +4962,7 @@
           <a:p>
             <a:fld id="{E5D0D591-4B92-A44B-A0EA-798E76AD0368}" type="datetime1">
               <a:rPr lang="en-US" smtClean="0"/>
-              <a:t>11/29/18</a:t>
+              <a:t>11/30/18</a:t>
             </a:fld>
             <a:endParaRPr lang="en-US" dirty="0"/>
           </a:p>
@@ -5211,7 +5211,7 @@
           <a:p>
             <a:fld id="{8201F472-E17F-4B47-A44B-A2249FA27ED2}" type="datetime1">
               <a:rPr lang="en-US" smtClean="0"/>
-              <a:t>11/29/18</a:t>
+              <a:t>11/30/18</a:t>
             </a:fld>
             <a:endParaRPr lang="en-US" dirty="0"/>
           </a:p>
@@ -5467,7 +5467,7 @@
           <a:p>
             <a:fld id="{8BEFB9EE-CDF2-6F49-80F4-278D1604F10C}" type="datetime1">
               <a:rPr lang="en-US" smtClean="0"/>
-              <a:t>11/29/18</a:t>
+              <a:t>11/30/18</a:t>
             </a:fld>
             <a:endParaRPr lang="en-US" dirty="0"/>
           </a:p>
@@ -5710,7 +5710,7 @@
           <a:p>
             <a:fld id="{124E9894-F119-A64C-B7CB-D7CE860A73BE}" type="datetime1">
               <a:rPr lang="en-US" smtClean="0"/>
-              <a:t>11/29/18</a:t>
+              <a:t>11/30/18</a:t>
             </a:fld>
             <a:endParaRPr lang="en-US" dirty="0"/>
           </a:p>

</xml_diff>

<commit_message>
Atualiza projeto soap e slides WS
</commit_message>
<xml_diff>
--- a/projects/08-webservices/webservices.pptx
+++ b/projects/08-webservices/webservices.pptx
@@ -5,7 +5,7 @@
     <p:sldMasterId id="2147484007" r:id="rId1"/>
   </p:sldMasterIdLst>
   <p:notesMasterIdLst>
-    <p:notesMasterId r:id="rId26"/>
+    <p:notesMasterId r:id="rId30"/>
   </p:notesMasterIdLst>
   <p:sldIdLst>
     <p:sldId id="266" r:id="rId2"/>
@@ -32,6 +32,10 @@
     <p:sldId id="304" r:id="rId23"/>
     <p:sldId id="298" r:id="rId24"/>
     <p:sldId id="299" r:id="rId25"/>
+    <p:sldId id="305" r:id="rId26"/>
+    <p:sldId id="306" r:id="rId27"/>
+    <p:sldId id="307" r:id="rId28"/>
+    <p:sldId id="308" r:id="rId29"/>
   </p:sldIdLst>
   <p:sldSz cx="12192000" cy="6858000"/>
   <p:notesSz cx="6858000" cy="9144000"/>
@@ -7890,7 +7894,7 @@
           <a:p>
             <a:r>
               <a:rPr lang="pt-BR" sz="2400" dirty="0"/>
-              <a:t>Um Web Service é um serviço disponibilizado por uma aplicação através da Web</a:t>
+              <a:t>Um Web Service (WS) é um serviço disponibilizado por uma aplicação através da Web</a:t>
             </a:r>
           </a:p>
           <a:p>
@@ -7963,7 +7967,7 @@
         </p:spPr>
         <p:txBody>
           <a:bodyPr>
-            <a:normAutofit fontScale="90000"/>
+            <a:normAutofit/>
           </a:bodyPr>
           <a:lstStyle/>
           <a:p>
@@ -7975,25 +7979,6 @@
             <a:r>
               <a:rPr lang="pt-BR" b="1" dirty="0" err="1"/>
               <a:t>services</a:t>
-            </a:r>
-            <a:br>
-              <a:rPr lang="pt-BR" b="1" dirty="0"/>
-            </a:br>
-            <a:r>
-              <a:rPr lang="pt-BR" b="1" dirty="0"/>
-              <a:t>(</a:t>
-            </a:r>
-            <a:r>
-              <a:rPr lang="pt-BR" b="1" dirty="0" err="1"/>
-              <a:t>ws’</a:t>
-            </a:r>
-            <a:r>
-              <a:rPr lang="pt-BR" b="1" cap="none" dirty="0" err="1"/>
-              <a:t>s</a:t>
-            </a:r>
-            <a:r>
-              <a:rPr lang="pt-BR" b="1" dirty="0"/>
-              <a:t>)</a:t>
             </a:r>
             <a:endParaRPr lang="pt-BR" dirty="0"/>
           </a:p>
@@ -8296,7 +8281,7 @@
             </a:pPr>
             <a:r>
               <a:rPr lang="pt-BR" sz="2400" dirty="0"/>
-              <a:t>O servidor web/servidor de aplicação que você já tem é o único software que você precisa em execução. Existem servidores leves dependendo da linguagem que você vai usar, como </a:t>
+              <a:t>O servidor web/servidor de aplicação que você já tem é o único software que você precisa em execução. Existem servidores web leves dependendo da linguagem que você vai usar, como </a:t>
             </a:r>
             <a:r>
               <a:rPr lang="pt-BR" sz="2400" dirty="0" err="1"/>
@@ -10281,19 +10266,23 @@
           <a:p>
             <a:r>
               <a:rPr lang="pt-BR" sz="1900" dirty="0"/>
-              <a:t>Isso é chamado de </a:t>
-            </a:r>
-            <a:r>
-              <a:rPr lang="pt-BR" sz="1900" i="1" dirty="0"/>
+              <a:t>Isso é denominado </a:t>
+            </a:r>
+            <a:r>
+              <a:rPr lang="pt-BR" sz="1900" b="1" i="1" dirty="0"/>
               <a:t>Remote Procedure </a:t>
             </a:r>
             <a:r>
-              <a:rPr lang="pt-BR" sz="1900" i="1" dirty="0" err="1"/>
+              <a:rPr lang="pt-BR" sz="1900" b="1" i="1" dirty="0" err="1"/>
               <a:t>Call</a:t>
             </a:r>
             <a:r>
+              <a:rPr lang="pt-BR" sz="1900" b="1" dirty="0"/>
+              <a:t> (RPC)</a:t>
+            </a:r>
+            <a:r>
               <a:rPr lang="pt-BR" sz="1900" dirty="0"/>
-              <a:t> (RPC): Chamada de Procedimento Remoto</a:t>
+              <a:t>: Chamada de Procedimento Remoto</a:t>
             </a:r>
           </a:p>
         </p:txBody>
@@ -16345,6 +16334,2447 @@
     <p:bldLst>
       <p:bldP spid="3" grpId="0" uiExpand="1" build="p"/>
       <p:bldP spid="2" grpId="0" animBg="1"/>
+    </p:bldLst>
+  </p:timing>
+</p:sld>
+</file>
+
+<file path=ppt/slides/slide25.xml><?xml version="1.0" encoding="utf-8"?>
+<p:sld xmlns:a="http://schemas.openxmlformats.org/drawingml/2006/main" xmlns:r="http://schemas.openxmlformats.org/officeDocument/2006/relationships" xmlns:p="http://schemas.openxmlformats.org/presentationml/2006/main">
+  <p:cSld>
+    <p:spTree>
+      <p:nvGrpSpPr>
+        <p:cNvPr id="1" name=""/>
+        <p:cNvGrpSpPr/>
+        <p:nvPr/>
+      </p:nvGrpSpPr>
+      <p:grpSpPr>
+        <a:xfrm>
+          <a:off x="0" y="0"/>
+          <a:ext cx="0" cy="0"/>
+          <a:chOff x="0" y="0"/>
+          <a:chExt cx="0" cy="0"/>
+        </a:xfrm>
+      </p:grpSpPr>
+      <p:sp>
+        <p:nvSpPr>
+          <p:cNvPr id="3" name="Content Placeholder 2">
+            <a:extLst>
+              <a:ext uri="{FF2B5EF4-FFF2-40B4-BE49-F238E27FC236}">
+                <a16:creationId xmlns:a16="http://schemas.microsoft.com/office/drawing/2014/main" id="{C9044F89-E3C1-E349-B0DE-0B932821234C}"/>
+              </a:ext>
+            </a:extLst>
+          </p:cNvPr>
+          <p:cNvSpPr>
+            <a:spLocks noGrp="1"/>
+          </p:cNvSpPr>
+          <p:nvPr>
+            <p:ph idx="1"/>
+          </p:nvPr>
+        </p:nvSpPr>
+        <p:spPr>
+          <a:xfrm>
+            <a:off x="719527" y="1789043"/>
+            <a:ext cx="10785085" cy="4776650"/>
+          </a:xfrm>
+        </p:spPr>
+        <p:txBody>
+          <a:bodyPr>
+            <a:normAutofit/>
+          </a:bodyPr>
+          <a:lstStyle/>
+          <a:p>
+            <a:r>
+              <a:rPr lang="pt-BR" sz="2400" dirty="0"/>
+              <a:t>Dizemos que aplicações clientes consomem um WS quando usam o mesmo</a:t>
+            </a:r>
+          </a:p>
+          <a:p>
+            <a:r>
+              <a:rPr lang="pt-BR" sz="2400" dirty="0"/>
+              <a:t>Como um WS fornece um conjunto de métodos que podem ser acessados remotamente, é preciso conhecer quais são os métodos disponíveis</a:t>
+            </a:r>
+          </a:p>
+          <a:p>
+            <a:r>
+              <a:rPr lang="pt-BR" sz="2400" dirty="0"/>
+              <a:t>Para isso, é preciso saber qual o documento WSDL que descreve o serviço e os métodos disponibilizados</a:t>
+            </a:r>
+          </a:p>
+          <a:p>
+            <a:r>
+              <a:rPr lang="pt-BR" sz="2400" dirty="0"/>
+              <a:t>WSDL é a </a:t>
+            </a:r>
+            <a:r>
+              <a:rPr lang="pt-BR" sz="2400" i="1" dirty="0"/>
+              <a:t>Web Service </a:t>
+            </a:r>
+            <a:r>
+              <a:rPr lang="pt-BR" sz="2400" i="1" dirty="0" err="1"/>
+              <a:t>Description</a:t>
+            </a:r>
+            <a:r>
+              <a:rPr lang="pt-BR" sz="2400" i="1" dirty="0"/>
+              <a:t> </a:t>
+            </a:r>
+            <a:r>
+              <a:rPr lang="pt-BR" sz="2400" i="1" dirty="0" err="1"/>
+              <a:t>Language</a:t>
+            </a:r>
+            <a:r>
+              <a:rPr lang="pt-BR" sz="2400" dirty="0"/>
+              <a:t>: Linguagem de Descrição de Web Service</a:t>
+            </a:r>
+          </a:p>
+          <a:p>
+            <a:r>
+              <a:rPr lang="pt-BR" sz="2400" dirty="0"/>
+              <a:t>Por meio da WSDL toda a definição de um WS, como métodos, parâmetros, tipos e retorno dos métodos são definidos</a:t>
+            </a:r>
+          </a:p>
+        </p:txBody>
+      </p:sp>
+      <p:sp>
+        <p:nvSpPr>
+          <p:cNvPr id="4" name="Slide Number Placeholder 3">
+            <a:extLst>
+              <a:ext uri="{FF2B5EF4-FFF2-40B4-BE49-F238E27FC236}">
+                <a16:creationId xmlns:a16="http://schemas.microsoft.com/office/drawing/2014/main" id="{2EA509C2-078C-DE4C-BE59-C32AF18E82D6}"/>
+              </a:ext>
+            </a:extLst>
+          </p:cNvPr>
+          <p:cNvSpPr>
+            <a:spLocks noGrp="1"/>
+          </p:cNvSpPr>
+          <p:nvPr>
+            <p:ph type="sldNum" sz="quarter" idx="12"/>
+          </p:nvPr>
+        </p:nvSpPr>
+        <p:spPr/>
+        <p:txBody>
+          <a:bodyPr/>
+          <a:lstStyle/>
+          <a:p>
+            <a:fld id="{2183B7EE-0FBE-B749-875F-ED24F5ECD71F}" type="slidenum">
+              <a:rPr lang="en-US" smtClean="0"/>
+              <a:t>25</a:t>
+            </a:fld>
+            <a:endParaRPr lang="en-US" dirty="0"/>
+          </a:p>
+        </p:txBody>
+      </p:sp>
+      <p:sp>
+        <p:nvSpPr>
+          <p:cNvPr id="7" name="Title 1">
+            <a:extLst>
+              <a:ext uri="{FF2B5EF4-FFF2-40B4-BE49-F238E27FC236}">
+                <a16:creationId xmlns:a16="http://schemas.microsoft.com/office/drawing/2014/main" id="{B7621E9A-A403-2E4F-903F-60CBC83A635F}"/>
+              </a:ext>
+            </a:extLst>
+          </p:cNvPr>
+          <p:cNvSpPr>
+            <a:spLocks noGrp="1"/>
+          </p:cNvSpPr>
+          <p:nvPr>
+            <p:ph type="title"/>
+          </p:nvPr>
+        </p:nvSpPr>
+        <p:spPr>
+          <a:xfrm>
+            <a:off x="1974575" y="624110"/>
+            <a:ext cx="9530038" cy="1164933"/>
+          </a:xfrm>
+        </p:spPr>
+        <p:txBody>
+          <a:bodyPr>
+            <a:normAutofit/>
+          </a:bodyPr>
+          <a:lstStyle/>
+          <a:p>
+            <a:pPr algn="ctr"/>
+            <a:r>
+              <a:rPr lang="pt-BR" b="1" i="1" dirty="0"/>
+              <a:t>Como consumir um web </a:t>
+            </a:r>
+            <a:r>
+              <a:rPr lang="pt-BR" b="1" i="1" dirty="0" err="1"/>
+              <a:t>service</a:t>
+            </a:r>
+            <a:endParaRPr lang="pt-BR" dirty="0"/>
+          </a:p>
+        </p:txBody>
+      </p:sp>
+    </p:spTree>
+    <p:extLst>
+      <p:ext uri="{BB962C8B-B14F-4D97-AF65-F5344CB8AC3E}">
+        <p14:creationId xmlns:p14="http://schemas.microsoft.com/office/powerpoint/2010/main" val="332816113"/>
+      </p:ext>
+    </p:extLst>
+  </p:cSld>
+  <p:clrMapOvr>
+    <a:masterClrMapping/>
+  </p:clrMapOvr>
+  <p:timing>
+    <p:tnLst>
+      <p:par>
+        <p:cTn id="1" dur="indefinite" restart="never" nodeType="tmRoot">
+          <p:childTnLst>
+            <p:seq concurrent="1" nextAc="seek">
+              <p:cTn id="2" dur="indefinite" nodeType="mainSeq">
+                <p:childTnLst>
+                  <p:par>
+                    <p:cTn id="3" fill="hold">
+                      <p:stCondLst>
+                        <p:cond delay="indefinite"/>
+                      </p:stCondLst>
+                      <p:childTnLst>
+                        <p:par>
+                          <p:cTn id="4" fill="hold">
+                            <p:stCondLst>
+                              <p:cond delay="0"/>
+                            </p:stCondLst>
+                            <p:childTnLst>
+                              <p:par>
+                                <p:cTn id="5" presetID="9" presetClass="entr" presetSubtype="0" fill="hold" grpId="0" nodeType="clickEffect">
+                                  <p:stCondLst>
+                                    <p:cond delay="0"/>
+                                  </p:stCondLst>
+                                  <p:childTnLst>
+                                    <p:set>
+                                      <p:cBhvr>
+                                        <p:cTn id="6" dur="1" fill="hold">
+                                          <p:stCondLst>
+                                            <p:cond delay="0"/>
+                                          </p:stCondLst>
+                                        </p:cTn>
+                                        <p:tgtEl>
+                                          <p:spTgt spid="3">
+                                            <p:txEl>
+                                              <p:pRg st="0" end="0"/>
+                                            </p:txEl>
+                                          </p:spTgt>
+                                        </p:tgtEl>
+                                        <p:attrNameLst>
+                                          <p:attrName>style.visibility</p:attrName>
+                                        </p:attrNameLst>
+                                      </p:cBhvr>
+                                      <p:to>
+                                        <p:strVal val="visible"/>
+                                      </p:to>
+                                    </p:set>
+                                    <p:animEffect transition="in" filter="dissolve">
+                                      <p:cBhvr>
+                                        <p:cTn id="7" dur="500"/>
+                                        <p:tgtEl>
+                                          <p:spTgt spid="3">
+                                            <p:txEl>
+                                              <p:pRg st="0" end="0"/>
+                                            </p:txEl>
+                                          </p:spTgt>
+                                        </p:tgtEl>
+                                      </p:cBhvr>
+                                    </p:animEffect>
+                                  </p:childTnLst>
+                                </p:cTn>
+                              </p:par>
+                            </p:childTnLst>
+                          </p:cTn>
+                        </p:par>
+                      </p:childTnLst>
+                    </p:cTn>
+                  </p:par>
+                  <p:par>
+                    <p:cTn id="8" fill="hold">
+                      <p:stCondLst>
+                        <p:cond delay="indefinite"/>
+                      </p:stCondLst>
+                      <p:childTnLst>
+                        <p:par>
+                          <p:cTn id="9" fill="hold">
+                            <p:stCondLst>
+                              <p:cond delay="0"/>
+                            </p:stCondLst>
+                            <p:childTnLst>
+                              <p:par>
+                                <p:cTn id="10" presetID="9" presetClass="entr" presetSubtype="0" fill="hold" grpId="0" nodeType="clickEffect">
+                                  <p:stCondLst>
+                                    <p:cond delay="0"/>
+                                  </p:stCondLst>
+                                  <p:childTnLst>
+                                    <p:set>
+                                      <p:cBhvr>
+                                        <p:cTn id="11" dur="1" fill="hold">
+                                          <p:stCondLst>
+                                            <p:cond delay="0"/>
+                                          </p:stCondLst>
+                                        </p:cTn>
+                                        <p:tgtEl>
+                                          <p:spTgt spid="3">
+                                            <p:txEl>
+                                              <p:pRg st="1" end="1"/>
+                                            </p:txEl>
+                                          </p:spTgt>
+                                        </p:tgtEl>
+                                        <p:attrNameLst>
+                                          <p:attrName>style.visibility</p:attrName>
+                                        </p:attrNameLst>
+                                      </p:cBhvr>
+                                      <p:to>
+                                        <p:strVal val="visible"/>
+                                      </p:to>
+                                    </p:set>
+                                    <p:animEffect transition="in" filter="dissolve">
+                                      <p:cBhvr>
+                                        <p:cTn id="12" dur="500"/>
+                                        <p:tgtEl>
+                                          <p:spTgt spid="3">
+                                            <p:txEl>
+                                              <p:pRg st="1" end="1"/>
+                                            </p:txEl>
+                                          </p:spTgt>
+                                        </p:tgtEl>
+                                      </p:cBhvr>
+                                    </p:animEffect>
+                                  </p:childTnLst>
+                                </p:cTn>
+                              </p:par>
+                            </p:childTnLst>
+                          </p:cTn>
+                        </p:par>
+                      </p:childTnLst>
+                    </p:cTn>
+                  </p:par>
+                  <p:par>
+                    <p:cTn id="13" fill="hold">
+                      <p:stCondLst>
+                        <p:cond delay="indefinite"/>
+                      </p:stCondLst>
+                      <p:childTnLst>
+                        <p:par>
+                          <p:cTn id="14" fill="hold">
+                            <p:stCondLst>
+                              <p:cond delay="0"/>
+                            </p:stCondLst>
+                            <p:childTnLst>
+                              <p:par>
+                                <p:cTn id="15" presetID="9" presetClass="entr" presetSubtype="0" fill="hold" grpId="0" nodeType="clickEffect">
+                                  <p:stCondLst>
+                                    <p:cond delay="0"/>
+                                  </p:stCondLst>
+                                  <p:childTnLst>
+                                    <p:set>
+                                      <p:cBhvr>
+                                        <p:cTn id="16" dur="1" fill="hold">
+                                          <p:stCondLst>
+                                            <p:cond delay="0"/>
+                                          </p:stCondLst>
+                                        </p:cTn>
+                                        <p:tgtEl>
+                                          <p:spTgt spid="3">
+                                            <p:txEl>
+                                              <p:pRg st="2" end="2"/>
+                                            </p:txEl>
+                                          </p:spTgt>
+                                        </p:tgtEl>
+                                        <p:attrNameLst>
+                                          <p:attrName>style.visibility</p:attrName>
+                                        </p:attrNameLst>
+                                      </p:cBhvr>
+                                      <p:to>
+                                        <p:strVal val="visible"/>
+                                      </p:to>
+                                    </p:set>
+                                    <p:animEffect transition="in" filter="dissolve">
+                                      <p:cBhvr>
+                                        <p:cTn id="17" dur="500"/>
+                                        <p:tgtEl>
+                                          <p:spTgt spid="3">
+                                            <p:txEl>
+                                              <p:pRg st="2" end="2"/>
+                                            </p:txEl>
+                                          </p:spTgt>
+                                        </p:tgtEl>
+                                      </p:cBhvr>
+                                    </p:animEffect>
+                                  </p:childTnLst>
+                                </p:cTn>
+                              </p:par>
+                            </p:childTnLst>
+                          </p:cTn>
+                        </p:par>
+                      </p:childTnLst>
+                    </p:cTn>
+                  </p:par>
+                  <p:par>
+                    <p:cTn id="18" fill="hold">
+                      <p:stCondLst>
+                        <p:cond delay="indefinite"/>
+                      </p:stCondLst>
+                      <p:childTnLst>
+                        <p:par>
+                          <p:cTn id="19" fill="hold">
+                            <p:stCondLst>
+                              <p:cond delay="0"/>
+                            </p:stCondLst>
+                            <p:childTnLst>
+                              <p:par>
+                                <p:cTn id="20" presetID="9" presetClass="entr" presetSubtype="0" fill="hold" grpId="0" nodeType="clickEffect">
+                                  <p:stCondLst>
+                                    <p:cond delay="0"/>
+                                  </p:stCondLst>
+                                  <p:childTnLst>
+                                    <p:set>
+                                      <p:cBhvr>
+                                        <p:cTn id="21" dur="1" fill="hold">
+                                          <p:stCondLst>
+                                            <p:cond delay="0"/>
+                                          </p:stCondLst>
+                                        </p:cTn>
+                                        <p:tgtEl>
+                                          <p:spTgt spid="3">
+                                            <p:txEl>
+                                              <p:pRg st="3" end="3"/>
+                                            </p:txEl>
+                                          </p:spTgt>
+                                        </p:tgtEl>
+                                        <p:attrNameLst>
+                                          <p:attrName>style.visibility</p:attrName>
+                                        </p:attrNameLst>
+                                      </p:cBhvr>
+                                      <p:to>
+                                        <p:strVal val="visible"/>
+                                      </p:to>
+                                    </p:set>
+                                    <p:animEffect transition="in" filter="dissolve">
+                                      <p:cBhvr>
+                                        <p:cTn id="22" dur="500"/>
+                                        <p:tgtEl>
+                                          <p:spTgt spid="3">
+                                            <p:txEl>
+                                              <p:pRg st="3" end="3"/>
+                                            </p:txEl>
+                                          </p:spTgt>
+                                        </p:tgtEl>
+                                      </p:cBhvr>
+                                    </p:animEffect>
+                                  </p:childTnLst>
+                                </p:cTn>
+                              </p:par>
+                            </p:childTnLst>
+                          </p:cTn>
+                        </p:par>
+                      </p:childTnLst>
+                    </p:cTn>
+                  </p:par>
+                  <p:par>
+                    <p:cTn id="23" fill="hold">
+                      <p:stCondLst>
+                        <p:cond delay="indefinite"/>
+                      </p:stCondLst>
+                      <p:childTnLst>
+                        <p:par>
+                          <p:cTn id="24" fill="hold">
+                            <p:stCondLst>
+                              <p:cond delay="0"/>
+                            </p:stCondLst>
+                            <p:childTnLst>
+                              <p:par>
+                                <p:cTn id="25" presetID="9" presetClass="entr" presetSubtype="0" fill="hold" grpId="0" nodeType="clickEffect">
+                                  <p:stCondLst>
+                                    <p:cond delay="0"/>
+                                  </p:stCondLst>
+                                  <p:childTnLst>
+                                    <p:set>
+                                      <p:cBhvr>
+                                        <p:cTn id="26" dur="1" fill="hold">
+                                          <p:stCondLst>
+                                            <p:cond delay="0"/>
+                                          </p:stCondLst>
+                                        </p:cTn>
+                                        <p:tgtEl>
+                                          <p:spTgt spid="3">
+                                            <p:txEl>
+                                              <p:pRg st="4" end="4"/>
+                                            </p:txEl>
+                                          </p:spTgt>
+                                        </p:tgtEl>
+                                        <p:attrNameLst>
+                                          <p:attrName>style.visibility</p:attrName>
+                                        </p:attrNameLst>
+                                      </p:cBhvr>
+                                      <p:to>
+                                        <p:strVal val="visible"/>
+                                      </p:to>
+                                    </p:set>
+                                    <p:animEffect transition="in" filter="dissolve">
+                                      <p:cBhvr>
+                                        <p:cTn id="27" dur="500"/>
+                                        <p:tgtEl>
+                                          <p:spTgt spid="3">
+                                            <p:txEl>
+                                              <p:pRg st="4" end="4"/>
+                                            </p:txEl>
+                                          </p:spTgt>
+                                        </p:tgtEl>
+                                      </p:cBhvr>
+                                    </p:animEffect>
+                                  </p:childTnLst>
+                                </p:cTn>
+                              </p:par>
+                            </p:childTnLst>
+                          </p:cTn>
+                        </p:par>
+                      </p:childTnLst>
+                    </p:cTn>
+                  </p:par>
+                </p:childTnLst>
+              </p:cTn>
+              <p:prevCondLst>
+                <p:cond evt="onPrev" delay="0">
+                  <p:tgtEl>
+                    <p:sldTgt/>
+                  </p:tgtEl>
+                </p:cond>
+              </p:prevCondLst>
+              <p:nextCondLst>
+                <p:cond evt="onNext" delay="0">
+                  <p:tgtEl>
+                    <p:sldTgt/>
+                  </p:tgtEl>
+                </p:cond>
+              </p:nextCondLst>
+            </p:seq>
+          </p:childTnLst>
+        </p:cTn>
+      </p:par>
+    </p:tnLst>
+    <p:bldLst>
+      <p:bldP spid="3" grpId="0" build="p"/>
+    </p:bldLst>
+  </p:timing>
+</p:sld>
+</file>
+
+<file path=ppt/slides/slide26.xml><?xml version="1.0" encoding="utf-8"?>
+<p:sld xmlns:a="http://schemas.openxmlformats.org/drawingml/2006/main" xmlns:r="http://schemas.openxmlformats.org/officeDocument/2006/relationships" xmlns:p="http://schemas.openxmlformats.org/presentationml/2006/main">
+  <p:cSld>
+    <p:spTree>
+      <p:nvGrpSpPr>
+        <p:cNvPr id="1" name=""/>
+        <p:cNvGrpSpPr/>
+        <p:nvPr/>
+      </p:nvGrpSpPr>
+      <p:grpSpPr>
+        <a:xfrm>
+          <a:off x="0" y="0"/>
+          <a:ext cx="0" cy="0"/>
+          <a:chOff x="0" y="0"/>
+          <a:chExt cx="0" cy="0"/>
+        </a:xfrm>
+      </p:grpSpPr>
+      <p:sp>
+        <p:nvSpPr>
+          <p:cNvPr id="3" name="Content Placeholder 2">
+            <a:extLst>
+              <a:ext uri="{FF2B5EF4-FFF2-40B4-BE49-F238E27FC236}">
+                <a16:creationId xmlns:a16="http://schemas.microsoft.com/office/drawing/2014/main" id="{C9044F89-E3C1-E349-B0DE-0B932821234C}"/>
+              </a:ext>
+            </a:extLst>
+          </p:cNvPr>
+          <p:cNvSpPr>
+            <a:spLocks noGrp="1"/>
+          </p:cNvSpPr>
+          <p:nvPr>
+            <p:ph idx="1"/>
+          </p:nvPr>
+        </p:nvSpPr>
+        <p:spPr>
+          <a:xfrm>
+            <a:off x="719527" y="1789043"/>
+            <a:ext cx="10785085" cy="4776650"/>
+          </a:xfrm>
+        </p:spPr>
+        <p:txBody>
+          <a:bodyPr>
+            <a:normAutofit/>
+          </a:bodyPr>
+          <a:lstStyle/>
+          <a:p>
+            <a:r>
+              <a:rPr lang="pt-BR" sz="2400" dirty="0"/>
+              <a:t>Tal definição é fornecida em um documento WSDL</a:t>
+            </a:r>
+          </a:p>
+          <a:p>
+            <a:r>
+              <a:rPr lang="pt-BR" sz="2400" dirty="0"/>
+              <a:t>Este documento é criado automaticamente pelo </a:t>
+            </a:r>
+            <a:r>
+              <a:rPr lang="pt-BR" sz="2400" i="1" dirty="0"/>
+              <a:t>framework</a:t>
+            </a:r>
+            <a:r>
+              <a:rPr lang="pt-BR" sz="2400" dirty="0"/>
+              <a:t> de WS que você estiver utilizando quando publicar o WS</a:t>
+            </a:r>
+          </a:p>
+          <a:p>
+            <a:r>
+              <a:rPr lang="pt-BR" sz="2400" dirty="0"/>
+              <a:t>Para obter tal documento WSDL, é preciso conhecer o URL do WS</a:t>
+            </a:r>
+          </a:p>
+          <a:p>
+            <a:r>
+              <a:rPr lang="pt-BR" sz="2400" dirty="0"/>
+              <a:t>O WSDL normalmente é acessado colocando-se um parâmetro </a:t>
+            </a:r>
+            <a:r>
+              <a:rPr lang="pt-BR" sz="2400" b="1" i="1" dirty="0">
+                <a:latin typeface="Courier" pitchFamily="2" charset="0"/>
+              </a:rPr>
+              <a:t>?</a:t>
+            </a:r>
+            <a:r>
+              <a:rPr lang="pt-BR" sz="2400" b="1" i="1" dirty="0" err="1">
+                <a:latin typeface="Courier" pitchFamily="2" charset="0"/>
+              </a:rPr>
+              <a:t>wsdl</a:t>
+            </a:r>
+            <a:r>
+              <a:rPr lang="pt-BR" sz="2400" dirty="0"/>
+              <a:t> no final do URL</a:t>
+            </a:r>
+          </a:p>
+          <a:p>
+            <a:r>
+              <a:rPr lang="pt-BR" sz="2400" dirty="0"/>
+              <a:t>Alguns exemplos:</a:t>
+            </a:r>
+          </a:p>
+          <a:p>
+            <a:r>
+              <a:rPr lang="en-US" dirty="0">
+                <a:hlinkClick r:id="rId2"/>
+              </a:rPr>
+              <a:t>http://localhost:8080/LojaVirtual/Produtos?wsdl</a:t>
+            </a:r>
+            <a:r>
+              <a:rPr lang="en-US" dirty="0"/>
+              <a:t> </a:t>
+            </a:r>
+          </a:p>
+          <a:p>
+            <a:r>
+              <a:rPr lang="en-US" dirty="0">
+                <a:hlinkClick r:id="rId3"/>
+              </a:rPr>
+              <a:t>https://apps.correios.com.br/SigepMasterJPA/AtendeClienteService/AtendeCliente?wsdl</a:t>
+            </a:r>
+            <a:r>
+              <a:rPr lang="en-US" dirty="0"/>
+              <a:t> </a:t>
+            </a:r>
+          </a:p>
+          <a:p>
+            <a:pPr marL="0" indent="0">
+              <a:buNone/>
+            </a:pPr>
+            <a:endParaRPr lang="en-US" dirty="0"/>
+          </a:p>
+          <a:p>
+            <a:endParaRPr lang="pt-BR" sz="2400" dirty="0"/>
+          </a:p>
+        </p:txBody>
+      </p:sp>
+      <p:sp>
+        <p:nvSpPr>
+          <p:cNvPr id="4" name="Slide Number Placeholder 3">
+            <a:extLst>
+              <a:ext uri="{FF2B5EF4-FFF2-40B4-BE49-F238E27FC236}">
+                <a16:creationId xmlns:a16="http://schemas.microsoft.com/office/drawing/2014/main" id="{2EA509C2-078C-DE4C-BE59-C32AF18E82D6}"/>
+              </a:ext>
+            </a:extLst>
+          </p:cNvPr>
+          <p:cNvSpPr>
+            <a:spLocks noGrp="1"/>
+          </p:cNvSpPr>
+          <p:nvPr>
+            <p:ph type="sldNum" sz="quarter" idx="12"/>
+          </p:nvPr>
+        </p:nvSpPr>
+        <p:spPr/>
+        <p:txBody>
+          <a:bodyPr/>
+          <a:lstStyle/>
+          <a:p>
+            <a:fld id="{2183B7EE-0FBE-B749-875F-ED24F5ECD71F}" type="slidenum">
+              <a:rPr lang="en-US" smtClean="0"/>
+              <a:t>26</a:t>
+            </a:fld>
+            <a:endParaRPr lang="en-US" dirty="0"/>
+          </a:p>
+        </p:txBody>
+      </p:sp>
+      <p:sp>
+        <p:nvSpPr>
+          <p:cNvPr id="7" name="Title 1">
+            <a:extLst>
+              <a:ext uri="{FF2B5EF4-FFF2-40B4-BE49-F238E27FC236}">
+                <a16:creationId xmlns:a16="http://schemas.microsoft.com/office/drawing/2014/main" id="{B7621E9A-A403-2E4F-903F-60CBC83A635F}"/>
+              </a:ext>
+            </a:extLst>
+          </p:cNvPr>
+          <p:cNvSpPr>
+            <a:spLocks noGrp="1"/>
+          </p:cNvSpPr>
+          <p:nvPr>
+            <p:ph type="title"/>
+          </p:nvPr>
+        </p:nvSpPr>
+        <p:spPr>
+          <a:xfrm>
+            <a:off x="1974575" y="624110"/>
+            <a:ext cx="9530038" cy="1164933"/>
+          </a:xfrm>
+        </p:spPr>
+        <p:txBody>
+          <a:bodyPr>
+            <a:normAutofit/>
+          </a:bodyPr>
+          <a:lstStyle/>
+          <a:p>
+            <a:pPr algn="ctr"/>
+            <a:r>
+              <a:rPr lang="pt-BR" b="1" i="1" dirty="0"/>
+              <a:t>Como consumir um web </a:t>
+            </a:r>
+            <a:r>
+              <a:rPr lang="pt-BR" b="1" i="1" dirty="0" err="1"/>
+              <a:t>service</a:t>
+            </a:r>
+            <a:endParaRPr lang="pt-BR" dirty="0"/>
+          </a:p>
+        </p:txBody>
+      </p:sp>
+    </p:spTree>
+    <p:extLst>
+      <p:ext uri="{BB962C8B-B14F-4D97-AF65-F5344CB8AC3E}">
+        <p14:creationId xmlns:p14="http://schemas.microsoft.com/office/powerpoint/2010/main" val="3205919659"/>
+      </p:ext>
+    </p:extLst>
+  </p:cSld>
+  <p:clrMapOvr>
+    <a:masterClrMapping/>
+  </p:clrMapOvr>
+  <p:timing>
+    <p:tnLst>
+      <p:par>
+        <p:cTn id="1" dur="indefinite" restart="never" nodeType="tmRoot">
+          <p:childTnLst>
+            <p:seq concurrent="1" nextAc="seek">
+              <p:cTn id="2" dur="indefinite" nodeType="mainSeq">
+                <p:childTnLst>
+                  <p:par>
+                    <p:cTn id="3" fill="hold">
+                      <p:stCondLst>
+                        <p:cond delay="indefinite"/>
+                      </p:stCondLst>
+                      <p:childTnLst>
+                        <p:par>
+                          <p:cTn id="4" fill="hold">
+                            <p:stCondLst>
+                              <p:cond delay="0"/>
+                            </p:stCondLst>
+                            <p:childTnLst>
+                              <p:par>
+                                <p:cTn id="5" presetID="9" presetClass="entr" presetSubtype="0" fill="hold" grpId="0" nodeType="clickEffect">
+                                  <p:stCondLst>
+                                    <p:cond delay="0"/>
+                                  </p:stCondLst>
+                                  <p:childTnLst>
+                                    <p:set>
+                                      <p:cBhvr>
+                                        <p:cTn id="6" dur="1" fill="hold">
+                                          <p:stCondLst>
+                                            <p:cond delay="0"/>
+                                          </p:stCondLst>
+                                        </p:cTn>
+                                        <p:tgtEl>
+                                          <p:spTgt spid="3">
+                                            <p:txEl>
+                                              <p:pRg st="0" end="0"/>
+                                            </p:txEl>
+                                          </p:spTgt>
+                                        </p:tgtEl>
+                                        <p:attrNameLst>
+                                          <p:attrName>style.visibility</p:attrName>
+                                        </p:attrNameLst>
+                                      </p:cBhvr>
+                                      <p:to>
+                                        <p:strVal val="visible"/>
+                                      </p:to>
+                                    </p:set>
+                                    <p:animEffect transition="in" filter="dissolve">
+                                      <p:cBhvr>
+                                        <p:cTn id="7" dur="500"/>
+                                        <p:tgtEl>
+                                          <p:spTgt spid="3">
+                                            <p:txEl>
+                                              <p:pRg st="0" end="0"/>
+                                            </p:txEl>
+                                          </p:spTgt>
+                                        </p:tgtEl>
+                                      </p:cBhvr>
+                                    </p:animEffect>
+                                  </p:childTnLst>
+                                </p:cTn>
+                              </p:par>
+                            </p:childTnLst>
+                          </p:cTn>
+                        </p:par>
+                      </p:childTnLst>
+                    </p:cTn>
+                  </p:par>
+                  <p:par>
+                    <p:cTn id="8" fill="hold">
+                      <p:stCondLst>
+                        <p:cond delay="indefinite"/>
+                      </p:stCondLst>
+                      <p:childTnLst>
+                        <p:par>
+                          <p:cTn id="9" fill="hold">
+                            <p:stCondLst>
+                              <p:cond delay="0"/>
+                            </p:stCondLst>
+                            <p:childTnLst>
+                              <p:par>
+                                <p:cTn id="10" presetID="9" presetClass="entr" presetSubtype="0" fill="hold" grpId="0" nodeType="clickEffect">
+                                  <p:stCondLst>
+                                    <p:cond delay="0"/>
+                                  </p:stCondLst>
+                                  <p:childTnLst>
+                                    <p:set>
+                                      <p:cBhvr>
+                                        <p:cTn id="11" dur="1" fill="hold">
+                                          <p:stCondLst>
+                                            <p:cond delay="0"/>
+                                          </p:stCondLst>
+                                        </p:cTn>
+                                        <p:tgtEl>
+                                          <p:spTgt spid="3">
+                                            <p:txEl>
+                                              <p:pRg st="1" end="1"/>
+                                            </p:txEl>
+                                          </p:spTgt>
+                                        </p:tgtEl>
+                                        <p:attrNameLst>
+                                          <p:attrName>style.visibility</p:attrName>
+                                        </p:attrNameLst>
+                                      </p:cBhvr>
+                                      <p:to>
+                                        <p:strVal val="visible"/>
+                                      </p:to>
+                                    </p:set>
+                                    <p:animEffect transition="in" filter="dissolve">
+                                      <p:cBhvr>
+                                        <p:cTn id="12" dur="500"/>
+                                        <p:tgtEl>
+                                          <p:spTgt spid="3">
+                                            <p:txEl>
+                                              <p:pRg st="1" end="1"/>
+                                            </p:txEl>
+                                          </p:spTgt>
+                                        </p:tgtEl>
+                                      </p:cBhvr>
+                                    </p:animEffect>
+                                  </p:childTnLst>
+                                </p:cTn>
+                              </p:par>
+                            </p:childTnLst>
+                          </p:cTn>
+                        </p:par>
+                      </p:childTnLst>
+                    </p:cTn>
+                  </p:par>
+                  <p:par>
+                    <p:cTn id="13" fill="hold">
+                      <p:stCondLst>
+                        <p:cond delay="indefinite"/>
+                      </p:stCondLst>
+                      <p:childTnLst>
+                        <p:par>
+                          <p:cTn id="14" fill="hold">
+                            <p:stCondLst>
+                              <p:cond delay="0"/>
+                            </p:stCondLst>
+                            <p:childTnLst>
+                              <p:par>
+                                <p:cTn id="15" presetID="9" presetClass="entr" presetSubtype="0" fill="hold" grpId="0" nodeType="clickEffect">
+                                  <p:stCondLst>
+                                    <p:cond delay="0"/>
+                                  </p:stCondLst>
+                                  <p:childTnLst>
+                                    <p:set>
+                                      <p:cBhvr>
+                                        <p:cTn id="16" dur="1" fill="hold">
+                                          <p:stCondLst>
+                                            <p:cond delay="0"/>
+                                          </p:stCondLst>
+                                        </p:cTn>
+                                        <p:tgtEl>
+                                          <p:spTgt spid="3">
+                                            <p:txEl>
+                                              <p:pRg st="2" end="2"/>
+                                            </p:txEl>
+                                          </p:spTgt>
+                                        </p:tgtEl>
+                                        <p:attrNameLst>
+                                          <p:attrName>style.visibility</p:attrName>
+                                        </p:attrNameLst>
+                                      </p:cBhvr>
+                                      <p:to>
+                                        <p:strVal val="visible"/>
+                                      </p:to>
+                                    </p:set>
+                                    <p:animEffect transition="in" filter="dissolve">
+                                      <p:cBhvr>
+                                        <p:cTn id="17" dur="500"/>
+                                        <p:tgtEl>
+                                          <p:spTgt spid="3">
+                                            <p:txEl>
+                                              <p:pRg st="2" end="2"/>
+                                            </p:txEl>
+                                          </p:spTgt>
+                                        </p:tgtEl>
+                                      </p:cBhvr>
+                                    </p:animEffect>
+                                  </p:childTnLst>
+                                </p:cTn>
+                              </p:par>
+                            </p:childTnLst>
+                          </p:cTn>
+                        </p:par>
+                      </p:childTnLst>
+                    </p:cTn>
+                  </p:par>
+                  <p:par>
+                    <p:cTn id="18" fill="hold">
+                      <p:stCondLst>
+                        <p:cond delay="indefinite"/>
+                      </p:stCondLst>
+                      <p:childTnLst>
+                        <p:par>
+                          <p:cTn id="19" fill="hold">
+                            <p:stCondLst>
+                              <p:cond delay="0"/>
+                            </p:stCondLst>
+                            <p:childTnLst>
+                              <p:par>
+                                <p:cTn id="20" presetID="9" presetClass="entr" presetSubtype="0" fill="hold" grpId="0" nodeType="clickEffect">
+                                  <p:stCondLst>
+                                    <p:cond delay="0"/>
+                                  </p:stCondLst>
+                                  <p:childTnLst>
+                                    <p:set>
+                                      <p:cBhvr>
+                                        <p:cTn id="21" dur="1" fill="hold">
+                                          <p:stCondLst>
+                                            <p:cond delay="0"/>
+                                          </p:stCondLst>
+                                        </p:cTn>
+                                        <p:tgtEl>
+                                          <p:spTgt spid="3">
+                                            <p:txEl>
+                                              <p:pRg st="3" end="3"/>
+                                            </p:txEl>
+                                          </p:spTgt>
+                                        </p:tgtEl>
+                                        <p:attrNameLst>
+                                          <p:attrName>style.visibility</p:attrName>
+                                        </p:attrNameLst>
+                                      </p:cBhvr>
+                                      <p:to>
+                                        <p:strVal val="visible"/>
+                                      </p:to>
+                                    </p:set>
+                                    <p:animEffect transition="in" filter="dissolve">
+                                      <p:cBhvr>
+                                        <p:cTn id="22" dur="500"/>
+                                        <p:tgtEl>
+                                          <p:spTgt spid="3">
+                                            <p:txEl>
+                                              <p:pRg st="3" end="3"/>
+                                            </p:txEl>
+                                          </p:spTgt>
+                                        </p:tgtEl>
+                                      </p:cBhvr>
+                                    </p:animEffect>
+                                  </p:childTnLst>
+                                </p:cTn>
+                              </p:par>
+                            </p:childTnLst>
+                          </p:cTn>
+                        </p:par>
+                      </p:childTnLst>
+                    </p:cTn>
+                  </p:par>
+                  <p:par>
+                    <p:cTn id="23" fill="hold">
+                      <p:stCondLst>
+                        <p:cond delay="indefinite"/>
+                      </p:stCondLst>
+                      <p:childTnLst>
+                        <p:par>
+                          <p:cTn id="24" fill="hold">
+                            <p:stCondLst>
+                              <p:cond delay="0"/>
+                            </p:stCondLst>
+                            <p:childTnLst>
+                              <p:par>
+                                <p:cTn id="25" presetID="9" presetClass="entr" presetSubtype="0" fill="hold" grpId="0" nodeType="clickEffect">
+                                  <p:stCondLst>
+                                    <p:cond delay="0"/>
+                                  </p:stCondLst>
+                                  <p:childTnLst>
+                                    <p:set>
+                                      <p:cBhvr>
+                                        <p:cTn id="26" dur="1" fill="hold">
+                                          <p:stCondLst>
+                                            <p:cond delay="0"/>
+                                          </p:stCondLst>
+                                        </p:cTn>
+                                        <p:tgtEl>
+                                          <p:spTgt spid="3">
+                                            <p:txEl>
+                                              <p:pRg st="4" end="4"/>
+                                            </p:txEl>
+                                          </p:spTgt>
+                                        </p:tgtEl>
+                                        <p:attrNameLst>
+                                          <p:attrName>style.visibility</p:attrName>
+                                        </p:attrNameLst>
+                                      </p:cBhvr>
+                                      <p:to>
+                                        <p:strVal val="visible"/>
+                                      </p:to>
+                                    </p:set>
+                                    <p:animEffect transition="in" filter="dissolve">
+                                      <p:cBhvr>
+                                        <p:cTn id="27" dur="500"/>
+                                        <p:tgtEl>
+                                          <p:spTgt spid="3">
+                                            <p:txEl>
+                                              <p:pRg st="4" end="4"/>
+                                            </p:txEl>
+                                          </p:spTgt>
+                                        </p:tgtEl>
+                                      </p:cBhvr>
+                                    </p:animEffect>
+                                  </p:childTnLst>
+                                </p:cTn>
+                              </p:par>
+                            </p:childTnLst>
+                          </p:cTn>
+                        </p:par>
+                      </p:childTnLst>
+                    </p:cTn>
+                  </p:par>
+                  <p:par>
+                    <p:cTn id="28" fill="hold">
+                      <p:stCondLst>
+                        <p:cond delay="indefinite"/>
+                      </p:stCondLst>
+                      <p:childTnLst>
+                        <p:par>
+                          <p:cTn id="29" fill="hold">
+                            <p:stCondLst>
+                              <p:cond delay="0"/>
+                            </p:stCondLst>
+                            <p:childTnLst>
+                              <p:par>
+                                <p:cTn id="30" presetID="9" presetClass="entr" presetSubtype="0" fill="hold" grpId="0" nodeType="clickEffect">
+                                  <p:stCondLst>
+                                    <p:cond delay="0"/>
+                                  </p:stCondLst>
+                                  <p:childTnLst>
+                                    <p:set>
+                                      <p:cBhvr>
+                                        <p:cTn id="31" dur="1" fill="hold">
+                                          <p:stCondLst>
+                                            <p:cond delay="0"/>
+                                          </p:stCondLst>
+                                        </p:cTn>
+                                        <p:tgtEl>
+                                          <p:spTgt spid="3">
+                                            <p:txEl>
+                                              <p:pRg st="5" end="5"/>
+                                            </p:txEl>
+                                          </p:spTgt>
+                                        </p:tgtEl>
+                                        <p:attrNameLst>
+                                          <p:attrName>style.visibility</p:attrName>
+                                        </p:attrNameLst>
+                                      </p:cBhvr>
+                                      <p:to>
+                                        <p:strVal val="visible"/>
+                                      </p:to>
+                                    </p:set>
+                                    <p:animEffect transition="in" filter="dissolve">
+                                      <p:cBhvr>
+                                        <p:cTn id="32" dur="500"/>
+                                        <p:tgtEl>
+                                          <p:spTgt spid="3">
+                                            <p:txEl>
+                                              <p:pRg st="5" end="5"/>
+                                            </p:txEl>
+                                          </p:spTgt>
+                                        </p:tgtEl>
+                                      </p:cBhvr>
+                                    </p:animEffect>
+                                  </p:childTnLst>
+                                </p:cTn>
+                              </p:par>
+                            </p:childTnLst>
+                          </p:cTn>
+                        </p:par>
+                      </p:childTnLst>
+                    </p:cTn>
+                  </p:par>
+                  <p:par>
+                    <p:cTn id="33" fill="hold">
+                      <p:stCondLst>
+                        <p:cond delay="indefinite"/>
+                      </p:stCondLst>
+                      <p:childTnLst>
+                        <p:par>
+                          <p:cTn id="34" fill="hold">
+                            <p:stCondLst>
+                              <p:cond delay="0"/>
+                            </p:stCondLst>
+                            <p:childTnLst>
+                              <p:par>
+                                <p:cTn id="35" presetID="9" presetClass="entr" presetSubtype="0" fill="hold" grpId="0" nodeType="clickEffect">
+                                  <p:stCondLst>
+                                    <p:cond delay="0"/>
+                                  </p:stCondLst>
+                                  <p:childTnLst>
+                                    <p:set>
+                                      <p:cBhvr>
+                                        <p:cTn id="36" dur="1" fill="hold">
+                                          <p:stCondLst>
+                                            <p:cond delay="0"/>
+                                          </p:stCondLst>
+                                        </p:cTn>
+                                        <p:tgtEl>
+                                          <p:spTgt spid="3">
+                                            <p:txEl>
+                                              <p:pRg st="6" end="6"/>
+                                            </p:txEl>
+                                          </p:spTgt>
+                                        </p:tgtEl>
+                                        <p:attrNameLst>
+                                          <p:attrName>style.visibility</p:attrName>
+                                        </p:attrNameLst>
+                                      </p:cBhvr>
+                                      <p:to>
+                                        <p:strVal val="visible"/>
+                                      </p:to>
+                                    </p:set>
+                                    <p:animEffect transition="in" filter="dissolve">
+                                      <p:cBhvr>
+                                        <p:cTn id="37" dur="500"/>
+                                        <p:tgtEl>
+                                          <p:spTgt spid="3">
+                                            <p:txEl>
+                                              <p:pRg st="6" end="6"/>
+                                            </p:txEl>
+                                          </p:spTgt>
+                                        </p:tgtEl>
+                                      </p:cBhvr>
+                                    </p:animEffect>
+                                  </p:childTnLst>
+                                </p:cTn>
+                              </p:par>
+                            </p:childTnLst>
+                          </p:cTn>
+                        </p:par>
+                      </p:childTnLst>
+                    </p:cTn>
+                  </p:par>
+                </p:childTnLst>
+              </p:cTn>
+              <p:prevCondLst>
+                <p:cond evt="onPrev" delay="0">
+                  <p:tgtEl>
+                    <p:sldTgt/>
+                  </p:tgtEl>
+                </p:cond>
+              </p:prevCondLst>
+              <p:nextCondLst>
+                <p:cond evt="onNext" delay="0">
+                  <p:tgtEl>
+                    <p:sldTgt/>
+                  </p:tgtEl>
+                </p:cond>
+              </p:nextCondLst>
+            </p:seq>
+          </p:childTnLst>
+        </p:cTn>
+      </p:par>
+    </p:tnLst>
+    <p:bldLst>
+      <p:bldP spid="3" grpId="0" build="p"/>
+    </p:bldLst>
+  </p:timing>
+</p:sld>
+</file>
+
+<file path=ppt/slides/slide27.xml><?xml version="1.0" encoding="utf-8"?>
+<p:sld xmlns:a="http://schemas.openxmlformats.org/drawingml/2006/main" xmlns:r="http://schemas.openxmlformats.org/officeDocument/2006/relationships" xmlns:p="http://schemas.openxmlformats.org/presentationml/2006/main">
+  <p:cSld>
+    <p:spTree>
+      <p:nvGrpSpPr>
+        <p:cNvPr id="1" name=""/>
+        <p:cNvGrpSpPr/>
+        <p:nvPr/>
+      </p:nvGrpSpPr>
+      <p:grpSpPr>
+        <a:xfrm>
+          <a:off x="0" y="0"/>
+          <a:ext cx="0" cy="0"/>
+          <a:chOff x="0" y="0"/>
+          <a:chExt cx="0" cy="0"/>
+        </a:xfrm>
+      </p:grpSpPr>
+      <p:sp>
+        <p:nvSpPr>
+          <p:cNvPr id="3" name="Content Placeholder 2">
+            <a:extLst>
+              <a:ext uri="{FF2B5EF4-FFF2-40B4-BE49-F238E27FC236}">
+                <a16:creationId xmlns:a16="http://schemas.microsoft.com/office/drawing/2014/main" id="{C9044F89-E3C1-E349-B0DE-0B932821234C}"/>
+              </a:ext>
+            </a:extLst>
+          </p:cNvPr>
+          <p:cNvSpPr>
+            <a:spLocks noGrp="1"/>
+          </p:cNvSpPr>
+          <p:nvPr>
+            <p:ph idx="1"/>
+          </p:nvPr>
+        </p:nvSpPr>
+        <p:spPr>
+          <a:xfrm>
+            <a:off x="2119284" y="1402496"/>
+            <a:ext cx="9108349" cy="5171606"/>
+          </a:xfrm>
+        </p:spPr>
+        <p:txBody>
+          <a:bodyPr>
+            <a:noAutofit/>
+          </a:bodyPr>
+          <a:lstStyle/>
+          <a:p>
+            <a:pPr marL="0" indent="0">
+              <a:buNone/>
+            </a:pPr>
+            <a:r>
+              <a:rPr lang="pt-BR" sz="2400" dirty="0"/>
+              <a:t>&lt;</a:t>
+            </a:r>
+            <a:r>
+              <a:rPr lang="pt-BR" sz="2400" dirty="0" err="1"/>
+              <a:t>wsdl:types</a:t>
+            </a:r>
+            <a:r>
+              <a:rPr lang="pt-BR" sz="2400" dirty="0"/>
+              <a:t>&gt;</a:t>
+            </a:r>
+          </a:p>
+          <a:p>
+            <a:pPr marL="0" indent="0">
+              <a:buNone/>
+            </a:pPr>
+            <a:r>
+              <a:rPr lang="pt-BR" sz="2400" dirty="0"/>
+              <a:t>    &lt;</a:t>
+            </a:r>
+            <a:r>
+              <a:rPr lang="pt-BR" sz="2400" dirty="0" err="1"/>
+              <a:t>xs:schema</a:t>
+            </a:r>
+            <a:r>
+              <a:rPr lang="pt-BR" sz="2400" dirty="0"/>
+              <a:t>&gt;</a:t>
+            </a:r>
+          </a:p>
+          <a:p>
+            <a:pPr marL="0" indent="0">
+              <a:buNone/>
+            </a:pPr>
+            <a:r>
+              <a:rPr lang="pt-BR" sz="2400" dirty="0"/>
+              <a:t>        &lt;</a:t>
+            </a:r>
+            <a:r>
+              <a:rPr lang="pt-BR" sz="2400" dirty="0" err="1"/>
+              <a:t>xs:complexType</a:t>
+            </a:r>
+            <a:r>
+              <a:rPr lang="pt-BR" sz="2400" dirty="0"/>
+              <a:t> </a:t>
+            </a:r>
+            <a:r>
+              <a:rPr lang="pt-BR" sz="2400" dirty="0" err="1"/>
+              <a:t>name</a:t>
+            </a:r>
+            <a:r>
+              <a:rPr lang="pt-BR" sz="2400" dirty="0"/>
+              <a:t>="Produto"&gt;</a:t>
+            </a:r>
+          </a:p>
+          <a:p>
+            <a:pPr marL="0" indent="0">
+              <a:buNone/>
+            </a:pPr>
+            <a:r>
+              <a:rPr lang="pt-BR" sz="2400" dirty="0"/>
+              <a:t>            &lt;</a:t>
+            </a:r>
+            <a:r>
+              <a:rPr lang="pt-BR" sz="2400" dirty="0" err="1"/>
+              <a:t>xs:sequence</a:t>
+            </a:r>
+            <a:r>
+              <a:rPr lang="pt-BR" sz="2400" dirty="0"/>
+              <a:t>&gt;</a:t>
+            </a:r>
+          </a:p>
+          <a:p>
+            <a:pPr marL="0" indent="0">
+              <a:buNone/>
+            </a:pPr>
+            <a:r>
+              <a:rPr lang="pt-BR" sz="2400" dirty="0"/>
+              <a:t>                &lt;</a:t>
+            </a:r>
+            <a:r>
+              <a:rPr lang="pt-BR" sz="2400" dirty="0" err="1"/>
+              <a:t>xs:element</a:t>
+            </a:r>
+            <a:r>
+              <a:rPr lang="pt-BR" sz="2400" dirty="0"/>
+              <a:t> </a:t>
+            </a:r>
+            <a:r>
+              <a:rPr lang="pt-BR" sz="2400" dirty="0" err="1"/>
+              <a:t>name</a:t>
+            </a:r>
+            <a:r>
+              <a:rPr lang="pt-BR" sz="2400" dirty="0"/>
+              <a:t>="</a:t>
+            </a:r>
+            <a:r>
+              <a:rPr lang="pt-BR" sz="2400" dirty="0" err="1"/>
+              <a:t>descricao</a:t>
+            </a:r>
+            <a:r>
+              <a:rPr lang="pt-BR" sz="2400" dirty="0"/>
+              <a:t>" </a:t>
+            </a:r>
+            <a:r>
+              <a:rPr lang="pt-BR" sz="2400" dirty="0" err="1"/>
+              <a:t>type</a:t>
+            </a:r>
+            <a:r>
+              <a:rPr lang="pt-BR" sz="2400" dirty="0"/>
+              <a:t>="</a:t>
+            </a:r>
+            <a:r>
+              <a:rPr lang="pt-BR" sz="2400" dirty="0" err="1"/>
+              <a:t>xs:string</a:t>
+            </a:r>
+            <a:r>
+              <a:rPr lang="pt-BR" sz="2400" dirty="0"/>
+              <a:t>" /&gt;</a:t>
+            </a:r>
+          </a:p>
+          <a:p>
+            <a:pPr marL="0" indent="0">
+              <a:buNone/>
+            </a:pPr>
+            <a:r>
+              <a:rPr lang="pt-BR" sz="2400" dirty="0"/>
+              <a:t>                &lt;</a:t>
+            </a:r>
+            <a:r>
+              <a:rPr lang="pt-BR" sz="2400" dirty="0" err="1"/>
+              <a:t>xs:element</a:t>
+            </a:r>
+            <a:r>
+              <a:rPr lang="pt-BR" sz="2400" dirty="0"/>
+              <a:t> </a:t>
+            </a:r>
+            <a:r>
+              <a:rPr lang="pt-BR" sz="2400" dirty="0" err="1"/>
+              <a:t>name</a:t>
+            </a:r>
+            <a:r>
+              <a:rPr lang="pt-BR" sz="2400" dirty="0"/>
+              <a:t>="id" </a:t>
+            </a:r>
+            <a:r>
+              <a:rPr lang="pt-BR" sz="2400" dirty="0" err="1"/>
+              <a:t>type</a:t>
+            </a:r>
+            <a:r>
+              <a:rPr lang="pt-BR" sz="2400" dirty="0"/>
+              <a:t>="</a:t>
+            </a:r>
+            <a:r>
+              <a:rPr lang="pt-BR" sz="2400" dirty="0" err="1"/>
+              <a:t>xs:long</a:t>
+            </a:r>
+            <a:r>
+              <a:rPr lang="pt-BR" sz="2400" dirty="0"/>
+              <a:t>" /&gt;</a:t>
+            </a:r>
+          </a:p>
+          <a:p>
+            <a:pPr marL="0" indent="0">
+              <a:buNone/>
+            </a:pPr>
+            <a:r>
+              <a:rPr lang="pt-BR" sz="2400" dirty="0"/>
+              <a:t>                &lt;</a:t>
+            </a:r>
+            <a:r>
+              <a:rPr lang="pt-BR" sz="2400" dirty="0" err="1"/>
+              <a:t>xs:element</a:t>
+            </a:r>
+            <a:r>
+              <a:rPr lang="pt-BR" sz="2400" dirty="0"/>
+              <a:t> </a:t>
+            </a:r>
+            <a:r>
+              <a:rPr lang="pt-BR" sz="2400" dirty="0" err="1"/>
+              <a:t>name</a:t>
+            </a:r>
+            <a:r>
+              <a:rPr lang="pt-BR" sz="2400" dirty="0"/>
+              <a:t>="marca" </a:t>
+            </a:r>
+            <a:r>
+              <a:rPr lang="pt-BR" sz="2400" dirty="0" err="1"/>
+              <a:t>type</a:t>
+            </a:r>
+            <a:r>
+              <a:rPr lang="pt-BR" sz="2400" dirty="0"/>
+              <a:t>="</a:t>
+            </a:r>
+            <a:r>
+              <a:rPr lang="pt-BR" sz="2400" dirty="0" err="1"/>
+              <a:t>tns:marca</a:t>
+            </a:r>
+            <a:r>
+              <a:rPr lang="pt-BR" sz="2400" dirty="0"/>
+              <a:t>" /&gt;</a:t>
+            </a:r>
+          </a:p>
+          <a:p>
+            <a:pPr marL="0" indent="0">
+              <a:buNone/>
+            </a:pPr>
+            <a:r>
+              <a:rPr lang="pt-BR" sz="2400" dirty="0"/>
+              <a:t>            &lt;/</a:t>
+            </a:r>
+            <a:r>
+              <a:rPr lang="pt-BR" sz="2400" dirty="0" err="1"/>
+              <a:t>xs:sequence</a:t>
+            </a:r>
+            <a:r>
+              <a:rPr lang="pt-BR" sz="2400" dirty="0"/>
+              <a:t>&gt;</a:t>
+            </a:r>
+          </a:p>
+          <a:p>
+            <a:pPr marL="0" indent="0">
+              <a:buNone/>
+            </a:pPr>
+            <a:r>
+              <a:rPr lang="pt-BR" sz="2400" dirty="0"/>
+              <a:t>        &lt;/</a:t>
+            </a:r>
+            <a:r>
+              <a:rPr lang="pt-BR" sz="2400" dirty="0" err="1"/>
+              <a:t>xs:complexType</a:t>
+            </a:r>
+            <a:r>
+              <a:rPr lang="pt-BR" sz="2400" dirty="0"/>
+              <a:t>&gt;    </a:t>
+            </a:r>
+          </a:p>
+          <a:p>
+            <a:pPr marL="0" indent="0">
+              <a:buNone/>
+            </a:pPr>
+            <a:r>
+              <a:rPr lang="pt-BR" sz="2400" dirty="0"/>
+              <a:t>    &lt;/</a:t>
+            </a:r>
+            <a:r>
+              <a:rPr lang="pt-BR" sz="2400" dirty="0" err="1"/>
+              <a:t>xs:schema</a:t>
+            </a:r>
+            <a:r>
+              <a:rPr lang="pt-BR" sz="2400" dirty="0"/>
+              <a:t>&gt;</a:t>
+            </a:r>
+          </a:p>
+          <a:p>
+            <a:pPr marL="0" indent="0">
+              <a:buNone/>
+            </a:pPr>
+            <a:r>
+              <a:rPr lang="pt-BR" sz="2400" dirty="0"/>
+              <a:t>&lt;/</a:t>
+            </a:r>
+            <a:r>
+              <a:rPr lang="pt-BR" sz="2400" dirty="0" err="1"/>
+              <a:t>wsdl:types</a:t>
+            </a:r>
+            <a:r>
+              <a:rPr lang="pt-BR" sz="2400" dirty="0"/>
+              <a:t>&gt;</a:t>
+            </a:r>
+          </a:p>
+        </p:txBody>
+      </p:sp>
+      <p:sp>
+        <p:nvSpPr>
+          <p:cNvPr id="7" name="Title 1">
+            <a:extLst>
+              <a:ext uri="{FF2B5EF4-FFF2-40B4-BE49-F238E27FC236}">
+                <a16:creationId xmlns:a16="http://schemas.microsoft.com/office/drawing/2014/main" id="{B7621E9A-A403-2E4F-903F-60CBC83A635F}"/>
+              </a:ext>
+            </a:extLst>
+          </p:cNvPr>
+          <p:cNvSpPr>
+            <a:spLocks noGrp="1"/>
+          </p:cNvSpPr>
+          <p:nvPr>
+            <p:ph type="title"/>
+          </p:nvPr>
+        </p:nvSpPr>
+        <p:spPr>
+          <a:xfrm>
+            <a:off x="4358009" y="297521"/>
+            <a:ext cx="7574160" cy="1164933"/>
+          </a:xfrm>
+        </p:spPr>
+        <p:txBody>
+          <a:bodyPr>
+            <a:normAutofit fontScale="90000"/>
+          </a:bodyPr>
+          <a:lstStyle/>
+          <a:p>
+            <a:pPr algn="ctr"/>
+            <a:r>
+              <a:rPr lang="pt-BR" b="1" i="1" dirty="0"/>
+              <a:t>Exemplo de trechos </a:t>
+            </a:r>
+            <a:r>
+              <a:rPr lang="pt-BR" b="1" i="1" dirty="0" err="1"/>
+              <a:t>wsdl</a:t>
+            </a:r>
+            <a:r>
+              <a:rPr lang="pt-BR" b="1" i="1" dirty="0"/>
+              <a:t>:</a:t>
+            </a:r>
+            <a:br>
+              <a:rPr lang="pt-BR" b="1" i="1" dirty="0"/>
+            </a:br>
+            <a:r>
+              <a:rPr lang="pt-BR" b="1" i="1" dirty="0"/>
+              <a:t>tipos com </a:t>
+            </a:r>
+            <a:r>
+              <a:rPr lang="pt-BR" b="1" i="1" dirty="0" err="1"/>
+              <a:t>Xml</a:t>
+            </a:r>
+            <a:r>
+              <a:rPr lang="pt-BR" b="1" i="1" dirty="0"/>
+              <a:t> </a:t>
+            </a:r>
+            <a:r>
+              <a:rPr lang="pt-BR" b="1" i="1" dirty="0" err="1"/>
+              <a:t>Schema</a:t>
+            </a:r>
+            <a:r>
+              <a:rPr lang="pt-BR" b="1" i="1" dirty="0"/>
+              <a:t> (</a:t>
+            </a:r>
+            <a:r>
+              <a:rPr lang="pt-BR" b="1" i="1" dirty="0" err="1"/>
+              <a:t>xsd</a:t>
+            </a:r>
+            <a:r>
+              <a:rPr lang="pt-BR" b="1" i="1" dirty="0"/>
+              <a:t>)</a:t>
+            </a:r>
+            <a:endParaRPr lang="pt-BR" dirty="0"/>
+          </a:p>
+        </p:txBody>
+      </p:sp>
+    </p:spTree>
+    <p:extLst>
+      <p:ext uri="{BB962C8B-B14F-4D97-AF65-F5344CB8AC3E}">
+        <p14:creationId xmlns:p14="http://schemas.microsoft.com/office/powerpoint/2010/main" val="3969677168"/>
+      </p:ext>
+    </p:extLst>
+  </p:cSld>
+  <p:clrMapOvr>
+    <a:masterClrMapping/>
+  </p:clrMapOvr>
+  <p:timing>
+    <p:tnLst>
+      <p:par>
+        <p:cTn id="1" dur="indefinite" restart="never" nodeType="tmRoot">
+          <p:childTnLst>
+            <p:seq concurrent="1" nextAc="seek">
+              <p:cTn id="2" dur="indefinite" nodeType="mainSeq">
+                <p:childTnLst>
+                  <p:par>
+                    <p:cTn id="3" fill="hold">
+                      <p:stCondLst>
+                        <p:cond delay="indefinite"/>
+                      </p:stCondLst>
+                      <p:childTnLst>
+                        <p:par>
+                          <p:cTn id="4" fill="hold">
+                            <p:stCondLst>
+                              <p:cond delay="0"/>
+                            </p:stCondLst>
+                            <p:childTnLst>
+                              <p:par>
+                                <p:cTn id="5" presetID="9" presetClass="entr" presetSubtype="0" fill="hold" grpId="0" nodeType="clickEffect">
+                                  <p:stCondLst>
+                                    <p:cond delay="0"/>
+                                  </p:stCondLst>
+                                  <p:childTnLst>
+                                    <p:set>
+                                      <p:cBhvr>
+                                        <p:cTn id="6" dur="1" fill="hold">
+                                          <p:stCondLst>
+                                            <p:cond delay="0"/>
+                                          </p:stCondLst>
+                                        </p:cTn>
+                                        <p:tgtEl>
+                                          <p:spTgt spid="3"/>
+                                        </p:tgtEl>
+                                        <p:attrNameLst>
+                                          <p:attrName>style.visibility</p:attrName>
+                                        </p:attrNameLst>
+                                      </p:cBhvr>
+                                      <p:to>
+                                        <p:strVal val="visible"/>
+                                      </p:to>
+                                    </p:set>
+                                    <p:animEffect transition="in" filter="dissolve">
+                                      <p:cBhvr>
+                                        <p:cTn id="7" dur="500"/>
+                                        <p:tgtEl>
+                                          <p:spTgt spid="3"/>
+                                        </p:tgtEl>
+                                      </p:cBhvr>
+                                    </p:animEffect>
+                                  </p:childTnLst>
+                                </p:cTn>
+                              </p:par>
+                            </p:childTnLst>
+                          </p:cTn>
+                        </p:par>
+                      </p:childTnLst>
+                    </p:cTn>
+                  </p:par>
+                </p:childTnLst>
+              </p:cTn>
+              <p:prevCondLst>
+                <p:cond evt="onPrev" delay="0">
+                  <p:tgtEl>
+                    <p:sldTgt/>
+                  </p:tgtEl>
+                </p:cond>
+              </p:prevCondLst>
+              <p:nextCondLst>
+                <p:cond evt="onNext" delay="0">
+                  <p:tgtEl>
+                    <p:sldTgt/>
+                  </p:tgtEl>
+                </p:cond>
+              </p:nextCondLst>
+            </p:seq>
+          </p:childTnLst>
+        </p:cTn>
+      </p:par>
+    </p:tnLst>
+    <p:bldLst>
+      <p:bldP spid="3" grpId="0"/>
+    </p:bldLst>
+  </p:timing>
+</p:sld>
+</file>
+
+<file path=ppt/slides/slide28.xml><?xml version="1.0" encoding="utf-8"?>
+<p:sld xmlns:a="http://schemas.openxmlformats.org/drawingml/2006/main" xmlns:r="http://schemas.openxmlformats.org/officeDocument/2006/relationships" xmlns:p="http://schemas.openxmlformats.org/presentationml/2006/main">
+  <p:cSld>
+    <p:spTree>
+      <p:nvGrpSpPr>
+        <p:cNvPr id="1" name=""/>
+        <p:cNvGrpSpPr/>
+        <p:nvPr/>
+      </p:nvGrpSpPr>
+      <p:grpSpPr>
+        <a:xfrm>
+          <a:off x="0" y="0"/>
+          <a:ext cx="0" cy="0"/>
+          <a:chOff x="0" y="0"/>
+          <a:chExt cx="0" cy="0"/>
+        </a:xfrm>
+      </p:grpSpPr>
+      <p:sp>
+        <p:nvSpPr>
+          <p:cNvPr id="5" name="Content Placeholder 2">
+            <a:extLst>
+              <a:ext uri="{FF2B5EF4-FFF2-40B4-BE49-F238E27FC236}">
+                <a16:creationId xmlns:a16="http://schemas.microsoft.com/office/drawing/2014/main" id="{1CAD11D0-A923-A64D-8445-272B32CDC4E1}"/>
+              </a:ext>
+            </a:extLst>
+          </p:cNvPr>
+          <p:cNvSpPr txBox="1">
+            <a:spLocks/>
+          </p:cNvSpPr>
+          <p:nvPr/>
+        </p:nvSpPr>
+        <p:spPr>
+          <a:xfrm>
+            <a:off x="0" y="1627345"/>
+            <a:ext cx="12191999" cy="5223158"/>
+          </a:xfrm>
+          <a:prstGeom prst="rect">
+            <a:avLst/>
+          </a:prstGeom>
+        </p:spPr>
+        <p:txBody>
+          <a:bodyPr vert="horz" lIns="91440" tIns="45720" rIns="91440" bIns="45720" rtlCol="0">
+            <a:noAutofit/>
+          </a:bodyPr>
+          <a:lstStyle>
+            <a:lvl1pPr marL="228600" indent="-228600" algn="l" defTabSz="914400" rtl="0" eaLnBrk="1" latinLnBrk="0" hangingPunct="1">
+              <a:lnSpc>
+                <a:spcPct val="90000"/>
+              </a:lnSpc>
+              <a:spcBef>
+                <a:spcPts val="1000"/>
+              </a:spcBef>
+              <a:buFont typeface="Arial" panose="020B0604020202020204" pitchFamily="34" charset="0"/>
+              <a:buChar char="•"/>
+              <a:defRPr sz="2200" kern="1200">
+                <a:solidFill>
+                  <a:schemeClr val="tx1"/>
+                </a:solidFill>
+                <a:latin typeface="+mn-lt"/>
+                <a:ea typeface="+mn-ea"/>
+                <a:cs typeface="+mn-cs"/>
+              </a:defRPr>
+            </a:lvl1pPr>
+            <a:lvl2pPr marL="685800" indent="-228600" algn="l" defTabSz="914400" rtl="0" eaLnBrk="1" latinLnBrk="0" hangingPunct="1">
+              <a:lnSpc>
+                <a:spcPct val="90000"/>
+              </a:lnSpc>
+              <a:spcBef>
+                <a:spcPts val="500"/>
+              </a:spcBef>
+              <a:buFont typeface="Arial" panose="020B0604020202020204" pitchFamily="34" charset="0"/>
+              <a:buChar char="•"/>
+              <a:defRPr sz="2000" kern="1200">
+                <a:solidFill>
+                  <a:schemeClr val="tx1"/>
+                </a:solidFill>
+                <a:latin typeface="+mn-lt"/>
+                <a:ea typeface="+mn-ea"/>
+                <a:cs typeface="+mn-cs"/>
+              </a:defRPr>
+            </a:lvl2pPr>
+            <a:lvl3pPr marL="1143000" indent="-228600" algn="l" defTabSz="914400" rtl="0" eaLnBrk="1" latinLnBrk="0" hangingPunct="1">
+              <a:lnSpc>
+                <a:spcPct val="90000"/>
+              </a:lnSpc>
+              <a:spcBef>
+                <a:spcPts val="500"/>
+              </a:spcBef>
+              <a:buFont typeface="Arial" panose="020B0604020202020204" pitchFamily="34" charset="0"/>
+              <a:buChar char="•"/>
+              <a:defRPr sz="1800" kern="1200">
+                <a:solidFill>
+                  <a:schemeClr val="tx1"/>
+                </a:solidFill>
+                <a:latin typeface="+mn-lt"/>
+                <a:ea typeface="+mn-ea"/>
+                <a:cs typeface="+mn-cs"/>
+              </a:defRPr>
+            </a:lvl3pPr>
+            <a:lvl4pPr marL="1600200" indent="-228600" algn="l" defTabSz="914400" rtl="0" eaLnBrk="1" latinLnBrk="0" hangingPunct="1">
+              <a:lnSpc>
+                <a:spcPct val="90000"/>
+              </a:lnSpc>
+              <a:spcBef>
+                <a:spcPts val="500"/>
+              </a:spcBef>
+              <a:buFont typeface="Arial" panose="020B0604020202020204" pitchFamily="34" charset="0"/>
+              <a:buChar char="•"/>
+              <a:defRPr sz="1600" kern="1200">
+                <a:solidFill>
+                  <a:schemeClr val="tx1"/>
+                </a:solidFill>
+                <a:latin typeface="+mn-lt"/>
+                <a:ea typeface="+mn-ea"/>
+                <a:cs typeface="+mn-cs"/>
+              </a:defRPr>
+            </a:lvl4pPr>
+            <a:lvl5pPr marL="2057400" indent="-228600" algn="l" defTabSz="914400" rtl="0" eaLnBrk="1" latinLnBrk="0" hangingPunct="1">
+              <a:lnSpc>
+                <a:spcPct val="90000"/>
+              </a:lnSpc>
+              <a:spcBef>
+                <a:spcPts val="500"/>
+              </a:spcBef>
+              <a:buFont typeface="Arial" panose="020B0604020202020204" pitchFamily="34" charset="0"/>
+              <a:buChar char="•"/>
+              <a:defRPr sz="1600" kern="1200">
+                <a:solidFill>
+                  <a:schemeClr val="tx1"/>
+                </a:solidFill>
+                <a:latin typeface="+mn-lt"/>
+                <a:ea typeface="+mn-ea"/>
+                <a:cs typeface="+mn-cs"/>
+              </a:defRPr>
+            </a:lvl5pPr>
+            <a:lvl6pPr marL="2514600" indent="-228600" algn="l" defTabSz="914400" rtl="0" eaLnBrk="1" latinLnBrk="0" hangingPunct="1">
+              <a:lnSpc>
+                <a:spcPct val="90000"/>
+              </a:lnSpc>
+              <a:spcBef>
+                <a:spcPts val="500"/>
+              </a:spcBef>
+              <a:buFont typeface="Arial" panose="020B0604020202020204" pitchFamily="34" charset="0"/>
+              <a:buChar char="•"/>
+              <a:defRPr sz="1600" kern="1200">
+                <a:solidFill>
+                  <a:schemeClr val="tx1"/>
+                </a:solidFill>
+                <a:latin typeface="+mn-lt"/>
+                <a:ea typeface="+mn-ea"/>
+                <a:cs typeface="+mn-cs"/>
+              </a:defRPr>
+            </a:lvl6pPr>
+            <a:lvl7pPr marL="2971800" indent="-228600" algn="l" defTabSz="914400" rtl="0" eaLnBrk="1" latinLnBrk="0" hangingPunct="1">
+              <a:lnSpc>
+                <a:spcPct val="90000"/>
+              </a:lnSpc>
+              <a:spcBef>
+                <a:spcPts val="500"/>
+              </a:spcBef>
+              <a:buFont typeface="Arial" panose="020B0604020202020204" pitchFamily="34" charset="0"/>
+              <a:buChar char="•"/>
+              <a:defRPr sz="1600" kern="1200">
+                <a:solidFill>
+                  <a:schemeClr val="tx1"/>
+                </a:solidFill>
+                <a:latin typeface="+mn-lt"/>
+                <a:ea typeface="+mn-ea"/>
+                <a:cs typeface="+mn-cs"/>
+              </a:defRPr>
+            </a:lvl7pPr>
+            <a:lvl8pPr marL="3429000" indent="-228600" algn="l" defTabSz="914400" rtl="0" eaLnBrk="1" latinLnBrk="0" hangingPunct="1">
+              <a:lnSpc>
+                <a:spcPct val="90000"/>
+              </a:lnSpc>
+              <a:spcBef>
+                <a:spcPts val="500"/>
+              </a:spcBef>
+              <a:buFont typeface="Arial" panose="020B0604020202020204" pitchFamily="34" charset="0"/>
+              <a:buChar char="•"/>
+              <a:defRPr sz="1600" kern="1200">
+                <a:solidFill>
+                  <a:schemeClr val="tx1"/>
+                </a:solidFill>
+                <a:latin typeface="+mn-lt"/>
+                <a:ea typeface="+mn-ea"/>
+                <a:cs typeface="+mn-cs"/>
+              </a:defRPr>
+            </a:lvl8pPr>
+            <a:lvl9pPr marL="3886200" indent="-228600" algn="l" defTabSz="914400" rtl="0" eaLnBrk="1" latinLnBrk="0" hangingPunct="1">
+              <a:lnSpc>
+                <a:spcPct val="90000"/>
+              </a:lnSpc>
+              <a:spcBef>
+                <a:spcPts val="500"/>
+              </a:spcBef>
+              <a:buFont typeface="Arial" panose="020B0604020202020204" pitchFamily="34" charset="0"/>
+              <a:buChar char="•"/>
+              <a:defRPr sz="1600" kern="1200">
+                <a:solidFill>
+                  <a:schemeClr val="tx1"/>
+                </a:solidFill>
+                <a:latin typeface="+mn-lt"/>
+                <a:ea typeface="+mn-ea"/>
+                <a:cs typeface="+mn-cs"/>
+              </a:defRPr>
+            </a:lvl9pPr>
+          </a:lstStyle>
+          <a:p>
+            <a:pPr marL="0" indent="0">
+              <a:buFont typeface="Arial" panose="020B0604020202020204" pitchFamily="34" charset="0"/>
+              <a:buNone/>
+            </a:pPr>
+            <a:r>
+              <a:rPr lang="pt-BR" dirty="0"/>
+              <a:t>&lt;</a:t>
+            </a:r>
+            <a:r>
+              <a:rPr lang="pt-BR" dirty="0" err="1"/>
+              <a:t>message</a:t>
+            </a:r>
+            <a:r>
+              <a:rPr lang="pt-BR" dirty="0"/>
+              <a:t> </a:t>
+            </a:r>
+            <a:r>
+              <a:rPr lang="pt-BR" dirty="0" err="1"/>
+              <a:t>name</a:t>
+            </a:r>
+            <a:r>
+              <a:rPr lang="pt-BR" dirty="0"/>
+              <a:t>="</a:t>
+            </a:r>
+            <a:r>
+              <a:rPr lang="pt-BR" dirty="0" err="1"/>
+              <a:t>getById</a:t>
+            </a:r>
+            <a:r>
+              <a:rPr lang="pt-BR" dirty="0"/>
+              <a:t>"&gt;</a:t>
+            </a:r>
+          </a:p>
+          <a:p>
+            <a:pPr marL="0" indent="0">
+              <a:buFont typeface="Arial" panose="020B0604020202020204" pitchFamily="34" charset="0"/>
+              <a:buNone/>
+            </a:pPr>
+            <a:r>
+              <a:rPr lang="pt-BR" dirty="0"/>
+              <a:t>    &lt;</a:t>
+            </a:r>
+            <a:r>
+              <a:rPr lang="pt-BR" dirty="0" err="1"/>
+              <a:t>part</a:t>
+            </a:r>
+            <a:r>
+              <a:rPr lang="pt-BR" dirty="0"/>
+              <a:t> </a:t>
+            </a:r>
+            <a:r>
+              <a:rPr lang="pt-BR" dirty="0" err="1"/>
+              <a:t>name</a:t>
+            </a:r>
+            <a:r>
+              <a:rPr lang="pt-BR" dirty="0"/>
+              <a:t>="id" </a:t>
+            </a:r>
+            <a:r>
+              <a:rPr lang="pt-BR" dirty="0" err="1"/>
+              <a:t>type</a:t>
+            </a:r>
+            <a:r>
+              <a:rPr lang="pt-BR" dirty="0"/>
+              <a:t>="</a:t>
+            </a:r>
+            <a:r>
+              <a:rPr lang="pt-BR" dirty="0" err="1"/>
+              <a:t>xs:long</a:t>
+            </a:r>
+            <a:r>
+              <a:rPr lang="pt-BR" dirty="0"/>
+              <a:t>"/&gt;</a:t>
+            </a:r>
+          </a:p>
+          <a:p>
+            <a:pPr marL="0" indent="0">
+              <a:buFont typeface="Arial" panose="020B0604020202020204" pitchFamily="34" charset="0"/>
+              <a:buNone/>
+            </a:pPr>
+            <a:r>
+              <a:rPr lang="pt-BR" dirty="0"/>
+              <a:t>&lt;/</a:t>
+            </a:r>
+            <a:r>
+              <a:rPr lang="pt-BR" dirty="0" err="1"/>
+              <a:t>message</a:t>
+            </a:r>
+            <a:r>
+              <a:rPr lang="pt-BR" dirty="0"/>
+              <a:t>&gt;</a:t>
+            </a:r>
+          </a:p>
+          <a:p>
+            <a:pPr marL="0" indent="0">
+              <a:buFont typeface="Arial" panose="020B0604020202020204" pitchFamily="34" charset="0"/>
+              <a:buNone/>
+            </a:pPr>
+            <a:r>
+              <a:rPr lang="pt-BR" dirty="0"/>
+              <a:t>&lt;</a:t>
+            </a:r>
+            <a:r>
+              <a:rPr lang="pt-BR" dirty="0" err="1"/>
+              <a:t>message</a:t>
+            </a:r>
+            <a:r>
+              <a:rPr lang="pt-BR" dirty="0"/>
+              <a:t> </a:t>
+            </a:r>
+            <a:r>
+              <a:rPr lang="pt-BR" dirty="0" err="1"/>
+              <a:t>name</a:t>
+            </a:r>
+            <a:r>
+              <a:rPr lang="pt-BR" dirty="0"/>
+              <a:t>="</a:t>
+            </a:r>
+            <a:r>
+              <a:rPr lang="pt-BR" dirty="0" err="1"/>
+              <a:t>getByIdRes</a:t>
+            </a:r>
+            <a:r>
+              <a:rPr lang="pt-BR" dirty="0"/>
+              <a:t>"&gt;</a:t>
+            </a:r>
+          </a:p>
+          <a:p>
+            <a:pPr marL="0" indent="0">
+              <a:buFont typeface="Arial" panose="020B0604020202020204" pitchFamily="34" charset="0"/>
+              <a:buNone/>
+            </a:pPr>
+            <a:r>
+              <a:rPr lang="pt-BR" dirty="0"/>
+              <a:t>    &lt;</a:t>
+            </a:r>
+            <a:r>
+              <a:rPr lang="pt-BR" dirty="0" err="1"/>
+              <a:t>part</a:t>
+            </a:r>
+            <a:r>
+              <a:rPr lang="pt-BR" dirty="0"/>
+              <a:t> </a:t>
+            </a:r>
+            <a:r>
+              <a:rPr lang="pt-BR" dirty="0" err="1"/>
+              <a:t>name</a:t>
+            </a:r>
+            <a:r>
+              <a:rPr lang="pt-BR" dirty="0"/>
+              <a:t>="</a:t>
+            </a:r>
+            <a:r>
+              <a:rPr lang="pt-BR" dirty="0" err="1"/>
+              <a:t>return</a:t>
+            </a:r>
+            <a:r>
+              <a:rPr lang="pt-BR" dirty="0"/>
+              <a:t>" </a:t>
+            </a:r>
+            <a:r>
+              <a:rPr lang="pt-BR" dirty="0" err="1"/>
+              <a:t>type</a:t>
+            </a:r>
+            <a:r>
+              <a:rPr lang="pt-BR" dirty="0"/>
+              <a:t>="</a:t>
+            </a:r>
+            <a:r>
+              <a:rPr lang="pt-BR" dirty="0" err="1"/>
+              <a:t>tns:Produto</a:t>
+            </a:r>
+            <a:r>
+              <a:rPr lang="pt-BR" dirty="0"/>
+              <a:t>"/&gt;</a:t>
+            </a:r>
+          </a:p>
+          <a:p>
+            <a:pPr marL="0" indent="0">
+              <a:buFont typeface="Arial" panose="020B0604020202020204" pitchFamily="34" charset="0"/>
+              <a:buNone/>
+            </a:pPr>
+            <a:r>
+              <a:rPr lang="pt-BR" dirty="0"/>
+              <a:t>&lt;/</a:t>
+            </a:r>
+            <a:r>
+              <a:rPr lang="pt-BR" dirty="0" err="1"/>
+              <a:t>message</a:t>
+            </a:r>
+            <a:r>
+              <a:rPr lang="pt-BR" dirty="0"/>
+              <a:t>&gt;</a:t>
+            </a:r>
+          </a:p>
+          <a:p>
+            <a:pPr marL="0" indent="0">
+              <a:buFont typeface="Arial" panose="020B0604020202020204" pitchFamily="34" charset="0"/>
+              <a:buNone/>
+            </a:pPr>
+            <a:r>
+              <a:rPr lang="pt-BR" dirty="0"/>
+              <a:t>&lt;</a:t>
+            </a:r>
+            <a:r>
+              <a:rPr lang="pt-BR" dirty="0" err="1"/>
+              <a:t>portType</a:t>
+            </a:r>
+            <a:r>
+              <a:rPr lang="pt-BR" dirty="0"/>
+              <a:t> </a:t>
+            </a:r>
+            <a:r>
+              <a:rPr lang="pt-BR" dirty="0" err="1"/>
+              <a:t>name</a:t>
+            </a:r>
+            <a:r>
+              <a:rPr lang="pt-BR" dirty="0"/>
+              <a:t>=”Produtos"&gt;</a:t>
+            </a:r>
+          </a:p>
+          <a:p>
+            <a:pPr marL="0" indent="0">
+              <a:buFont typeface="Arial" panose="020B0604020202020204" pitchFamily="34" charset="0"/>
+              <a:buNone/>
+            </a:pPr>
+            <a:r>
+              <a:rPr lang="pt-BR" dirty="0"/>
+              <a:t>    &lt;</a:t>
+            </a:r>
+            <a:r>
+              <a:rPr lang="pt-BR" dirty="0" err="1"/>
+              <a:t>operation</a:t>
+            </a:r>
+            <a:r>
+              <a:rPr lang="pt-BR" dirty="0"/>
+              <a:t> </a:t>
+            </a:r>
+            <a:r>
+              <a:rPr lang="pt-BR" dirty="0" err="1"/>
+              <a:t>name</a:t>
+            </a:r>
+            <a:r>
+              <a:rPr lang="pt-BR" dirty="0"/>
+              <a:t>="</a:t>
+            </a:r>
+            <a:r>
+              <a:rPr lang="pt-BR" dirty="0" err="1"/>
+              <a:t>getById</a:t>
+            </a:r>
+            <a:r>
+              <a:rPr lang="pt-BR" dirty="0"/>
+              <a:t>"&gt;</a:t>
+            </a:r>
+          </a:p>
+          <a:p>
+            <a:pPr marL="0" indent="0">
+              <a:buFont typeface="Arial" panose="020B0604020202020204" pitchFamily="34" charset="0"/>
+              <a:buNone/>
+            </a:pPr>
+            <a:r>
+              <a:rPr lang="pt-BR" dirty="0"/>
+              <a:t>        &lt;input </a:t>
+            </a:r>
+            <a:r>
+              <a:rPr lang="pt-BR" dirty="0" err="1"/>
+              <a:t>wsam:Action</a:t>
+            </a:r>
+            <a:r>
+              <a:rPr lang="pt-BR" dirty="0"/>
+              <a:t>="</a:t>
+            </a:r>
+            <a:r>
+              <a:rPr lang="pt-BR" dirty="0" err="1"/>
+              <a:t>http</a:t>
+            </a:r>
+            <a:r>
+              <a:rPr lang="pt-BR" dirty="0"/>
+              <a:t>://.../Produtos/</a:t>
+            </a:r>
+            <a:r>
+              <a:rPr lang="pt-BR" dirty="0" err="1"/>
+              <a:t>getByIdReq</a:t>
+            </a:r>
+            <a:r>
+              <a:rPr lang="pt-BR" dirty="0"/>
+              <a:t>" </a:t>
+            </a:r>
+            <a:r>
+              <a:rPr lang="pt-BR" dirty="0" err="1"/>
+              <a:t>message</a:t>
+            </a:r>
+            <a:r>
+              <a:rPr lang="pt-BR" dirty="0"/>
+              <a:t>="</a:t>
+            </a:r>
+            <a:r>
+              <a:rPr lang="pt-BR" dirty="0" err="1"/>
+              <a:t>tns:getById</a:t>
+            </a:r>
+            <a:r>
+              <a:rPr lang="pt-BR" dirty="0"/>
+              <a:t>"/&gt;</a:t>
+            </a:r>
+          </a:p>
+          <a:p>
+            <a:pPr marL="0" indent="0">
+              <a:buFont typeface="Arial" panose="020B0604020202020204" pitchFamily="34" charset="0"/>
+              <a:buNone/>
+            </a:pPr>
+            <a:r>
+              <a:rPr lang="pt-BR" dirty="0"/>
+              <a:t>        &lt;output </a:t>
+            </a:r>
+            <a:r>
+              <a:rPr lang="pt-BR" dirty="0" err="1"/>
+              <a:t>wsam:Action</a:t>
+            </a:r>
+            <a:r>
+              <a:rPr lang="pt-BR" dirty="0"/>
+              <a:t>="</a:t>
+            </a:r>
+            <a:r>
+              <a:rPr lang="pt-BR" dirty="0" err="1"/>
+              <a:t>http</a:t>
+            </a:r>
+            <a:r>
+              <a:rPr lang="pt-BR" dirty="0"/>
+              <a:t>://.../Produtos/</a:t>
+            </a:r>
+            <a:r>
+              <a:rPr lang="pt-BR" dirty="0" err="1"/>
+              <a:t>getByIdRes</a:t>
+            </a:r>
+            <a:r>
+              <a:rPr lang="pt-BR" dirty="0"/>
+              <a:t>" </a:t>
+            </a:r>
+            <a:r>
+              <a:rPr lang="pt-BR" dirty="0" err="1"/>
+              <a:t>message</a:t>
+            </a:r>
+            <a:r>
+              <a:rPr lang="pt-BR" dirty="0"/>
+              <a:t>="</a:t>
+            </a:r>
+            <a:r>
+              <a:rPr lang="pt-BR" dirty="0" err="1"/>
+              <a:t>tns:getByIdResp</a:t>
+            </a:r>
+            <a:r>
+              <a:rPr lang="pt-BR" dirty="0"/>
+              <a:t>"/&gt;</a:t>
+            </a:r>
+          </a:p>
+          <a:p>
+            <a:pPr marL="0" indent="0">
+              <a:buFont typeface="Arial" panose="020B0604020202020204" pitchFamily="34" charset="0"/>
+              <a:buNone/>
+            </a:pPr>
+            <a:r>
+              <a:rPr lang="pt-BR" dirty="0"/>
+              <a:t>    &lt;/</a:t>
+            </a:r>
+            <a:r>
+              <a:rPr lang="pt-BR" dirty="0" err="1"/>
+              <a:t>operation</a:t>
+            </a:r>
+            <a:r>
+              <a:rPr lang="pt-BR" dirty="0"/>
+              <a:t>&gt;</a:t>
+            </a:r>
+          </a:p>
+          <a:p>
+            <a:pPr marL="0" indent="0">
+              <a:buFont typeface="Arial" panose="020B0604020202020204" pitchFamily="34" charset="0"/>
+              <a:buNone/>
+            </a:pPr>
+            <a:r>
+              <a:rPr lang="pt-BR" dirty="0"/>
+              <a:t>&lt;/</a:t>
+            </a:r>
+            <a:r>
+              <a:rPr lang="pt-BR" dirty="0" err="1"/>
+              <a:t>portType</a:t>
+            </a:r>
+            <a:r>
+              <a:rPr lang="pt-BR" dirty="0"/>
+              <a:t>&gt;</a:t>
+            </a:r>
+          </a:p>
+        </p:txBody>
+      </p:sp>
+      <p:sp>
+        <p:nvSpPr>
+          <p:cNvPr id="10" name="Title 1">
+            <a:extLst>
+              <a:ext uri="{FF2B5EF4-FFF2-40B4-BE49-F238E27FC236}">
+                <a16:creationId xmlns:a16="http://schemas.microsoft.com/office/drawing/2014/main" id="{76185517-4F29-0E40-AA8A-5F2EE3196D8C}"/>
+              </a:ext>
+            </a:extLst>
+          </p:cNvPr>
+          <p:cNvSpPr>
+            <a:spLocks noGrp="1"/>
+          </p:cNvSpPr>
+          <p:nvPr>
+            <p:ph type="title"/>
+          </p:nvPr>
+        </p:nvSpPr>
+        <p:spPr>
+          <a:xfrm>
+            <a:off x="4358009" y="289917"/>
+            <a:ext cx="7574160" cy="1164933"/>
+          </a:xfrm>
+        </p:spPr>
+        <p:txBody>
+          <a:bodyPr>
+            <a:normAutofit fontScale="90000"/>
+          </a:bodyPr>
+          <a:lstStyle/>
+          <a:p>
+            <a:pPr algn="ctr"/>
+            <a:r>
+              <a:rPr lang="pt-BR" b="1" i="1" dirty="0"/>
+              <a:t>Exemplo de trechos </a:t>
+            </a:r>
+            <a:r>
+              <a:rPr lang="pt-BR" b="1" i="1" dirty="0" err="1"/>
+              <a:t>wsdl</a:t>
+            </a:r>
+            <a:br>
+              <a:rPr lang="pt-BR" b="1" i="1" dirty="0"/>
+            </a:br>
+            <a:r>
+              <a:rPr lang="pt-BR" b="1" i="1" dirty="0"/>
+              <a:t>métodos publicados</a:t>
+            </a:r>
+            <a:endParaRPr lang="pt-BR" dirty="0"/>
+          </a:p>
+        </p:txBody>
+      </p:sp>
+    </p:spTree>
+    <p:extLst>
+      <p:ext uri="{BB962C8B-B14F-4D97-AF65-F5344CB8AC3E}">
+        <p14:creationId xmlns:p14="http://schemas.microsoft.com/office/powerpoint/2010/main" val="3940910558"/>
+      </p:ext>
+    </p:extLst>
+  </p:cSld>
+  <p:clrMapOvr>
+    <a:masterClrMapping/>
+  </p:clrMapOvr>
+  <p:timing>
+    <p:tnLst>
+      <p:par>
+        <p:cTn id="1" dur="indefinite" restart="never" nodeType="tmRoot">
+          <p:childTnLst>
+            <p:seq concurrent="1" nextAc="seek">
+              <p:cTn id="2" dur="indefinite" nodeType="mainSeq">
+                <p:childTnLst>
+                  <p:par>
+                    <p:cTn id="3" fill="hold">
+                      <p:stCondLst>
+                        <p:cond delay="indefinite"/>
+                        <p:cond evt="onBegin" delay="0">
+                          <p:tn val="2"/>
+                        </p:cond>
+                      </p:stCondLst>
+                      <p:childTnLst>
+                        <p:par>
+                          <p:cTn id="4" fill="hold">
+                            <p:stCondLst>
+                              <p:cond delay="0"/>
+                            </p:stCondLst>
+                            <p:childTnLst>
+                              <p:par>
+                                <p:cTn id="5" presetID="9" presetClass="entr" presetSubtype="0" fill="hold" grpId="0" nodeType="withEffect">
+                                  <p:stCondLst>
+                                    <p:cond delay="0"/>
+                                  </p:stCondLst>
+                                  <p:childTnLst>
+                                    <p:set>
+                                      <p:cBhvr>
+                                        <p:cTn id="6" dur="1" fill="hold">
+                                          <p:stCondLst>
+                                            <p:cond delay="0"/>
+                                          </p:stCondLst>
+                                        </p:cTn>
+                                        <p:tgtEl>
+                                          <p:spTgt spid="5"/>
+                                        </p:tgtEl>
+                                        <p:attrNameLst>
+                                          <p:attrName>style.visibility</p:attrName>
+                                        </p:attrNameLst>
+                                      </p:cBhvr>
+                                      <p:to>
+                                        <p:strVal val="visible"/>
+                                      </p:to>
+                                    </p:set>
+                                    <p:animEffect transition="in" filter="dissolve">
+                                      <p:cBhvr>
+                                        <p:cTn id="7" dur="500"/>
+                                        <p:tgtEl>
+                                          <p:spTgt spid="5"/>
+                                        </p:tgtEl>
+                                      </p:cBhvr>
+                                    </p:animEffect>
+                                  </p:childTnLst>
+                                </p:cTn>
+                              </p:par>
+                            </p:childTnLst>
+                          </p:cTn>
+                        </p:par>
+                      </p:childTnLst>
+                    </p:cTn>
+                  </p:par>
+                </p:childTnLst>
+              </p:cTn>
+              <p:prevCondLst>
+                <p:cond evt="onPrev" delay="0">
+                  <p:tgtEl>
+                    <p:sldTgt/>
+                  </p:tgtEl>
+                </p:cond>
+              </p:prevCondLst>
+              <p:nextCondLst>
+                <p:cond evt="onNext" delay="0">
+                  <p:tgtEl>
+                    <p:sldTgt/>
+                  </p:tgtEl>
+                </p:cond>
+              </p:nextCondLst>
+            </p:seq>
+          </p:childTnLst>
+        </p:cTn>
+      </p:par>
+    </p:tnLst>
+    <p:bldLst>
+      <p:bldP spid="5" grpId="0"/>
     </p:bldLst>
   </p:timing>
 </p:sld>

</xml_diff>

<commit_message>
Atualiza apresentação Web Services
</commit_message>
<xml_diff>
--- a/projects/08-webservices/webservices.pptx
+++ b/projects/08-webservices/webservices.pptx
@@ -5,7 +5,7 @@
     <p:sldMasterId id="2147484007" r:id="rId1"/>
   </p:sldMasterIdLst>
   <p:notesMasterIdLst>
-    <p:notesMasterId r:id="rId39"/>
+    <p:notesMasterId r:id="rId40"/>
   </p:notesMasterIdLst>
   <p:sldIdLst>
     <p:sldId id="266" r:id="rId2"/>
@@ -32,19 +32,20 @@
     <p:sldId id="295" r:id="rId23"/>
     <p:sldId id="296" r:id="rId24"/>
     <p:sldId id="297" r:id="rId25"/>
-    <p:sldId id="314" r:id="rId26"/>
-    <p:sldId id="301" r:id="rId27"/>
-    <p:sldId id="302" r:id="rId28"/>
-    <p:sldId id="304" r:id="rId29"/>
-    <p:sldId id="315" r:id="rId30"/>
-    <p:sldId id="298" r:id="rId31"/>
-    <p:sldId id="299" r:id="rId32"/>
-    <p:sldId id="305" r:id="rId33"/>
-    <p:sldId id="316" r:id="rId34"/>
-    <p:sldId id="306" r:id="rId35"/>
-    <p:sldId id="317" r:id="rId36"/>
-    <p:sldId id="307" r:id="rId37"/>
-    <p:sldId id="308" r:id="rId38"/>
+    <p:sldId id="318" r:id="rId26"/>
+    <p:sldId id="314" r:id="rId27"/>
+    <p:sldId id="301" r:id="rId28"/>
+    <p:sldId id="302" r:id="rId29"/>
+    <p:sldId id="304" r:id="rId30"/>
+    <p:sldId id="315" r:id="rId31"/>
+    <p:sldId id="298" r:id="rId32"/>
+    <p:sldId id="299" r:id="rId33"/>
+    <p:sldId id="305" r:id="rId34"/>
+    <p:sldId id="316" r:id="rId35"/>
+    <p:sldId id="306" r:id="rId36"/>
+    <p:sldId id="317" r:id="rId37"/>
+    <p:sldId id="307" r:id="rId38"/>
+    <p:sldId id="308" r:id="rId39"/>
   </p:sldIdLst>
   <p:sldSz cx="12192000" cy="6858000"/>
   <p:notesSz cx="6858000" cy="9144000"/>
@@ -233,7 +234,7 @@
           <a:p>
             <a:fld id="{7497B6E1-7C5B-524D-B5EB-5E6695205380}" type="datetimeFigureOut">
               <a:rPr lang="pt-BR" smtClean="0"/>
-              <a:t>03/12/2018</a:t>
+              <a:t>13/12/2018</a:t>
             </a:fld>
             <a:endParaRPr lang="pt-BR" dirty="0"/>
           </a:p>
@@ -671,7 +672,7 @@
           <a:p>
             <a:fld id="{19E7D63B-43B5-8A4C-BD12-76889BE136BD}" type="datetime1">
               <a:rPr lang="en-US" smtClean="0"/>
-              <a:t>12/3/18</a:t>
+              <a:t>12/13/18</a:t>
             </a:fld>
             <a:endParaRPr lang="en-US" dirty="0"/>
           </a:p>
@@ -937,7 +938,7 @@
           <a:p>
             <a:fld id="{124E9894-F119-A64C-B7CB-D7CE860A73BE}" type="datetime1">
               <a:rPr lang="en-US" smtClean="0"/>
-              <a:t>12/3/18</a:t>
+              <a:t>12/13/18</a:t>
             </a:fld>
             <a:endParaRPr lang="en-US" dirty="0"/>
           </a:p>
@@ -1169,7 +1170,7 @@
           <a:p>
             <a:fld id="{124E9894-F119-A64C-B7CB-D7CE860A73BE}" type="datetime1">
               <a:rPr lang="en-US" smtClean="0"/>
-              <a:t>12/3/18</a:t>
+              <a:t>12/13/18</a:t>
             </a:fld>
             <a:endParaRPr lang="en-US" dirty="0"/>
           </a:p>
@@ -1480,7 +1481,7 @@
           <a:p>
             <a:fld id="{124E9894-F119-A64C-B7CB-D7CE860A73BE}" type="datetime1">
               <a:rPr lang="en-US" smtClean="0"/>
-              <a:t>12/3/18</a:t>
+              <a:t>12/13/18</a:t>
             </a:fld>
             <a:endParaRPr lang="en-US" dirty="0"/>
           </a:p>
@@ -1954,7 +1955,7 @@
           <a:p>
             <a:fld id="{B4BBB50B-BAA3-9748-978F-08A7877AB7D9}" type="datetime1">
               <a:rPr lang="en-US" smtClean="0"/>
-              <a:t>12/3/18</a:t>
+              <a:t>12/13/18</a:t>
             </a:fld>
             <a:endParaRPr lang="en-US" dirty="0"/>
           </a:p>
@@ -2501,7 +2502,7 @@
           <a:p>
             <a:fld id="{124E9894-F119-A64C-B7CB-D7CE860A73BE}" type="datetime1">
               <a:rPr lang="en-US" smtClean="0"/>
-              <a:t>12/3/18</a:t>
+              <a:t>12/13/18</a:t>
             </a:fld>
             <a:endParaRPr lang="en-US" dirty="0"/>
           </a:p>
@@ -3273,7 +3274,7 @@
           <a:p>
             <a:fld id="{124E9894-F119-A64C-B7CB-D7CE860A73BE}" type="datetime1">
               <a:rPr lang="en-US" smtClean="0"/>
-              <a:t>12/3/18</a:t>
+              <a:t>12/13/18</a:t>
             </a:fld>
             <a:endParaRPr lang="en-US" dirty="0"/>
           </a:p>
@@ -3449,7 +3450,7 @@
           <a:p>
             <a:fld id="{45040DEA-CE02-EF42-8F10-34F709D8505D}" type="datetime1">
               <a:rPr lang="en-US" smtClean="0"/>
-              <a:t>12/3/18</a:t>
+              <a:t>12/13/18</a:t>
             </a:fld>
             <a:endParaRPr lang="en-US" dirty="0"/>
           </a:p>
@@ -3672,7 +3673,7 @@
           <a:p>
             <a:fld id="{A0C1C801-5706-434E-AB65-DDFBCF1F55D2}" type="datetime1">
               <a:rPr lang="en-US" smtClean="0"/>
-              <a:t>12/3/18</a:t>
+              <a:t>12/13/18</a:t>
             </a:fld>
             <a:endParaRPr lang="en-US" dirty="0"/>
           </a:p>
@@ -3852,7 +3853,7 @@
           <a:p>
             <a:fld id="{39AE0FD8-7D7B-EA4F-8AF8-8B97820A0C5D}" type="datetime1">
               <a:rPr lang="en-US" smtClean="0"/>
-              <a:t>12/3/18</a:t>
+              <a:t>12/13/18</a:t>
             </a:fld>
             <a:endParaRPr lang="en-US" dirty="0"/>
           </a:p>
@@ -4141,7 +4142,7 @@
           <a:p>
             <a:fld id="{7FC94D43-3F68-DC43-8EF0-95FB3D51CCCF}" type="datetime1">
               <a:rPr lang="en-US" smtClean="0"/>
-              <a:t>12/3/18</a:t>
+              <a:t>12/13/18</a:t>
             </a:fld>
             <a:endParaRPr lang="en-US" dirty="0"/>
           </a:p>
@@ -4383,7 +4384,7 @@
           <a:p>
             <a:fld id="{BD42CFC2-1CE8-9045-8C9C-0F183F0FB455}" type="datetime1">
               <a:rPr lang="en-US" smtClean="0"/>
-              <a:t>12/3/18</a:t>
+              <a:t>12/13/18</a:t>
             </a:fld>
             <a:endParaRPr lang="en-US" dirty="0"/>
           </a:p>
@@ -4762,7 +4763,7 @@
           <a:p>
             <a:fld id="{F1B5C6E2-D044-C748-9C41-86C9B2F84EB9}" type="datetime1">
               <a:rPr lang="en-US" smtClean="0"/>
-              <a:t>12/3/18</a:t>
+              <a:t>12/13/18</a:t>
             </a:fld>
             <a:endParaRPr lang="en-US" dirty="0"/>
           </a:p>
@@ -4880,7 +4881,7 @@
           <a:p>
             <a:fld id="{359C32BA-C166-AC45-9FCD-8BF0F43629D9}" type="datetime1">
               <a:rPr lang="en-US" smtClean="0"/>
-              <a:t>12/3/18</a:t>
+              <a:t>12/13/18</a:t>
             </a:fld>
             <a:endParaRPr lang="en-US" dirty="0"/>
           </a:p>
@@ -4975,7 +4976,7 @@
           <a:p>
             <a:fld id="{E5D0D591-4B92-A44B-A0EA-798E76AD0368}" type="datetime1">
               <a:rPr lang="en-US" smtClean="0"/>
-              <a:t>12/3/18</a:t>
+              <a:t>12/13/18</a:t>
             </a:fld>
             <a:endParaRPr lang="en-US" dirty="0"/>
           </a:p>
@@ -5224,7 +5225,7 @@
           <a:p>
             <a:fld id="{8201F472-E17F-4B47-A44B-A2249FA27ED2}" type="datetime1">
               <a:rPr lang="en-US" smtClean="0"/>
-              <a:t>12/3/18</a:t>
+              <a:t>12/13/18</a:t>
             </a:fld>
             <a:endParaRPr lang="en-US" dirty="0"/>
           </a:p>
@@ -5480,7 +5481,7 @@
           <a:p>
             <a:fld id="{8BEFB9EE-CDF2-6F49-80F4-278D1604F10C}" type="datetime1">
               <a:rPr lang="en-US" smtClean="0"/>
-              <a:t>12/3/18</a:t>
+              <a:t>12/13/18</a:t>
             </a:fld>
             <a:endParaRPr lang="en-US" dirty="0"/>
           </a:p>
@@ -5723,7 +5724,7 @@
           <a:p>
             <a:fld id="{124E9894-F119-A64C-B7CB-D7CE860A73BE}" type="datetime1">
               <a:rPr lang="en-US" smtClean="0"/>
-              <a:t>12/3/18</a:t>
+              <a:t>12/13/18</a:t>
             </a:fld>
             <a:endParaRPr lang="en-US" dirty="0"/>
           </a:p>
@@ -15491,8 +15492,8 @@
         </p:nvSpPr>
         <p:spPr>
           <a:xfrm>
-            <a:off x="613511" y="1339123"/>
-            <a:ext cx="10785085" cy="2862322"/>
+            <a:off x="613511" y="1339122"/>
+            <a:ext cx="6979985" cy="4518339"/>
           </a:xfrm>
         </p:spPr>
         <p:txBody>
@@ -15502,54 +15503,34 @@
           <a:lstStyle/>
           <a:p>
             <a:r>
-              <a:rPr lang="pt-BR" sz="2600" dirty="0"/>
+              <a:rPr lang="pt-BR" sz="2800" dirty="0"/>
               <a:t>Há alguns anos era considerado “leve” justamente pelo uso de XML e comparado com outras tecnologias como CORBA.</a:t>
             </a:r>
           </a:p>
           <a:p>
             <a:r>
-              <a:rPr lang="pt-BR" sz="2600" dirty="0"/>
+              <a:rPr lang="pt-BR" sz="2800" dirty="0"/>
               <a:t>Com o advento de formatos de representação de dados como </a:t>
             </a:r>
             <a:r>
-              <a:rPr lang="pt-BR" sz="2600" dirty="0">
+              <a:rPr lang="pt-BR" sz="2800" dirty="0">
                 <a:hlinkClick r:id="rId2"/>
               </a:rPr>
               <a:t>JSON</a:t>
             </a:r>
             <a:r>
-              <a:rPr lang="pt-BR" sz="2600" dirty="0"/>
+              <a:rPr lang="pt-BR" sz="2800" dirty="0"/>
               <a:t> e </a:t>
             </a:r>
             <a:r>
-              <a:rPr lang="pt-BR" sz="2600" dirty="0">
+              <a:rPr lang="pt-BR" sz="2800" dirty="0">
                 <a:hlinkClick r:id="rId3"/>
               </a:rPr>
               <a:t>YAML</a:t>
             </a:r>
             <a:r>
-              <a:rPr lang="pt-BR" sz="2600" dirty="0"/>
+              <a:rPr lang="pt-BR" sz="2800" dirty="0"/>
               <a:t>, SOAP já não pode ser considerado de fato leve.</a:t>
-            </a:r>
-          </a:p>
-          <a:p>
-            <a:r>
-              <a:rPr lang="pt-BR" sz="2600" dirty="0"/>
-              <a:t>XML possui redundância com a abertura e fechamento de </a:t>
-            </a:r>
-            <a:r>
-              <a:rPr lang="pt-BR" sz="2600" i="1" dirty="0" err="1"/>
-              <a:t>tags</a:t>
-            </a:r>
-            <a:r>
-              <a:rPr lang="pt-BR" sz="2600" dirty="0"/>
-              <a:t>.</a:t>
-            </a:r>
-          </a:p>
-          <a:p>
-            <a:r>
-              <a:rPr lang="pt-BR" sz="2600" dirty="0"/>
-              <a:t>Isso dobra o tamanho do conteúdo a ser trafegado pela rede</a:t>
             </a:r>
           </a:p>
         </p:txBody>
@@ -15638,7 +15619,7 @@
         </p:nvSpPr>
         <p:spPr>
           <a:xfrm>
-            <a:off x="8154647" y="3948960"/>
+            <a:off x="7876351" y="2251571"/>
             <a:ext cx="3983783" cy="2862322"/>
           </a:xfrm>
           <a:prstGeom prst="rect">
@@ -16086,7 +16067,7 @@
                                 </p:cTn>
                               </p:par>
                               <p:par>
-                                <p:cTn id="21" presetID="9" presetClass="entr" presetSubtype="0" fill="hold" grpId="0" nodeType="withEffect">
+                                <p:cTn id="21" presetID="42" presetClass="entr" presetSubtype="0" fill="hold" grpId="0" nodeType="withEffect">
                                   <p:stCondLst>
                                     <p:cond delay="0"/>
                                   </p:stCondLst>
@@ -16099,49 +16080,6 @@
                                           </p:stCondLst>
                                         </p:cTn>
                                         <p:tgtEl>
-                                          <p:spTgt spid="3">
-                                            <p:txEl>
-                                              <p:pRg st="2" end="2"/>
-                                            </p:txEl>
-                                          </p:spTgt>
-                                        </p:tgtEl>
-                                        <p:attrNameLst>
-                                          <p:attrName>style.visibility</p:attrName>
-                                        </p:attrNameLst>
-                                      </p:cBhvr>
-                                      <p:to>
-                                        <p:strVal val="visible"/>
-                                      </p:to>
-                                    </p:set>
-                                    <p:animEffect transition="in" filter="dissolve">
-                                      <p:cBhvr>
-                                        <p:cTn id="23" dur="500"/>
-                                        <p:tgtEl>
-                                          <p:spTgt spid="3">
-                                            <p:txEl>
-                                              <p:pRg st="2" end="2"/>
-                                            </p:txEl>
-                                          </p:spTgt>
-                                        </p:tgtEl>
-                                      </p:cBhvr>
-                                    </p:animEffect>
-                                  </p:childTnLst>
-                                </p:cTn>
-                              </p:par>
-                              <p:par>
-                                <p:cTn id="24" presetID="42" presetClass="entr" presetSubtype="0" fill="hold" grpId="0" nodeType="withEffect">
-                                  <p:stCondLst>
-                                    <p:cond delay="0"/>
-                                  </p:stCondLst>
-                                  <p:childTnLst>
-                                    <p:set>
-                                      <p:cBhvr>
-                                        <p:cTn id="25" dur="1" fill="hold">
-                                          <p:stCondLst>
-                                            <p:cond delay="0"/>
-                                          </p:stCondLst>
-                                        </p:cTn>
-                                        <p:tgtEl>
                                           <p:spTgt spid="2"/>
                                         </p:tgtEl>
                                         <p:attrNameLst>
@@ -16154,7 +16092,7 @@
                                     </p:set>
                                     <p:animEffect transition="in" filter="fade">
                                       <p:cBhvr>
-                                        <p:cTn id="26" dur="1000"/>
+                                        <p:cTn id="23" dur="1000"/>
                                         <p:tgtEl>
                                           <p:spTgt spid="2"/>
                                         </p:tgtEl>
@@ -16162,7 +16100,7 @@
                                     </p:animEffect>
                                     <p:anim calcmode="lin" valueType="num">
                                       <p:cBhvr>
-                                        <p:cTn id="27" dur="1000" fill="hold"/>
+                                        <p:cTn id="24" dur="1000" fill="hold"/>
                                         <p:tgtEl>
                                           <p:spTgt spid="2"/>
                                         </p:tgtEl>
@@ -16185,7 +16123,7 @@
                                     </p:anim>
                                     <p:anim calcmode="lin" valueType="num">
                                       <p:cBhvr>
-                                        <p:cTn id="28" dur="1000" fill="hold"/>
+                                        <p:cTn id="25" dur="1000" fill="hold"/>
                                         <p:tgtEl>
                                           <p:spTgt spid="2"/>
                                         </p:tgtEl>
@@ -16206,110 +16144,6 @@
                                         </p:tav>
                                       </p:tavLst>
                                     </p:anim>
-                                  </p:childTnLst>
-                                </p:cTn>
-                              </p:par>
-                            </p:childTnLst>
-                          </p:cTn>
-                        </p:par>
-                      </p:childTnLst>
-                    </p:cTn>
-                  </p:par>
-                  <p:par>
-                    <p:cTn id="29" fill="hold">
-                      <p:stCondLst>
-                        <p:cond delay="indefinite"/>
-                      </p:stCondLst>
-                      <p:childTnLst>
-                        <p:par>
-                          <p:cTn id="30" fill="hold">
-                            <p:stCondLst>
-                              <p:cond delay="0"/>
-                            </p:stCondLst>
-                            <p:childTnLst>
-                              <p:par>
-                                <p:cTn id="31" presetID="9" presetClass="exit" presetSubtype="0" fill="hold" grpId="1" nodeType="clickEffect">
-                                  <p:stCondLst>
-                                    <p:cond delay="0"/>
-                                  </p:stCondLst>
-                                  <p:childTnLst>
-                                    <p:animEffect transition="out" filter="dissolve">
-                                      <p:cBhvr>
-                                        <p:cTn id="32" dur="500"/>
-                                        <p:tgtEl>
-                                          <p:spTgt spid="3">
-                                            <p:txEl>
-                                              <p:pRg st="2" end="2"/>
-                                            </p:txEl>
-                                          </p:spTgt>
-                                        </p:tgtEl>
-                                      </p:cBhvr>
-                                    </p:animEffect>
-                                    <p:set>
-                                      <p:cBhvr>
-                                        <p:cTn id="33" dur="1" fill="hold">
-                                          <p:stCondLst>
-                                            <p:cond delay="499"/>
-                                          </p:stCondLst>
-                                        </p:cTn>
-                                        <p:tgtEl>
-                                          <p:spTgt spid="3">
-                                            <p:txEl>
-                                              <p:pRg st="2" end="2"/>
-                                            </p:txEl>
-                                          </p:spTgt>
-                                        </p:tgtEl>
-                                        <p:attrNameLst>
-                                          <p:attrName>style.visibility</p:attrName>
-                                        </p:attrNameLst>
-                                      </p:cBhvr>
-                                      <p:to>
-                                        <p:strVal val="hidden"/>
-                                      </p:to>
-                                    </p:set>
-                                  </p:childTnLst>
-                                </p:cTn>
-                              </p:par>
-                              <p:par>
-                                <p:cTn id="34" presetID="9" presetClass="entr" presetSubtype="0" fill="hold" grpId="0" nodeType="withEffect">
-                                  <p:stCondLst>
-                                    <p:cond delay="0"/>
-                                  </p:stCondLst>
-                                  <p:childTnLst>
-                                    <p:set>
-                                      <p:cBhvr>
-                                        <p:cTn id="35" dur="1" fill="hold">
-                                          <p:stCondLst>
-                                            <p:cond delay="0"/>
-                                          </p:stCondLst>
-                                        </p:cTn>
-                                        <p:tgtEl>
-                                          <p:spTgt spid="3">
-                                            <p:txEl>
-                                              <p:pRg st="3" end="3"/>
-                                            </p:txEl>
-                                          </p:spTgt>
-                                        </p:tgtEl>
-                                        <p:attrNameLst>
-                                          <p:attrName>style.visibility</p:attrName>
-                                        </p:attrNameLst>
-                                      </p:cBhvr>
-                                      <p:to>
-                                        <p:strVal val="visible"/>
-                                      </p:to>
-                                    </p:set>
-                                    <p:animEffect transition="in" filter="dissolve">
-                                      <p:cBhvr>
-                                        <p:cTn id="36" dur="500"/>
-                                        <p:tgtEl>
-                                          <p:spTgt spid="3">
-                                            <p:txEl>
-                                              <p:pRg st="3" end="3"/>
-                                            </p:txEl>
-                                          </p:spTgt>
-                                        </p:tgtEl>
-                                      </p:cBhvr>
-                                    </p:animEffect>
                                   </p:childTnLst>
                                 </p:cTn>
                               </p:par>
@@ -16384,8 +16218,8 @@
         </p:nvSpPr>
         <p:spPr>
           <a:xfrm>
-            <a:off x="613511" y="1339123"/>
-            <a:ext cx="10785085" cy="5001284"/>
+            <a:off x="613510" y="1339122"/>
+            <a:ext cx="6913725" cy="3431661"/>
           </a:xfrm>
         </p:spPr>
         <p:txBody>
@@ -16395,38 +16229,22 @@
           <a:lstStyle/>
           <a:p>
             <a:r>
-              <a:rPr lang="pt-BR" sz="2600" dirty="0"/>
-              <a:t>Quanto mais dados forem trafegados...</a:t>
-            </a:r>
-          </a:p>
-          <a:p>
-            <a:r>
-              <a:rPr lang="pt-BR" sz="2600" dirty="0"/>
-              <a:t>... mais largura de banda vão consumir;</a:t>
-            </a:r>
-          </a:p>
-          <a:p>
-            <a:r>
-              <a:rPr lang="pt-BR" sz="2600" dirty="0"/>
-              <a:t>... mais tempo pra enviar uma requisição;</a:t>
-            </a:r>
-          </a:p>
-          <a:p>
-            <a:r>
-              <a:rPr lang="pt-BR" sz="2600" dirty="0"/>
-              <a:t>... mais tempo pra receber uma resposta;</a:t>
-            </a:r>
-          </a:p>
-          <a:p>
-            <a:r>
-              <a:rPr lang="pt-BR" sz="2600" dirty="0"/>
-              <a:t>... mais tempo o usuário vai ficar esperando;</a:t>
-            </a:r>
-          </a:p>
-          <a:p>
-            <a:r>
-              <a:rPr lang="pt-BR" sz="2600" dirty="0"/>
-              <a:t>... menor a escalabilidade do sistema.</a:t>
+              <a:rPr lang="pt-BR" sz="2800" dirty="0"/>
+              <a:t>XML possui redundância com a abertura e fechamento de </a:t>
+            </a:r>
+            <a:r>
+              <a:rPr lang="pt-BR" sz="2800" i="1" dirty="0" err="1"/>
+              <a:t>tags</a:t>
+            </a:r>
+            <a:r>
+              <a:rPr lang="pt-BR" sz="2800" dirty="0"/>
+              <a:t>.</a:t>
+            </a:r>
+          </a:p>
+          <a:p>
+            <a:r>
+              <a:rPr lang="pt-BR" sz="2800" dirty="0"/>
+              <a:t>Isso dobra o tamanho do conteúdo a ser trafegado pela rede</a:t>
             </a:r>
           </a:p>
         </p:txBody>
@@ -16455,6 +16273,675 @@
             <a:fld id="{2183B7EE-0FBE-B749-875F-ED24F5ECD71F}" type="slidenum">
               <a:rPr lang="en-US" smtClean="0"/>
               <a:t>25</a:t>
+            </a:fld>
+            <a:endParaRPr lang="en-US" dirty="0"/>
+          </a:p>
+        </p:txBody>
+      </p:sp>
+      <p:sp>
+        <p:nvSpPr>
+          <p:cNvPr id="7" name="Title 1">
+            <a:extLst>
+              <a:ext uri="{FF2B5EF4-FFF2-40B4-BE49-F238E27FC236}">
+                <a16:creationId xmlns:a16="http://schemas.microsoft.com/office/drawing/2014/main" id="{B7621E9A-A403-2E4F-903F-60CBC83A635F}"/>
+              </a:ext>
+            </a:extLst>
+          </p:cNvPr>
+          <p:cNvSpPr>
+            <a:spLocks noGrp="1"/>
+          </p:cNvSpPr>
+          <p:nvPr>
+            <p:ph type="title"/>
+          </p:nvPr>
+        </p:nvSpPr>
+        <p:spPr>
+          <a:xfrm>
+            <a:off x="4189412" y="79088"/>
+            <a:ext cx="7315200" cy="1164933"/>
+          </a:xfrm>
+        </p:spPr>
+        <p:txBody>
+          <a:bodyPr>
+            <a:normAutofit/>
+          </a:bodyPr>
+          <a:lstStyle/>
+          <a:p>
+            <a:pPr algn="ctr"/>
+            <a:r>
+              <a:rPr lang="pt-BR" b="1" i="1" dirty="0"/>
+              <a:t>O padrão de ws </a:t>
+            </a:r>
+            <a:r>
+              <a:rPr lang="pt-BR" b="1" i="1" dirty="0" err="1"/>
+              <a:t>soap</a:t>
+            </a:r>
+            <a:endParaRPr lang="pt-BR" dirty="0"/>
+          </a:p>
+        </p:txBody>
+      </p:sp>
+      <p:sp>
+        <p:nvSpPr>
+          <p:cNvPr id="6" name="TextBox 5">
+            <a:extLst>
+              <a:ext uri="{FF2B5EF4-FFF2-40B4-BE49-F238E27FC236}">
+                <a16:creationId xmlns:a16="http://schemas.microsoft.com/office/drawing/2014/main" id="{A5382ECD-215D-AB49-B780-FB0D37256291}"/>
+              </a:ext>
+            </a:extLst>
+          </p:cNvPr>
+          <p:cNvSpPr txBox="1"/>
+          <p:nvPr/>
+        </p:nvSpPr>
+        <p:spPr>
+          <a:xfrm>
+            <a:off x="7876351" y="2251571"/>
+            <a:ext cx="3983783" cy="2862322"/>
+          </a:xfrm>
+          <a:prstGeom prst="rect">
+            <a:avLst/>
+          </a:prstGeom>
+          <a:noFill/>
+          <a:ln>
+            <a:solidFill>
+              <a:srgbClr val="0070C0"/>
+            </a:solidFill>
+          </a:ln>
+        </p:spPr>
+        <p:txBody>
+          <a:bodyPr wrap="none" rtlCol="0">
+            <a:spAutoFit/>
+          </a:bodyPr>
+          <a:lstStyle/>
+          <a:p>
+            <a:r>
+              <a:rPr lang="en-US" i="1" dirty="0"/>
+              <a:t>&lt;</a:t>
+            </a:r>
+            <a:r>
+              <a:rPr lang="en-US" i="1" dirty="0" err="1"/>
+              <a:t>pessoas</a:t>
+            </a:r>
+            <a:r>
+              <a:rPr lang="en-US" i="1" dirty="0"/>
+              <a:t>&gt; </a:t>
+            </a:r>
+            <a:br>
+              <a:rPr lang="en-US" i="1" dirty="0"/>
+            </a:br>
+            <a:r>
+              <a:rPr lang="en-US" i="1" dirty="0"/>
+              <a:t>  &lt;</a:t>
+            </a:r>
+            <a:r>
+              <a:rPr lang="en-US" i="1" dirty="0" err="1"/>
+              <a:t>pessoa</a:t>
+            </a:r>
+            <a:r>
+              <a:rPr lang="en-US" i="1" dirty="0"/>
+              <a:t> type=”PF"&gt; </a:t>
+            </a:r>
+            <a:br>
+              <a:rPr lang="en-US" i="1" dirty="0"/>
+            </a:br>
+            <a:r>
+              <a:rPr lang="en-US" i="1" dirty="0"/>
+              <a:t>    &lt;</a:t>
+            </a:r>
+            <a:r>
+              <a:rPr lang="en-US" i="1" dirty="0" err="1"/>
+              <a:t>nome</a:t>
+            </a:r>
+            <a:r>
+              <a:rPr lang="en-US" i="1" dirty="0"/>
+              <a:t>&gt;</a:t>
+            </a:r>
+            <a:r>
+              <a:rPr lang="en-US" i="1" dirty="0" err="1"/>
+              <a:t>Manoel</a:t>
+            </a:r>
+            <a:r>
+              <a:rPr lang="en-US" i="1" dirty="0"/>
+              <a:t>&lt;/</a:t>
+            </a:r>
+            <a:r>
+              <a:rPr lang="en-US" i="1" dirty="0" err="1"/>
+              <a:t>nome</a:t>
+            </a:r>
+            <a:r>
+              <a:rPr lang="en-US" i="1" dirty="0"/>
+              <a:t>&gt; </a:t>
+            </a:r>
+          </a:p>
+          <a:p>
+            <a:r>
+              <a:rPr lang="en-US" i="1" dirty="0"/>
+              <a:t>    &lt;</a:t>
+            </a:r>
+            <a:r>
+              <a:rPr lang="en-US" i="1" dirty="0" err="1"/>
+              <a:t>cidade</a:t>
+            </a:r>
+            <a:r>
+              <a:rPr lang="en-US" i="1" dirty="0"/>
+              <a:t>&gt;Palmas-TO&lt;/</a:t>
+            </a:r>
+            <a:r>
+              <a:rPr lang="en-US" i="1" dirty="0" err="1"/>
+              <a:t>cidade</a:t>
+            </a:r>
+            <a:r>
+              <a:rPr lang="en-US" i="1" dirty="0"/>
+              <a:t>&gt; </a:t>
+            </a:r>
+            <a:br>
+              <a:rPr lang="en-US" i="1" dirty="0"/>
+            </a:br>
+            <a:r>
+              <a:rPr lang="en-US" i="1" dirty="0"/>
+              <a:t>  &lt;/</a:t>
+            </a:r>
+            <a:r>
+              <a:rPr lang="en-US" i="1" dirty="0" err="1"/>
+              <a:t>pessoa</a:t>
+            </a:r>
+            <a:r>
+              <a:rPr lang="en-US" i="1" dirty="0"/>
+              <a:t>&gt; </a:t>
+            </a:r>
+            <a:br>
+              <a:rPr lang="en-US" i="1" dirty="0"/>
+            </a:br>
+            <a:r>
+              <a:rPr lang="en-US" i="1" dirty="0"/>
+              <a:t>  &lt;</a:t>
+            </a:r>
+            <a:r>
+              <a:rPr lang="en-US" i="1" dirty="0" err="1"/>
+              <a:t>pessoa</a:t>
+            </a:r>
+            <a:r>
+              <a:rPr lang="en-US" i="1" dirty="0"/>
+              <a:t> type=”PJ"&gt; </a:t>
+            </a:r>
+            <a:br>
+              <a:rPr lang="en-US" i="1" dirty="0"/>
+            </a:br>
+            <a:r>
+              <a:rPr lang="en-US" i="1" dirty="0"/>
+              <a:t>    &lt;</a:t>
+            </a:r>
+            <a:r>
+              <a:rPr lang="en-US" i="1" dirty="0" err="1"/>
+              <a:t>nome</a:t>
+            </a:r>
+            <a:r>
+              <a:rPr lang="en-US" i="1" dirty="0"/>
+              <a:t>&gt;IFTO&lt;/</a:t>
+            </a:r>
+            <a:r>
+              <a:rPr lang="en-US" i="1" dirty="0" err="1"/>
+              <a:t>nome</a:t>
+            </a:r>
+            <a:r>
+              <a:rPr lang="en-US" i="1" dirty="0"/>
+              <a:t>&gt; </a:t>
+            </a:r>
+            <a:br>
+              <a:rPr lang="en-US" i="1" dirty="0"/>
+            </a:br>
+            <a:r>
+              <a:rPr lang="en-US" i="1" dirty="0"/>
+              <a:t>    &lt;</a:t>
+            </a:r>
+            <a:r>
+              <a:rPr lang="en-US" i="1" dirty="0" err="1"/>
+              <a:t>cidade</a:t>
+            </a:r>
+            <a:r>
+              <a:rPr lang="en-US" i="1" dirty="0"/>
+              <a:t>&gt;Palmas-TO&lt;/</a:t>
+            </a:r>
+            <a:r>
+              <a:rPr lang="en-US" i="1" dirty="0" err="1"/>
+              <a:t>cidade</a:t>
+            </a:r>
+            <a:r>
+              <a:rPr lang="en-US" i="1" dirty="0"/>
+              <a:t>&gt; </a:t>
+            </a:r>
+            <a:br>
+              <a:rPr lang="en-US" i="1" dirty="0"/>
+            </a:br>
+            <a:r>
+              <a:rPr lang="en-US" i="1" dirty="0"/>
+              <a:t>  &lt;/</a:t>
+            </a:r>
+            <a:r>
+              <a:rPr lang="en-US" i="1" dirty="0" err="1"/>
+              <a:t>pessoa</a:t>
+            </a:r>
+            <a:r>
+              <a:rPr lang="en-US" i="1" dirty="0"/>
+              <a:t>&gt; </a:t>
+            </a:r>
+            <a:br>
+              <a:rPr lang="en-US" i="1" dirty="0"/>
+            </a:br>
+            <a:r>
+              <a:rPr lang="en-US" i="1" dirty="0"/>
+              <a:t>&lt;/</a:t>
+            </a:r>
+            <a:r>
+              <a:rPr lang="en-US" i="1" dirty="0" err="1"/>
+              <a:t>pessoas</a:t>
+            </a:r>
+            <a:r>
+              <a:rPr lang="en-US" i="1" dirty="0"/>
+              <a:t>&gt; </a:t>
+            </a:r>
+            <a:endParaRPr lang="pt-BR" i="1" dirty="0"/>
+          </a:p>
+        </p:txBody>
+      </p:sp>
+    </p:spTree>
+    <p:extLst>
+      <p:ext uri="{BB962C8B-B14F-4D97-AF65-F5344CB8AC3E}">
+        <p14:creationId xmlns:p14="http://schemas.microsoft.com/office/powerpoint/2010/main" val="4196676021"/>
+      </p:ext>
+    </p:extLst>
+  </p:cSld>
+  <p:clrMapOvr>
+    <a:masterClrMapping/>
+  </p:clrMapOvr>
+  <p:timing>
+    <p:tnLst>
+      <p:par>
+        <p:cTn id="1" dur="indefinite" restart="never" nodeType="tmRoot">
+          <p:childTnLst>
+            <p:seq concurrent="1" nextAc="seek">
+              <p:cTn id="2" dur="indefinite" nodeType="mainSeq">
+                <p:childTnLst>
+                  <p:par>
+                    <p:cTn id="3" fill="hold">
+                      <p:stCondLst>
+                        <p:cond delay="indefinite"/>
+                      </p:stCondLst>
+                      <p:childTnLst>
+                        <p:par>
+                          <p:cTn id="4" fill="hold">
+                            <p:stCondLst>
+                              <p:cond delay="0"/>
+                            </p:stCondLst>
+                            <p:childTnLst>
+                              <p:par>
+                                <p:cTn id="5" presetID="9" presetClass="entr" presetSubtype="0" fill="hold" grpId="0" nodeType="clickEffect">
+                                  <p:stCondLst>
+                                    <p:cond delay="0"/>
+                                  </p:stCondLst>
+                                  <p:childTnLst>
+                                    <p:set>
+                                      <p:cBhvr>
+                                        <p:cTn id="6" dur="1" fill="hold">
+                                          <p:stCondLst>
+                                            <p:cond delay="0"/>
+                                          </p:stCondLst>
+                                        </p:cTn>
+                                        <p:tgtEl>
+                                          <p:spTgt spid="3">
+                                            <p:txEl>
+                                              <p:pRg st="0" end="0"/>
+                                            </p:txEl>
+                                          </p:spTgt>
+                                        </p:tgtEl>
+                                        <p:attrNameLst>
+                                          <p:attrName>style.visibility</p:attrName>
+                                        </p:attrNameLst>
+                                      </p:cBhvr>
+                                      <p:to>
+                                        <p:strVal val="visible"/>
+                                      </p:to>
+                                    </p:set>
+                                    <p:animEffect transition="in" filter="dissolve">
+                                      <p:cBhvr>
+                                        <p:cTn id="7" dur="500"/>
+                                        <p:tgtEl>
+                                          <p:spTgt spid="3">
+                                            <p:txEl>
+                                              <p:pRg st="0" end="0"/>
+                                            </p:txEl>
+                                          </p:spTgt>
+                                        </p:tgtEl>
+                                      </p:cBhvr>
+                                    </p:animEffect>
+                                  </p:childTnLst>
+                                </p:cTn>
+                              </p:par>
+                            </p:childTnLst>
+                          </p:cTn>
+                        </p:par>
+                      </p:childTnLst>
+                    </p:cTn>
+                  </p:par>
+                  <p:par>
+                    <p:cTn id="8" fill="hold">
+                      <p:stCondLst>
+                        <p:cond delay="indefinite"/>
+                      </p:stCondLst>
+                      <p:childTnLst>
+                        <p:par>
+                          <p:cTn id="9" fill="hold">
+                            <p:stCondLst>
+                              <p:cond delay="0"/>
+                            </p:stCondLst>
+                            <p:childTnLst>
+                              <p:par>
+                                <p:cTn id="10" presetID="9" presetClass="exit" presetSubtype="0" fill="hold" grpId="1" nodeType="clickEffect">
+                                  <p:stCondLst>
+                                    <p:cond delay="0"/>
+                                  </p:stCondLst>
+                                  <p:childTnLst>
+                                    <p:animEffect transition="out" filter="dissolve">
+                                      <p:cBhvr>
+                                        <p:cTn id="11" dur="500"/>
+                                        <p:tgtEl>
+                                          <p:spTgt spid="3">
+                                            <p:txEl>
+                                              <p:pRg st="0" end="0"/>
+                                            </p:txEl>
+                                          </p:spTgt>
+                                        </p:tgtEl>
+                                      </p:cBhvr>
+                                    </p:animEffect>
+                                    <p:set>
+                                      <p:cBhvr>
+                                        <p:cTn id="12" dur="1" fill="hold">
+                                          <p:stCondLst>
+                                            <p:cond delay="499"/>
+                                          </p:stCondLst>
+                                        </p:cTn>
+                                        <p:tgtEl>
+                                          <p:spTgt spid="3">
+                                            <p:txEl>
+                                              <p:pRg st="0" end="0"/>
+                                            </p:txEl>
+                                          </p:spTgt>
+                                        </p:tgtEl>
+                                        <p:attrNameLst>
+                                          <p:attrName>style.visibility</p:attrName>
+                                        </p:attrNameLst>
+                                      </p:cBhvr>
+                                      <p:to>
+                                        <p:strVal val="hidden"/>
+                                      </p:to>
+                                    </p:set>
+                                  </p:childTnLst>
+                                </p:cTn>
+                              </p:par>
+                              <p:par>
+                                <p:cTn id="13" presetID="9" presetClass="entr" presetSubtype="0" fill="hold" grpId="0" nodeType="withEffect">
+                                  <p:stCondLst>
+                                    <p:cond delay="0"/>
+                                  </p:stCondLst>
+                                  <p:childTnLst>
+                                    <p:set>
+                                      <p:cBhvr>
+                                        <p:cTn id="14" dur="1" fill="hold">
+                                          <p:stCondLst>
+                                            <p:cond delay="0"/>
+                                          </p:stCondLst>
+                                        </p:cTn>
+                                        <p:tgtEl>
+                                          <p:spTgt spid="3">
+                                            <p:txEl>
+                                              <p:pRg st="1" end="1"/>
+                                            </p:txEl>
+                                          </p:spTgt>
+                                        </p:tgtEl>
+                                        <p:attrNameLst>
+                                          <p:attrName>style.visibility</p:attrName>
+                                        </p:attrNameLst>
+                                      </p:cBhvr>
+                                      <p:to>
+                                        <p:strVal val="visible"/>
+                                      </p:to>
+                                    </p:set>
+                                    <p:animEffect transition="in" filter="dissolve">
+                                      <p:cBhvr>
+                                        <p:cTn id="15" dur="500"/>
+                                        <p:tgtEl>
+                                          <p:spTgt spid="3">
+                                            <p:txEl>
+                                              <p:pRg st="1" end="1"/>
+                                            </p:txEl>
+                                          </p:spTgt>
+                                        </p:tgtEl>
+                                      </p:cBhvr>
+                                    </p:animEffect>
+                                  </p:childTnLst>
+                                </p:cTn>
+                              </p:par>
+                              <p:par>
+                                <p:cTn id="16" presetID="42" presetClass="entr" presetSubtype="0" fill="hold" grpId="0" nodeType="withEffect">
+                                  <p:stCondLst>
+                                    <p:cond delay="0"/>
+                                  </p:stCondLst>
+                                  <p:childTnLst>
+                                    <p:set>
+                                      <p:cBhvr>
+                                        <p:cTn id="17" dur="1" fill="hold">
+                                          <p:stCondLst>
+                                            <p:cond delay="0"/>
+                                          </p:stCondLst>
+                                        </p:cTn>
+                                        <p:tgtEl>
+                                          <p:spTgt spid="6"/>
+                                        </p:tgtEl>
+                                        <p:attrNameLst>
+                                          <p:attrName>style.visibility</p:attrName>
+                                        </p:attrNameLst>
+                                      </p:cBhvr>
+                                      <p:to>
+                                        <p:strVal val="visible"/>
+                                      </p:to>
+                                    </p:set>
+                                    <p:animEffect transition="in" filter="fade">
+                                      <p:cBhvr>
+                                        <p:cTn id="18" dur="1000"/>
+                                        <p:tgtEl>
+                                          <p:spTgt spid="6"/>
+                                        </p:tgtEl>
+                                      </p:cBhvr>
+                                    </p:animEffect>
+                                    <p:anim calcmode="lin" valueType="num">
+                                      <p:cBhvr>
+                                        <p:cTn id="19" dur="1000" fill="hold"/>
+                                        <p:tgtEl>
+                                          <p:spTgt spid="6"/>
+                                        </p:tgtEl>
+                                        <p:attrNameLst>
+                                          <p:attrName>ppt_x</p:attrName>
+                                        </p:attrNameLst>
+                                      </p:cBhvr>
+                                      <p:tavLst>
+                                        <p:tav tm="0">
+                                          <p:val>
+                                            <p:strVal val="#ppt_x"/>
+                                          </p:val>
+                                        </p:tav>
+                                        <p:tav tm="100000">
+                                          <p:val>
+                                            <p:strVal val="#ppt_x"/>
+                                          </p:val>
+                                        </p:tav>
+                                      </p:tavLst>
+                                    </p:anim>
+                                    <p:anim calcmode="lin" valueType="num">
+                                      <p:cBhvr>
+                                        <p:cTn id="20" dur="1000" fill="hold"/>
+                                        <p:tgtEl>
+                                          <p:spTgt spid="6"/>
+                                        </p:tgtEl>
+                                        <p:attrNameLst>
+                                          <p:attrName>ppt_y</p:attrName>
+                                        </p:attrNameLst>
+                                      </p:cBhvr>
+                                      <p:tavLst>
+                                        <p:tav tm="0">
+                                          <p:val>
+                                            <p:strVal val="#ppt_y+.1"/>
+                                          </p:val>
+                                        </p:tav>
+                                        <p:tav tm="100000">
+                                          <p:val>
+                                            <p:strVal val="#ppt_y"/>
+                                          </p:val>
+                                        </p:tav>
+                                      </p:tavLst>
+                                    </p:anim>
+                                  </p:childTnLst>
+                                </p:cTn>
+                              </p:par>
+                            </p:childTnLst>
+                          </p:cTn>
+                        </p:par>
+                      </p:childTnLst>
+                    </p:cTn>
+                  </p:par>
+                </p:childTnLst>
+              </p:cTn>
+              <p:prevCondLst>
+                <p:cond evt="onPrev" delay="0">
+                  <p:tgtEl>
+                    <p:sldTgt/>
+                  </p:tgtEl>
+                </p:cond>
+              </p:prevCondLst>
+              <p:nextCondLst>
+                <p:cond evt="onNext" delay="0">
+                  <p:tgtEl>
+                    <p:sldTgt/>
+                  </p:tgtEl>
+                </p:cond>
+              </p:nextCondLst>
+            </p:seq>
+          </p:childTnLst>
+        </p:cTn>
+      </p:par>
+    </p:tnLst>
+    <p:bldLst>
+      <p:bldP spid="3" grpId="0" uiExpand="1" build="p"/>
+      <p:bldP spid="3" grpId="1" uiExpand="1" build="p"/>
+      <p:bldP spid="6" grpId="0" animBg="1"/>
+    </p:bldLst>
+  </p:timing>
+</p:sld>
+</file>
+
+<file path=ppt/slides/slide26.xml><?xml version="1.0" encoding="utf-8"?>
+<p:sld xmlns:a="http://schemas.openxmlformats.org/drawingml/2006/main" xmlns:r="http://schemas.openxmlformats.org/officeDocument/2006/relationships" xmlns:p="http://schemas.openxmlformats.org/presentationml/2006/main">
+  <p:cSld>
+    <p:spTree>
+      <p:nvGrpSpPr>
+        <p:cNvPr id="1" name=""/>
+        <p:cNvGrpSpPr/>
+        <p:nvPr/>
+      </p:nvGrpSpPr>
+      <p:grpSpPr>
+        <a:xfrm>
+          <a:off x="0" y="0"/>
+          <a:ext cx="0" cy="0"/>
+          <a:chOff x="0" y="0"/>
+          <a:chExt cx="0" cy="0"/>
+        </a:xfrm>
+      </p:grpSpPr>
+      <p:sp>
+        <p:nvSpPr>
+          <p:cNvPr id="3" name="Content Placeholder 2">
+            <a:extLst>
+              <a:ext uri="{FF2B5EF4-FFF2-40B4-BE49-F238E27FC236}">
+                <a16:creationId xmlns:a16="http://schemas.microsoft.com/office/drawing/2014/main" id="{C9044F89-E3C1-E349-B0DE-0B932821234C}"/>
+              </a:ext>
+            </a:extLst>
+          </p:cNvPr>
+          <p:cNvSpPr>
+            <a:spLocks noGrp="1"/>
+          </p:cNvSpPr>
+          <p:nvPr>
+            <p:ph idx="1"/>
+          </p:nvPr>
+        </p:nvSpPr>
+        <p:spPr>
+          <a:xfrm>
+            <a:off x="613511" y="1339123"/>
+            <a:ext cx="10785085" cy="5001284"/>
+          </a:xfrm>
+        </p:spPr>
+        <p:txBody>
+          <a:bodyPr>
+            <a:normAutofit/>
+          </a:bodyPr>
+          <a:lstStyle/>
+          <a:p>
+            <a:r>
+              <a:rPr lang="pt-BR" sz="2800" dirty="0"/>
+              <a:t>Quanto mais dados forem trafegados...</a:t>
+            </a:r>
+          </a:p>
+          <a:p>
+            <a:r>
+              <a:rPr lang="pt-BR" sz="2800" dirty="0"/>
+              <a:t>... mais largura de banda vão consumir;</a:t>
+            </a:r>
+          </a:p>
+          <a:p>
+            <a:r>
+              <a:rPr lang="pt-BR" sz="2800" dirty="0"/>
+              <a:t>... mais tempo pra enviar uma requisição;</a:t>
+            </a:r>
+          </a:p>
+          <a:p>
+            <a:r>
+              <a:rPr lang="pt-BR" sz="2800" dirty="0"/>
+              <a:t>... mais tempo pra receber uma resposta;</a:t>
+            </a:r>
+          </a:p>
+          <a:p>
+            <a:r>
+              <a:rPr lang="pt-BR" sz="2800" dirty="0"/>
+              <a:t>... mais tempo o usuário vai ficar esperando;</a:t>
+            </a:r>
+          </a:p>
+          <a:p>
+            <a:r>
+              <a:rPr lang="pt-BR" sz="2800" dirty="0"/>
+              <a:t>... menor a escalabilidade do sistema.</a:t>
+            </a:r>
+          </a:p>
+        </p:txBody>
+      </p:sp>
+      <p:sp>
+        <p:nvSpPr>
+          <p:cNvPr id="4" name="Slide Number Placeholder 3">
+            <a:extLst>
+              <a:ext uri="{FF2B5EF4-FFF2-40B4-BE49-F238E27FC236}">
+                <a16:creationId xmlns:a16="http://schemas.microsoft.com/office/drawing/2014/main" id="{2EA509C2-078C-DE4C-BE59-C32AF18E82D6}"/>
+              </a:ext>
+            </a:extLst>
+          </p:cNvPr>
+          <p:cNvSpPr>
+            <a:spLocks noGrp="1"/>
+          </p:cNvSpPr>
+          <p:nvPr>
+            <p:ph type="sldNum" sz="quarter" idx="12"/>
+          </p:nvPr>
+        </p:nvSpPr>
+        <p:spPr/>
+        <p:txBody>
+          <a:bodyPr/>
+          <a:lstStyle/>
+          <a:p>
+            <a:fld id="{2183B7EE-0FBE-B749-875F-ED24F5ECD71F}" type="slidenum">
+              <a:rPr lang="en-US" smtClean="0"/>
+              <a:t>26</a:t>
             </a:fld>
             <a:endParaRPr lang="en-US" dirty="0"/>
           </a:p>
@@ -17355,7 +17842,7 @@
 </p:sld>
 </file>
 
-<file path=ppt/slides/slide26.xml><?xml version="1.0" encoding="utf-8"?>
+<file path=ppt/slides/slide27.xml><?xml version="1.0" encoding="utf-8"?>
 <p:sld xmlns:a="http://schemas.openxmlformats.org/drawingml/2006/main" xmlns:r="http://schemas.openxmlformats.org/officeDocument/2006/relationships" xmlns:p="http://schemas.openxmlformats.org/presentationml/2006/main">
   <p:cSld>
     <p:spTree>
@@ -17396,34 +17883,34 @@
         </p:spPr>
         <p:txBody>
           <a:bodyPr>
-            <a:normAutofit/>
+            <a:noAutofit/>
           </a:bodyPr>
           <a:lstStyle/>
           <a:p>
             <a:r>
-              <a:rPr lang="pt-BR" sz="2600" dirty="0"/>
+              <a:rPr lang="pt-BR" sz="2800" dirty="0"/>
               <a:t>Com a popularização de dispositivos e redes móveis, os reflexos desses problemas são ainda maiores</a:t>
             </a:r>
           </a:p>
           <a:p>
             <a:r>
-              <a:rPr lang="pt-BR" sz="2600" dirty="0"/>
+              <a:rPr lang="pt-BR" sz="2800" dirty="0"/>
               <a:t>Envio de excesso de dados em uma rede móvel pode consumir o pacote de dados do usuário</a:t>
             </a:r>
           </a:p>
           <a:p>
             <a:r>
-              <a:rPr lang="pt-BR" sz="2600" dirty="0"/>
+              <a:rPr lang="pt-BR" sz="2800" dirty="0"/>
               <a:t>Se as condições da rede móvel estiverem desfavoráveis, a experiência do usuário pode ser drasticamente afetada pela demora no envio de requisições</a:t>
             </a:r>
           </a:p>
           <a:p>
             <a:r>
-              <a:rPr lang="pt-BR" sz="2600" dirty="0"/>
+              <a:rPr lang="pt-BR" sz="2800" dirty="0"/>
               <a:t>Então com todos esses problemas do protocolo SOAP, </a:t>
             </a:r>
             <a:r>
-              <a:rPr lang="pt-BR" sz="2600" b="1" dirty="0"/>
+              <a:rPr lang="pt-BR" sz="2800" b="1" dirty="0"/>
               <a:t>a pergunta que fica é...</a:t>
             </a:r>
           </a:p>
@@ -17452,7 +17939,7 @@
           <a:p>
             <a:fld id="{2183B7EE-0FBE-B749-875F-ED24F5ECD71F}" type="slidenum">
               <a:rPr lang="en-US" smtClean="0"/>
-              <a:t>26</a:t>
+              <a:t>27</a:t>
             </a:fld>
             <a:endParaRPr lang="en-US" dirty="0"/>
           </a:p>
@@ -17919,7 +18406,7 @@
 </p:sld>
 </file>
 
-<file path=ppt/slides/slide27.xml><?xml version="1.0" encoding="utf-8"?>
+<file path=ppt/slides/slide28.xml><?xml version="1.0" encoding="utf-8"?>
 <p:sld xmlns:a="http://schemas.openxmlformats.org/drawingml/2006/main" xmlns:r="http://schemas.openxmlformats.org/officeDocument/2006/relationships" xmlns:p="http://schemas.openxmlformats.org/presentationml/2006/main" showMasterSp="0">
   <p:cSld>
     <p:bg>
@@ -18220,524 +18707,6 @@
     </p:tnLst>
     <p:bldLst>
       <p:bldP spid="2" grpId="0"/>
-    </p:bldLst>
-  </p:timing>
-</p:sld>
-</file>
-
-<file path=ppt/slides/slide28.xml><?xml version="1.0" encoding="utf-8"?>
-<p:sld xmlns:a="http://schemas.openxmlformats.org/drawingml/2006/main" xmlns:r="http://schemas.openxmlformats.org/officeDocument/2006/relationships" xmlns:p="http://schemas.openxmlformats.org/presentationml/2006/main" showMasterSp="0">
-  <p:cSld>
-    <p:bg>
-      <p:bgPr>
-        <a:blipFill dpi="0" rotWithShape="1">
-          <a:blip r:embed="rId2">
-            <a:alphaModFix amt="26000"/>
-            <a:lum/>
-          </a:blip>
-          <a:srcRect/>
-          <a:stretch>
-            <a:fillRect l="-4000" r="-4000"/>
-          </a:stretch>
-        </a:blipFill>
-        <a:effectLst/>
-      </p:bgPr>
-    </p:bg>
-    <p:spTree>
-      <p:nvGrpSpPr>
-        <p:cNvPr id="1" name=""/>
-        <p:cNvGrpSpPr/>
-        <p:nvPr/>
-      </p:nvGrpSpPr>
-      <p:grpSpPr>
-        <a:xfrm>
-          <a:off x="0" y="0"/>
-          <a:ext cx="0" cy="0"/>
-          <a:chOff x="0" y="0"/>
-          <a:chExt cx="0" cy="0"/>
-        </a:xfrm>
-      </p:grpSpPr>
-      <p:sp>
-        <p:nvSpPr>
-          <p:cNvPr id="2" name="Title 1">
-            <a:extLst>
-              <a:ext uri="{FF2B5EF4-FFF2-40B4-BE49-F238E27FC236}">
-                <a16:creationId xmlns:a16="http://schemas.microsoft.com/office/drawing/2014/main" id="{F3586F40-8B2F-1D48-BCAE-10E66B9B47BC}"/>
-              </a:ext>
-            </a:extLst>
-          </p:cNvPr>
-          <p:cNvSpPr>
-            <a:spLocks noGrp="1"/>
-          </p:cNvSpPr>
-          <p:nvPr>
-            <p:ph type="ctrTitle"/>
-          </p:nvPr>
-        </p:nvSpPr>
-        <p:spPr>
-          <a:xfrm>
-            <a:off x="1371600" y="109518"/>
-            <a:ext cx="9448800" cy="1109682"/>
-          </a:xfrm>
-        </p:spPr>
-        <p:txBody>
-          <a:bodyPr>
-            <a:noAutofit/>
-          </a:bodyPr>
-          <a:lstStyle/>
-          <a:p>
-            <a:pPr algn="ctr"/>
-            <a:r>
-              <a:rPr lang="pt-BR" sz="7200" cap="none" dirty="0">
-                <a:effectLst>
-                  <a:outerShdw blurRad="50800" dist="38100" dir="5400000" algn="t" rotWithShape="0">
-                    <a:schemeClr val="bg1">
-                      <a:alpha val="40000"/>
-                    </a:schemeClr>
-                  </a:outerShdw>
-                </a:effectLst>
-              </a:rPr>
-              <a:t>Bem...</a:t>
-            </a:r>
-          </a:p>
-        </p:txBody>
-      </p:sp>
-      <p:sp>
-        <p:nvSpPr>
-          <p:cNvPr id="14" name="Title 1">
-            <a:extLst>
-              <a:ext uri="{FF2B5EF4-FFF2-40B4-BE49-F238E27FC236}">
-                <a16:creationId xmlns:a16="http://schemas.microsoft.com/office/drawing/2014/main" id="{2C255C9B-00D3-5646-ACE4-56A1BF66B5FF}"/>
-              </a:ext>
-            </a:extLst>
-          </p:cNvPr>
-          <p:cNvSpPr txBox="1">
-            <a:spLocks/>
-          </p:cNvSpPr>
-          <p:nvPr/>
-        </p:nvSpPr>
-        <p:spPr>
-          <a:xfrm>
-            <a:off x="384313" y="1264388"/>
-            <a:ext cx="11293025" cy="5215924"/>
-          </a:xfrm>
-          <a:prstGeom prst="rect">
-            <a:avLst/>
-          </a:prstGeom>
-        </p:spPr>
-        <p:txBody>
-          <a:bodyPr vert="horz" lIns="91440" tIns="45720" rIns="91440" bIns="45720" rtlCol="0" anchor="t">
-            <a:noAutofit/>
-          </a:bodyPr>
-          <a:lstStyle>
-            <a:lvl1pPr algn="l" defTabSz="914400" rtl="0" eaLnBrk="1" latinLnBrk="0" hangingPunct="1">
-              <a:lnSpc>
-                <a:spcPct val="90000"/>
-              </a:lnSpc>
-              <a:spcBef>
-                <a:spcPct val="0"/>
-              </a:spcBef>
-              <a:buNone/>
-              <a:defRPr sz="6000" kern="1200" cap="all" baseline="0">
-                <a:solidFill>
-                  <a:schemeClr val="tx1"/>
-                </a:solidFill>
-                <a:latin typeface="+mj-lt"/>
-                <a:ea typeface="+mj-ea"/>
-                <a:cs typeface="+mj-cs"/>
-              </a:defRPr>
-            </a:lvl1pPr>
-          </a:lstStyle>
-          <a:p>
-            <a:pPr algn="ctr">
-              <a:lnSpc>
-                <a:spcPct val="100000"/>
-              </a:lnSpc>
-            </a:pPr>
-            <a:endParaRPr lang="pt-BR" sz="2800" cap="none" dirty="0">
-              <a:effectLst>
-                <a:outerShdw blurRad="50800" dist="38100" dir="5400000" algn="t" rotWithShape="0">
-                  <a:schemeClr val="bg1">
-                    <a:alpha val="40000"/>
-                  </a:schemeClr>
-                </a:outerShdw>
-              </a:effectLst>
-            </a:endParaRPr>
-          </a:p>
-          <a:p>
-            <a:pPr marL="857250" indent="-857250">
-              <a:lnSpc>
-                <a:spcPct val="100000"/>
-              </a:lnSpc>
-              <a:buFont typeface="Arial" panose="020B0604020202020204" pitchFamily="34" charset="0"/>
-              <a:buChar char="•"/>
-            </a:pPr>
-            <a:r>
-              <a:rPr lang="pt-BR" sz="2800" cap="none" dirty="0">
-                <a:effectLst>
-                  <a:outerShdw blurRad="50800" dist="38100" dir="5400000" algn="t" rotWithShape="0">
-                    <a:schemeClr val="bg1">
-                      <a:alpha val="40000"/>
-                    </a:schemeClr>
-                  </a:outerShdw>
-                </a:effectLst>
-              </a:rPr>
-              <a:t>SOAP é um protocolo padronizado pela W3C e existem aplicações fazendo uso do mesmo</a:t>
-            </a:r>
-          </a:p>
-          <a:p>
-            <a:pPr marL="857250" indent="-857250">
-              <a:lnSpc>
-                <a:spcPct val="100000"/>
-              </a:lnSpc>
-              <a:buFont typeface="Arial" panose="020B0604020202020204" pitchFamily="34" charset="0"/>
-              <a:buChar char="•"/>
-            </a:pPr>
-            <a:r>
-              <a:rPr lang="pt-BR" sz="2800" cap="none" dirty="0">
-                <a:effectLst>
-                  <a:outerShdw blurRad="50800" dist="38100" dir="5400000" algn="t" rotWithShape="0">
-                    <a:schemeClr val="bg1">
-                      <a:alpha val="40000"/>
-                    </a:schemeClr>
-                  </a:outerShdw>
-                </a:effectLst>
-              </a:rPr>
-              <a:t>Assim, você pode se deparar em ter que manter uma aplicação destas</a:t>
-            </a:r>
-          </a:p>
-          <a:p>
-            <a:pPr marL="857250" indent="-857250">
-              <a:lnSpc>
-                <a:spcPct val="100000"/>
-              </a:lnSpc>
-              <a:buFont typeface="Arial" panose="020B0604020202020204" pitchFamily="34" charset="0"/>
-              <a:buChar char="•"/>
-            </a:pPr>
-            <a:r>
-              <a:rPr lang="pt-BR" sz="2800" cap="none" dirty="0">
-                <a:effectLst>
-                  <a:outerShdw blurRad="50800" dist="38100" dir="5400000" algn="t" rotWithShape="0">
-                    <a:schemeClr val="bg1">
-                      <a:alpha val="40000"/>
-                    </a:schemeClr>
-                  </a:outerShdw>
-                </a:effectLst>
-              </a:rPr>
-              <a:t>Então pode ser bom conhecer o mínimo necessário</a:t>
-            </a:r>
-          </a:p>
-        </p:txBody>
-      </p:sp>
-    </p:spTree>
-    <p:extLst>
-      <p:ext uri="{BB962C8B-B14F-4D97-AF65-F5344CB8AC3E}">
-        <p14:creationId xmlns:p14="http://schemas.microsoft.com/office/powerpoint/2010/main" val="4244225043"/>
-      </p:ext>
-    </p:extLst>
-  </p:cSld>
-  <p:clrMapOvr>
-    <a:masterClrMapping/>
-  </p:clrMapOvr>
-  <p:timing>
-    <p:tnLst>
-      <p:par>
-        <p:cTn id="1" dur="indefinite" restart="never" nodeType="tmRoot">
-          <p:childTnLst>
-            <p:seq concurrent="1" nextAc="seek">
-              <p:cTn id="2" dur="indefinite" nodeType="mainSeq">
-                <p:childTnLst>
-                  <p:par>
-                    <p:cTn id="3" fill="hold">
-                      <p:stCondLst>
-                        <p:cond delay="indefinite"/>
-                      </p:stCondLst>
-                      <p:childTnLst>
-                        <p:par>
-                          <p:cTn id="4" fill="hold">
-                            <p:stCondLst>
-                              <p:cond delay="0"/>
-                            </p:stCondLst>
-                            <p:childTnLst>
-                              <p:par>
-                                <p:cTn id="5" presetID="9" presetClass="entr" presetSubtype="0" fill="hold" nodeType="clickEffect">
-                                  <p:stCondLst>
-                                    <p:cond delay="0"/>
-                                  </p:stCondLst>
-                                  <p:childTnLst>
-                                    <p:set>
-                                      <p:cBhvr>
-                                        <p:cTn id="6" dur="1" fill="hold">
-                                          <p:stCondLst>
-                                            <p:cond delay="0"/>
-                                          </p:stCondLst>
-                                        </p:cTn>
-                                        <p:tgtEl>
-                                          <p:spTgt spid="14">
-                                            <p:txEl>
-                                              <p:pRg st="1" end="1"/>
-                                            </p:txEl>
-                                          </p:spTgt>
-                                        </p:tgtEl>
-                                        <p:attrNameLst>
-                                          <p:attrName>style.visibility</p:attrName>
-                                        </p:attrNameLst>
-                                      </p:cBhvr>
-                                      <p:to>
-                                        <p:strVal val="visible"/>
-                                      </p:to>
-                                    </p:set>
-                                    <p:animEffect transition="in" filter="dissolve">
-                                      <p:cBhvr>
-                                        <p:cTn id="7" dur="500"/>
-                                        <p:tgtEl>
-                                          <p:spTgt spid="14">
-                                            <p:txEl>
-                                              <p:pRg st="1" end="1"/>
-                                            </p:txEl>
-                                          </p:spTgt>
-                                        </p:tgtEl>
-                                      </p:cBhvr>
-                                    </p:animEffect>
-                                  </p:childTnLst>
-                                </p:cTn>
-                              </p:par>
-                            </p:childTnLst>
-                          </p:cTn>
-                        </p:par>
-                      </p:childTnLst>
-                    </p:cTn>
-                  </p:par>
-                  <p:par>
-                    <p:cTn id="8" fill="hold">
-                      <p:stCondLst>
-                        <p:cond delay="indefinite"/>
-                      </p:stCondLst>
-                      <p:childTnLst>
-                        <p:par>
-                          <p:cTn id="9" fill="hold">
-                            <p:stCondLst>
-                              <p:cond delay="0"/>
-                            </p:stCondLst>
-                            <p:childTnLst>
-                              <p:par>
-                                <p:cTn id="10" presetID="9" presetClass="exit" presetSubtype="0" fill="hold" nodeType="clickEffect">
-                                  <p:stCondLst>
-                                    <p:cond delay="0"/>
-                                  </p:stCondLst>
-                                  <p:childTnLst>
-                                    <p:animEffect transition="out" filter="dissolve">
-                                      <p:cBhvr>
-                                        <p:cTn id="11" dur="500"/>
-                                        <p:tgtEl>
-                                          <p:spTgt spid="14">
-                                            <p:txEl>
-                                              <p:pRg st="1" end="1"/>
-                                            </p:txEl>
-                                          </p:spTgt>
-                                        </p:tgtEl>
-                                      </p:cBhvr>
-                                    </p:animEffect>
-                                    <p:set>
-                                      <p:cBhvr>
-                                        <p:cTn id="12" dur="1" fill="hold">
-                                          <p:stCondLst>
-                                            <p:cond delay="499"/>
-                                          </p:stCondLst>
-                                        </p:cTn>
-                                        <p:tgtEl>
-                                          <p:spTgt spid="14">
-                                            <p:txEl>
-                                              <p:pRg st="1" end="1"/>
-                                            </p:txEl>
-                                          </p:spTgt>
-                                        </p:tgtEl>
-                                        <p:attrNameLst>
-                                          <p:attrName>style.visibility</p:attrName>
-                                        </p:attrNameLst>
-                                      </p:cBhvr>
-                                      <p:to>
-                                        <p:strVal val="hidden"/>
-                                      </p:to>
-                                    </p:set>
-                                  </p:childTnLst>
-                                </p:cTn>
-                              </p:par>
-                              <p:par>
-                                <p:cTn id="13" presetID="9" presetClass="entr" presetSubtype="0" fill="hold" nodeType="withEffect">
-                                  <p:stCondLst>
-                                    <p:cond delay="0"/>
-                                  </p:stCondLst>
-                                  <p:childTnLst>
-                                    <p:set>
-                                      <p:cBhvr>
-                                        <p:cTn id="14" dur="1" fill="hold">
-                                          <p:stCondLst>
-                                            <p:cond delay="0"/>
-                                          </p:stCondLst>
-                                        </p:cTn>
-                                        <p:tgtEl>
-                                          <p:spTgt spid="14">
-                                            <p:txEl>
-                                              <p:pRg st="2" end="2"/>
-                                            </p:txEl>
-                                          </p:spTgt>
-                                        </p:tgtEl>
-                                        <p:attrNameLst>
-                                          <p:attrName>style.visibility</p:attrName>
-                                        </p:attrNameLst>
-                                      </p:cBhvr>
-                                      <p:to>
-                                        <p:strVal val="visible"/>
-                                      </p:to>
-                                    </p:set>
-                                    <p:animEffect transition="in" filter="dissolve">
-                                      <p:cBhvr>
-                                        <p:cTn id="15" dur="500"/>
-                                        <p:tgtEl>
-                                          <p:spTgt spid="14">
-                                            <p:txEl>
-                                              <p:pRg st="2" end="2"/>
-                                            </p:txEl>
-                                          </p:spTgt>
-                                        </p:tgtEl>
-                                      </p:cBhvr>
-                                    </p:animEffect>
-                                  </p:childTnLst>
-                                </p:cTn>
-                              </p:par>
-                            </p:childTnLst>
-                          </p:cTn>
-                        </p:par>
-                      </p:childTnLst>
-                    </p:cTn>
-                  </p:par>
-                  <p:par>
-                    <p:cTn id="16" fill="hold">
-                      <p:stCondLst>
-                        <p:cond delay="indefinite"/>
-                      </p:stCondLst>
-                      <p:childTnLst>
-                        <p:par>
-                          <p:cTn id="17" fill="hold">
-                            <p:stCondLst>
-                              <p:cond delay="0"/>
-                            </p:stCondLst>
-                            <p:childTnLst>
-                              <p:par>
-                                <p:cTn id="18" presetID="9" presetClass="exit" presetSubtype="0" fill="hold" grpId="0" nodeType="clickEffect">
-                                  <p:stCondLst>
-                                    <p:cond delay="0"/>
-                                  </p:stCondLst>
-                                  <p:childTnLst>
-                                    <p:animEffect transition="out" filter="dissolve">
-                                      <p:cBhvr>
-                                        <p:cTn id="19" dur="500"/>
-                                        <p:tgtEl>
-                                          <p:spTgt spid="14">
-                                            <p:txEl>
-                                              <p:pRg st="2" end="2"/>
-                                            </p:txEl>
-                                          </p:spTgt>
-                                        </p:tgtEl>
-                                      </p:cBhvr>
-                                    </p:animEffect>
-                                    <p:set>
-                                      <p:cBhvr>
-                                        <p:cTn id="20" dur="1" fill="hold">
-                                          <p:stCondLst>
-                                            <p:cond delay="499"/>
-                                          </p:stCondLst>
-                                        </p:cTn>
-                                        <p:tgtEl>
-                                          <p:spTgt spid="14">
-                                            <p:txEl>
-                                              <p:pRg st="2" end="2"/>
-                                            </p:txEl>
-                                          </p:spTgt>
-                                        </p:tgtEl>
-                                        <p:attrNameLst>
-                                          <p:attrName>style.visibility</p:attrName>
-                                        </p:attrNameLst>
-                                      </p:cBhvr>
-                                      <p:to>
-                                        <p:strVal val="hidden"/>
-                                      </p:to>
-                                    </p:set>
-                                  </p:childTnLst>
-                                </p:cTn>
-                              </p:par>
-                              <p:par>
-                                <p:cTn id="21" presetID="9" presetClass="entr" presetSubtype="0" fill="hold" nodeType="withEffect">
-                                  <p:stCondLst>
-                                    <p:cond delay="0"/>
-                                  </p:stCondLst>
-                                  <p:childTnLst>
-                                    <p:set>
-                                      <p:cBhvr>
-                                        <p:cTn id="22" dur="1" fill="hold">
-                                          <p:stCondLst>
-                                            <p:cond delay="0"/>
-                                          </p:stCondLst>
-                                        </p:cTn>
-                                        <p:tgtEl>
-                                          <p:spTgt spid="14">
-                                            <p:txEl>
-                                              <p:pRg st="3" end="3"/>
-                                            </p:txEl>
-                                          </p:spTgt>
-                                        </p:tgtEl>
-                                        <p:attrNameLst>
-                                          <p:attrName>style.visibility</p:attrName>
-                                        </p:attrNameLst>
-                                      </p:cBhvr>
-                                      <p:to>
-                                        <p:strVal val="visible"/>
-                                      </p:to>
-                                    </p:set>
-                                    <p:animEffect transition="in" filter="dissolve">
-                                      <p:cBhvr>
-                                        <p:cTn id="23" dur="500"/>
-                                        <p:tgtEl>
-                                          <p:spTgt spid="14">
-                                            <p:txEl>
-                                              <p:pRg st="3" end="3"/>
-                                            </p:txEl>
-                                          </p:spTgt>
-                                        </p:tgtEl>
-                                      </p:cBhvr>
-                                    </p:animEffect>
-                                  </p:childTnLst>
-                                </p:cTn>
-                              </p:par>
-                            </p:childTnLst>
-                          </p:cTn>
-                        </p:par>
-                      </p:childTnLst>
-                    </p:cTn>
-                  </p:par>
-                </p:childTnLst>
-              </p:cTn>
-              <p:prevCondLst>
-                <p:cond evt="onPrev" delay="0">
-                  <p:tgtEl>
-                    <p:sldTgt/>
-                  </p:tgtEl>
-                </p:cond>
-              </p:prevCondLst>
-              <p:nextCondLst>
-                <p:cond evt="onNext" delay="0">
-                  <p:tgtEl>
-                    <p:sldTgt/>
-                  </p:tgtEl>
-                </p:cond>
-              </p:nextCondLst>
-            </p:seq>
-          </p:childTnLst>
-        </p:cTn>
-      </p:par>
-    </p:tnLst>
-    <p:bldLst>
-      <p:bldP spid="14" grpId="0" uiExpand="1" build="allAtOnce"/>
     </p:bldLst>
   </p:timing>
 </p:sld>
@@ -18814,7 +18783,7 @@
                   </a:outerShdw>
                 </a:effectLst>
               </a:rPr>
-              <a:t>E o que mais? 🤔</a:t>
+              <a:t>Bem...</a:t>
             </a:r>
           </a:p>
         </p:txBody>
@@ -18871,7 +18840,7 @@
                 <a:spcPct val="100000"/>
               </a:lnSpc>
             </a:pPr>
-            <a:endParaRPr lang="pt-BR" sz="2800" cap="none" dirty="0">
+            <a:endParaRPr lang="pt-BR" sz="3200" cap="none" dirty="0">
               <a:effectLst>
                 <a:outerShdw blurRad="50800" dist="38100" dir="5400000" algn="t" rotWithShape="0">
                   <a:schemeClr val="bg1">
@@ -18890,7 +18859,7 @@
               <a:buChar char="•"/>
             </a:pPr>
             <a:r>
-              <a:rPr lang="pt-BR" sz="2800" cap="none" dirty="0">
+              <a:rPr lang="pt-BR" sz="3200" cap="none" dirty="0">
                 <a:effectLst>
                   <a:outerShdw blurRad="50800" dist="38100" dir="5400000" algn="t" rotWithShape="0">
                     <a:schemeClr val="bg1">
@@ -18899,7 +18868,7 @@
                   </a:outerShdw>
                 </a:effectLst>
               </a:rPr>
-              <a:t>Adicionalmente, analisando os problemas do SOAP conseguimos entender novas tecnologias</a:t>
+              <a:t>SOAP é um protocolo padronizado pela W3C e existem aplicações fazendo uso do mesmo</a:t>
             </a:r>
           </a:p>
           <a:p>
@@ -18911,7 +18880,7 @@
               <a:buChar char="•"/>
             </a:pPr>
             <a:r>
-              <a:rPr lang="pt-BR" sz="2800" cap="none" dirty="0">
+              <a:rPr lang="pt-BR" sz="3200" cap="none" dirty="0">
                 <a:effectLst>
                   <a:outerShdw blurRad="50800" dist="38100" dir="5400000" algn="t" rotWithShape="0">
                     <a:schemeClr val="bg1">
@@ -18920,7 +18889,7 @@
                   </a:outerShdw>
                 </a:effectLst>
               </a:rPr>
-              <a:t>Mas se você for desenvolver um projeto novo hoje, SOAP não é adequado</a:t>
+              <a:t>Assim, você pode se deparar em ter que manter uma aplicação destas</a:t>
             </a:r>
           </a:p>
           <a:p>
@@ -18932,7 +18901,7 @@
               <a:buChar char="•"/>
             </a:pPr>
             <a:r>
-              <a:rPr lang="pt-BR" sz="2800" cap="none" dirty="0">
+              <a:rPr lang="pt-BR" sz="3200" cap="none" dirty="0">
                 <a:effectLst>
                   <a:outerShdw blurRad="50800" dist="38100" dir="5400000" algn="t" rotWithShape="0">
                     <a:schemeClr val="bg1">
@@ -18941,33 +18910,15 @@
                   </a:outerShdw>
                 </a:effectLst>
               </a:rPr>
-              <a:t>Então vamos ver mais alguns detalhes importantes do SOAP.</a:t>
-            </a:r>
-          </a:p>
-          <a:p>
-            <a:pPr marL="857250" indent="-857250">
-              <a:lnSpc>
-                <a:spcPct val="100000"/>
-              </a:lnSpc>
-              <a:buFont typeface="Arial" panose="020B0604020202020204" pitchFamily="34" charset="0"/>
-              <a:buChar char="•"/>
-            </a:pPr>
-            <a:endParaRPr lang="pt-BR" sz="2800" cap="none" dirty="0">
-              <a:effectLst>
-                <a:outerShdw blurRad="50800" dist="38100" dir="5400000" algn="t" rotWithShape="0">
-                  <a:schemeClr val="bg1">
-                    <a:alpha val="40000"/>
-                  </a:schemeClr>
-                </a:outerShdw>
-              </a:effectLst>
-            </a:endParaRPr>
+              <a:t>Então pode ser bom conhecer o mínimo necessário</a:t>
+            </a:r>
           </a:p>
         </p:txBody>
       </p:sp>
     </p:spTree>
     <p:extLst>
       <p:ext uri="{BB962C8B-B14F-4D97-AF65-F5344CB8AC3E}">
-        <p14:creationId xmlns:p14="http://schemas.microsoft.com/office/powerpoint/2010/main" val="3553311171"/>
+        <p14:creationId xmlns:p14="http://schemas.microsoft.com/office/powerpoint/2010/main" val="4244225043"/>
       </p:ext>
     </p:extLst>
   </p:cSld>
@@ -18995,7 +18946,7 @@
                             </p:stCondLst>
                             <p:childTnLst>
                               <p:par>
-                                <p:cTn id="5" presetID="9" presetClass="entr" presetSubtype="0" fill="hold" grpId="0" nodeType="clickEffect">
+                                <p:cTn id="5" presetID="9" presetClass="entr" presetSubtype="0" fill="hold" nodeType="clickEffect">
                                   <p:stCondLst>
                                     <p:cond delay="0"/>
                                   </p:stCondLst>
@@ -19056,7 +19007,7 @@
                             </p:stCondLst>
                             <p:childTnLst>
                               <p:par>
-                                <p:cTn id="10" presetID="9" presetClass="exit" presetSubtype="0" fill="hold" grpId="1" nodeType="clickEffect">
+                                <p:cTn id="10" presetID="9" presetClass="exit" presetSubtype="0" fill="hold" nodeType="clickEffect">
                                   <p:stCondLst>
                                     <p:cond delay="0"/>
                                   </p:stCondLst>
@@ -19099,7 +19050,7 @@
                                 </p:cTn>
                               </p:par>
                               <p:par>
-                                <p:cTn id="13" presetID="9" presetClass="entr" presetSubtype="0" fill="hold" grpId="0" nodeType="withEffect">
+                                <p:cTn id="13" presetID="9" presetClass="entr" presetSubtype="0" fill="hold" nodeType="withEffect">
                                   <p:stCondLst>
                                     <p:cond delay="0"/>
                                   </p:stCondLst>
@@ -19160,7 +19111,7 @@
                             </p:stCondLst>
                             <p:childTnLst>
                               <p:par>
-                                <p:cTn id="18" presetID="9" presetClass="exit" presetSubtype="0" fill="hold" grpId="1" nodeType="clickEffect">
+                                <p:cTn id="18" presetID="9" presetClass="exit" presetSubtype="0" fill="hold" grpId="0" nodeType="clickEffect">
                                   <p:stCondLst>
                                     <p:cond delay="0"/>
                                   </p:stCondLst>
@@ -19203,7 +19154,7 @@
                                 </p:cTn>
                               </p:par>
                               <p:par>
-                                <p:cTn id="21" presetID="9" presetClass="entr" presetSubtype="0" fill="hold" grpId="0" nodeType="withEffect">
+                                <p:cTn id="21" presetID="9" presetClass="entr" presetSubtype="0" fill="hold" nodeType="withEffect">
                                   <p:stCondLst>
                                     <p:cond delay="0"/>
                                   </p:stCondLst>
@@ -19273,8 +19224,7 @@
       </p:par>
     </p:tnLst>
     <p:bldLst>
-      <p:bldP spid="14" grpId="0" uiExpand="1" build="p"/>
-      <p:bldP spid="14" grpId="1" uiExpand="1" build="allAtOnce"/>
+      <p:bldP spid="14" grpId="0" uiExpand="1" build="allAtOnce"/>
     </p:bldLst>
   </p:timing>
 </p:sld>
@@ -19639,6 +19589,839 @@
 </file>
 
 <file path=ppt/slides/slide30.xml><?xml version="1.0" encoding="utf-8"?>
+<p:sld xmlns:a="http://schemas.openxmlformats.org/drawingml/2006/main" xmlns:r="http://schemas.openxmlformats.org/officeDocument/2006/relationships" xmlns:p="http://schemas.openxmlformats.org/presentationml/2006/main" showMasterSp="0">
+  <p:cSld>
+    <p:bg>
+      <p:bgPr>
+        <a:blipFill dpi="0" rotWithShape="1">
+          <a:blip r:embed="rId2">
+            <a:alphaModFix amt="26000"/>
+            <a:lum/>
+          </a:blip>
+          <a:srcRect/>
+          <a:stretch>
+            <a:fillRect l="-4000" r="-4000"/>
+          </a:stretch>
+        </a:blipFill>
+        <a:effectLst/>
+      </p:bgPr>
+    </p:bg>
+    <p:spTree>
+      <p:nvGrpSpPr>
+        <p:cNvPr id="1" name=""/>
+        <p:cNvGrpSpPr/>
+        <p:nvPr/>
+      </p:nvGrpSpPr>
+      <p:grpSpPr>
+        <a:xfrm>
+          <a:off x="0" y="0"/>
+          <a:ext cx="0" cy="0"/>
+          <a:chOff x="0" y="0"/>
+          <a:chExt cx="0" cy="0"/>
+        </a:xfrm>
+      </p:grpSpPr>
+      <p:sp>
+        <p:nvSpPr>
+          <p:cNvPr id="2" name="Title 1">
+            <a:extLst>
+              <a:ext uri="{FF2B5EF4-FFF2-40B4-BE49-F238E27FC236}">
+                <a16:creationId xmlns:a16="http://schemas.microsoft.com/office/drawing/2014/main" id="{F3586F40-8B2F-1D48-BCAE-10E66B9B47BC}"/>
+              </a:ext>
+            </a:extLst>
+          </p:cNvPr>
+          <p:cNvSpPr>
+            <a:spLocks noGrp="1"/>
+          </p:cNvSpPr>
+          <p:nvPr>
+            <p:ph type="ctrTitle"/>
+          </p:nvPr>
+        </p:nvSpPr>
+        <p:spPr>
+          <a:xfrm>
+            <a:off x="1371600" y="109518"/>
+            <a:ext cx="9448800" cy="1109682"/>
+          </a:xfrm>
+        </p:spPr>
+        <p:txBody>
+          <a:bodyPr>
+            <a:noAutofit/>
+          </a:bodyPr>
+          <a:lstStyle/>
+          <a:p>
+            <a:pPr algn="ctr"/>
+            <a:r>
+              <a:rPr lang="pt-BR" sz="7200" cap="none" dirty="0">
+                <a:effectLst>
+                  <a:outerShdw blurRad="50800" dist="38100" dir="5400000" algn="t" rotWithShape="0">
+                    <a:schemeClr val="bg1">
+                      <a:alpha val="40000"/>
+                    </a:schemeClr>
+                  </a:outerShdw>
+                </a:effectLst>
+              </a:rPr>
+              <a:t>E o que mais? 🤔</a:t>
+            </a:r>
+          </a:p>
+        </p:txBody>
+      </p:sp>
+      <p:sp>
+        <p:nvSpPr>
+          <p:cNvPr id="14" name="Title 1">
+            <a:extLst>
+              <a:ext uri="{FF2B5EF4-FFF2-40B4-BE49-F238E27FC236}">
+                <a16:creationId xmlns:a16="http://schemas.microsoft.com/office/drawing/2014/main" id="{2C255C9B-00D3-5646-ACE4-56A1BF66B5FF}"/>
+              </a:ext>
+            </a:extLst>
+          </p:cNvPr>
+          <p:cNvSpPr txBox="1">
+            <a:spLocks/>
+          </p:cNvSpPr>
+          <p:nvPr/>
+        </p:nvSpPr>
+        <p:spPr>
+          <a:xfrm>
+            <a:off x="384313" y="1264388"/>
+            <a:ext cx="11293025" cy="5215924"/>
+          </a:xfrm>
+          <a:prstGeom prst="rect">
+            <a:avLst/>
+          </a:prstGeom>
+        </p:spPr>
+        <p:txBody>
+          <a:bodyPr vert="horz" lIns="91440" tIns="45720" rIns="91440" bIns="45720" rtlCol="0" anchor="t">
+            <a:noAutofit/>
+          </a:bodyPr>
+          <a:lstStyle>
+            <a:lvl1pPr algn="l" defTabSz="914400" rtl="0" eaLnBrk="1" latinLnBrk="0" hangingPunct="1">
+              <a:lnSpc>
+                <a:spcPct val="90000"/>
+              </a:lnSpc>
+              <a:spcBef>
+                <a:spcPct val="0"/>
+              </a:spcBef>
+              <a:buNone/>
+              <a:defRPr sz="6000" kern="1200" cap="all" baseline="0">
+                <a:solidFill>
+                  <a:schemeClr val="tx1"/>
+                </a:solidFill>
+                <a:latin typeface="+mj-lt"/>
+                <a:ea typeface="+mj-ea"/>
+                <a:cs typeface="+mj-cs"/>
+              </a:defRPr>
+            </a:lvl1pPr>
+          </a:lstStyle>
+          <a:p>
+            <a:pPr algn="ctr">
+              <a:lnSpc>
+                <a:spcPct val="100000"/>
+              </a:lnSpc>
+            </a:pPr>
+            <a:endParaRPr lang="pt-BR" sz="3200" cap="none" dirty="0">
+              <a:effectLst>
+                <a:outerShdw blurRad="50800" dist="38100" dir="5400000" algn="t" rotWithShape="0">
+                  <a:schemeClr val="bg1">
+                    <a:alpha val="40000"/>
+                  </a:schemeClr>
+                </a:outerShdw>
+              </a:effectLst>
+            </a:endParaRPr>
+          </a:p>
+          <a:p>
+            <a:pPr marL="857250" indent="-857250">
+              <a:lnSpc>
+                <a:spcPct val="100000"/>
+              </a:lnSpc>
+              <a:buFont typeface="Arial" panose="020B0604020202020204" pitchFamily="34" charset="0"/>
+              <a:buChar char="•"/>
+            </a:pPr>
+            <a:r>
+              <a:rPr lang="pt-BR" sz="3200" cap="none" dirty="0">
+                <a:effectLst>
+                  <a:outerShdw blurRad="50800" dist="38100" dir="5400000" algn="t" rotWithShape="0">
+                    <a:schemeClr val="bg1">
+                      <a:alpha val="40000"/>
+                    </a:schemeClr>
+                  </a:outerShdw>
+                </a:effectLst>
+              </a:rPr>
+              <a:t>Adicionalmente, analisando os problemas do SOAP conseguimos entender novas tecnologias</a:t>
+            </a:r>
+          </a:p>
+          <a:p>
+            <a:pPr marL="857250" indent="-857250">
+              <a:lnSpc>
+                <a:spcPct val="100000"/>
+              </a:lnSpc>
+              <a:buFont typeface="Arial" panose="020B0604020202020204" pitchFamily="34" charset="0"/>
+              <a:buChar char="•"/>
+            </a:pPr>
+            <a:r>
+              <a:rPr lang="pt-BR" sz="3200" cap="none" dirty="0">
+                <a:effectLst>
+                  <a:outerShdw blurRad="50800" dist="38100" dir="5400000" algn="t" rotWithShape="0">
+                    <a:schemeClr val="bg1">
+                      <a:alpha val="40000"/>
+                    </a:schemeClr>
+                  </a:outerShdw>
+                </a:effectLst>
+              </a:rPr>
+              <a:t>Mas se você for desenvolver um projeto novo hoje, SOAP não é adequado</a:t>
+            </a:r>
+          </a:p>
+          <a:p>
+            <a:pPr marL="857250" indent="-857250">
+              <a:lnSpc>
+                <a:spcPct val="100000"/>
+              </a:lnSpc>
+              <a:buFont typeface="Arial" panose="020B0604020202020204" pitchFamily="34" charset="0"/>
+              <a:buChar char="•"/>
+            </a:pPr>
+            <a:r>
+              <a:rPr lang="pt-BR" sz="3200" cap="none" dirty="0">
+                <a:effectLst>
+                  <a:outerShdw blurRad="50800" dist="38100" dir="5400000" algn="t" rotWithShape="0">
+                    <a:schemeClr val="bg1">
+                      <a:alpha val="40000"/>
+                    </a:schemeClr>
+                  </a:outerShdw>
+                </a:effectLst>
+              </a:rPr>
+              <a:t>SOAP é um protocolo atualmente obsoleto</a:t>
+            </a:r>
+          </a:p>
+          <a:p>
+            <a:pPr marL="857250" indent="-857250">
+              <a:lnSpc>
+                <a:spcPct val="100000"/>
+              </a:lnSpc>
+              <a:buFont typeface="Arial" panose="020B0604020202020204" pitchFamily="34" charset="0"/>
+              <a:buChar char="•"/>
+            </a:pPr>
+            <a:r>
+              <a:rPr lang="pt-BR" sz="3200" cap="none" dirty="0">
+                <a:effectLst>
+                  <a:outerShdw blurRad="50800" dist="38100" dir="5400000" algn="t" rotWithShape="0">
+                    <a:schemeClr val="bg1">
+                      <a:alpha val="40000"/>
+                    </a:schemeClr>
+                  </a:outerShdw>
+                </a:effectLst>
+              </a:rPr>
+              <a:t>Provedores de computação em nuvem como a </a:t>
+            </a:r>
+            <a:r>
+              <a:rPr lang="pt-BR" sz="3200" cap="none" dirty="0" err="1">
+                <a:effectLst>
+                  <a:outerShdw blurRad="50800" dist="38100" dir="5400000" algn="t" rotWithShape="0">
+                    <a:schemeClr val="bg1">
+                      <a:alpha val="40000"/>
+                    </a:schemeClr>
+                  </a:outerShdw>
+                </a:effectLst>
+              </a:rPr>
+              <a:t>Amazon</a:t>
+            </a:r>
+            <a:r>
+              <a:rPr lang="pt-BR" sz="3200" cap="none" dirty="0">
+                <a:effectLst>
+                  <a:outerShdw blurRad="50800" dist="38100" dir="5400000" algn="t" rotWithShape="0">
+                    <a:schemeClr val="bg1">
+                      <a:alpha val="40000"/>
+                    </a:schemeClr>
+                  </a:outerShdw>
+                </a:effectLst>
+              </a:rPr>
+              <a:t> já não dão suporte a tal protocolo </a:t>
+            </a:r>
+            <a:r>
+              <a:rPr lang="pt-BR" sz="3200" cap="none" dirty="0">
+                <a:effectLst>
+                  <a:outerShdw blurRad="50800" dist="38100" dir="5400000" algn="t" rotWithShape="0">
+                    <a:schemeClr val="bg1">
+                      <a:alpha val="40000"/>
+                    </a:schemeClr>
+                  </a:outerShdw>
+                </a:effectLst>
+                <a:hlinkClick r:id="rId3"/>
+              </a:rPr>
+              <a:t>[1]</a:t>
+            </a:r>
+            <a:endParaRPr lang="pt-BR" sz="3200" cap="none" dirty="0">
+              <a:effectLst>
+                <a:outerShdw blurRad="50800" dist="38100" dir="5400000" algn="t" rotWithShape="0">
+                  <a:schemeClr val="bg1">
+                    <a:alpha val="40000"/>
+                  </a:schemeClr>
+                </a:outerShdw>
+              </a:effectLst>
+            </a:endParaRPr>
+          </a:p>
+          <a:p>
+            <a:pPr marL="857250" indent="-857250">
+              <a:lnSpc>
+                <a:spcPct val="100000"/>
+              </a:lnSpc>
+              <a:buFont typeface="Arial" panose="020B0604020202020204" pitchFamily="34" charset="0"/>
+              <a:buChar char="•"/>
+            </a:pPr>
+            <a:r>
+              <a:rPr lang="pt-BR" sz="3200" cap="none" dirty="0">
+                <a:effectLst>
+                  <a:outerShdw blurRad="50800" dist="38100" dir="5400000" algn="t" rotWithShape="0">
+                    <a:schemeClr val="bg1">
+                      <a:alpha val="40000"/>
+                    </a:schemeClr>
+                  </a:outerShdw>
+                </a:effectLst>
+              </a:rPr>
+              <a:t>Então vamos ver mais alguns detalhes importantes do SOAP.</a:t>
+            </a:r>
+          </a:p>
+          <a:p>
+            <a:pPr marL="857250" indent="-857250">
+              <a:lnSpc>
+                <a:spcPct val="100000"/>
+              </a:lnSpc>
+              <a:buFont typeface="Arial" panose="020B0604020202020204" pitchFamily="34" charset="0"/>
+              <a:buChar char="•"/>
+            </a:pPr>
+            <a:endParaRPr lang="pt-BR" sz="3200" cap="none" dirty="0">
+              <a:effectLst>
+                <a:outerShdw blurRad="50800" dist="38100" dir="5400000" algn="t" rotWithShape="0">
+                  <a:schemeClr val="bg1">
+                    <a:alpha val="40000"/>
+                  </a:schemeClr>
+                </a:outerShdw>
+              </a:effectLst>
+            </a:endParaRPr>
+          </a:p>
+        </p:txBody>
+      </p:sp>
+    </p:spTree>
+    <p:extLst>
+      <p:ext uri="{BB962C8B-B14F-4D97-AF65-F5344CB8AC3E}">
+        <p14:creationId xmlns:p14="http://schemas.microsoft.com/office/powerpoint/2010/main" val="3553311171"/>
+      </p:ext>
+    </p:extLst>
+  </p:cSld>
+  <p:clrMapOvr>
+    <a:masterClrMapping/>
+  </p:clrMapOvr>
+  <p:timing>
+    <p:tnLst>
+      <p:par>
+        <p:cTn id="1" dur="indefinite" restart="never" nodeType="tmRoot">
+          <p:childTnLst>
+            <p:seq concurrent="1" nextAc="seek">
+              <p:cTn id="2" dur="indefinite" nodeType="mainSeq">
+                <p:childTnLst>
+                  <p:par>
+                    <p:cTn id="3" fill="hold">
+                      <p:stCondLst>
+                        <p:cond delay="indefinite"/>
+                      </p:stCondLst>
+                      <p:childTnLst>
+                        <p:par>
+                          <p:cTn id="4" fill="hold">
+                            <p:stCondLst>
+                              <p:cond delay="0"/>
+                            </p:stCondLst>
+                            <p:childTnLst>
+                              <p:par>
+                                <p:cTn id="5" presetID="9" presetClass="entr" presetSubtype="0" fill="hold" grpId="0" nodeType="clickEffect">
+                                  <p:stCondLst>
+                                    <p:cond delay="0"/>
+                                  </p:stCondLst>
+                                  <p:childTnLst>
+                                    <p:set>
+                                      <p:cBhvr>
+                                        <p:cTn id="6" dur="1" fill="hold">
+                                          <p:stCondLst>
+                                            <p:cond delay="0"/>
+                                          </p:stCondLst>
+                                        </p:cTn>
+                                        <p:tgtEl>
+                                          <p:spTgt spid="14">
+                                            <p:txEl>
+                                              <p:pRg st="1" end="1"/>
+                                            </p:txEl>
+                                          </p:spTgt>
+                                        </p:tgtEl>
+                                        <p:attrNameLst>
+                                          <p:attrName>style.visibility</p:attrName>
+                                        </p:attrNameLst>
+                                      </p:cBhvr>
+                                      <p:to>
+                                        <p:strVal val="visible"/>
+                                      </p:to>
+                                    </p:set>
+                                    <p:animEffect transition="in" filter="dissolve">
+                                      <p:cBhvr>
+                                        <p:cTn id="7" dur="500"/>
+                                        <p:tgtEl>
+                                          <p:spTgt spid="14">
+                                            <p:txEl>
+                                              <p:pRg st="1" end="1"/>
+                                            </p:txEl>
+                                          </p:spTgt>
+                                        </p:tgtEl>
+                                      </p:cBhvr>
+                                    </p:animEffect>
+                                  </p:childTnLst>
+                                </p:cTn>
+                              </p:par>
+                            </p:childTnLst>
+                          </p:cTn>
+                        </p:par>
+                      </p:childTnLst>
+                    </p:cTn>
+                  </p:par>
+                  <p:par>
+                    <p:cTn id="8" fill="hold">
+                      <p:stCondLst>
+                        <p:cond delay="indefinite"/>
+                      </p:stCondLst>
+                      <p:childTnLst>
+                        <p:par>
+                          <p:cTn id="9" fill="hold">
+                            <p:stCondLst>
+                              <p:cond delay="0"/>
+                            </p:stCondLst>
+                            <p:childTnLst>
+                              <p:par>
+                                <p:cTn id="10" presetID="9" presetClass="exit" presetSubtype="0" fill="hold" grpId="1" nodeType="clickEffect">
+                                  <p:stCondLst>
+                                    <p:cond delay="0"/>
+                                  </p:stCondLst>
+                                  <p:childTnLst>
+                                    <p:animEffect transition="out" filter="dissolve">
+                                      <p:cBhvr>
+                                        <p:cTn id="11" dur="500"/>
+                                        <p:tgtEl>
+                                          <p:spTgt spid="14">
+                                            <p:txEl>
+                                              <p:pRg st="1" end="1"/>
+                                            </p:txEl>
+                                          </p:spTgt>
+                                        </p:tgtEl>
+                                      </p:cBhvr>
+                                    </p:animEffect>
+                                    <p:set>
+                                      <p:cBhvr>
+                                        <p:cTn id="12" dur="1" fill="hold">
+                                          <p:stCondLst>
+                                            <p:cond delay="499"/>
+                                          </p:stCondLst>
+                                        </p:cTn>
+                                        <p:tgtEl>
+                                          <p:spTgt spid="14">
+                                            <p:txEl>
+                                              <p:pRg st="1" end="1"/>
+                                            </p:txEl>
+                                          </p:spTgt>
+                                        </p:tgtEl>
+                                        <p:attrNameLst>
+                                          <p:attrName>style.visibility</p:attrName>
+                                        </p:attrNameLst>
+                                      </p:cBhvr>
+                                      <p:to>
+                                        <p:strVal val="hidden"/>
+                                      </p:to>
+                                    </p:set>
+                                  </p:childTnLst>
+                                </p:cTn>
+                              </p:par>
+                              <p:par>
+                                <p:cTn id="13" presetID="9" presetClass="entr" presetSubtype="0" fill="hold" grpId="0" nodeType="withEffect">
+                                  <p:stCondLst>
+                                    <p:cond delay="0"/>
+                                  </p:stCondLst>
+                                  <p:childTnLst>
+                                    <p:set>
+                                      <p:cBhvr>
+                                        <p:cTn id="14" dur="1" fill="hold">
+                                          <p:stCondLst>
+                                            <p:cond delay="0"/>
+                                          </p:stCondLst>
+                                        </p:cTn>
+                                        <p:tgtEl>
+                                          <p:spTgt spid="14">
+                                            <p:txEl>
+                                              <p:pRg st="2" end="2"/>
+                                            </p:txEl>
+                                          </p:spTgt>
+                                        </p:tgtEl>
+                                        <p:attrNameLst>
+                                          <p:attrName>style.visibility</p:attrName>
+                                        </p:attrNameLst>
+                                      </p:cBhvr>
+                                      <p:to>
+                                        <p:strVal val="visible"/>
+                                      </p:to>
+                                    </p:set>
+                                    <p:animEffect transition="in" filter="dissolve">
+                                      <p:cBhvr>
+                                        <p:cTn id="15" dur="500"/>
+                                        <p:tgtEl>
+                                          <p:spTgt spid="14">
+                                            <p:txEl>
+                                              <p:pRg st="2" end="2"/>
+                                            </p:txEl>
+                                          </p:spTgt>
+                                        </p:tgtEl>
+                                      </p:cBhvr>
+                                    </p:animEffect>
+                                  </p:childTnLst>
+                                </p:cTn>
+                              </p:par>
+                            </p:childTnLst>
+                          </p:cTn>
+                        </p:par>
+                      </p:childTnLst>
+                    </p:cTn>
+                  </p:par>
+                  <p:par>
+                    <p:cTn id="16" fill="hold">
+                      <p:stCondLst>
+                        <p:cond delay="indefinite"/>
+                      </p:stCondLst>
+                      <p:childTnLst>
+                        <p:par>
+                          <p:cTn id="17" fill="hold">
+                            <p:stCondLst>
+                              <p:cond delay="0"/>
+                            </p:stCondLst>
+                            <p:childTnLst>
+                              <p:par>
+                                <p:cTn id="18" presetID="9" presetClass="entr" presetSubtype="0" fill="hold" grpId="0" nodeType="clickEffect">
+                                  <p:stCondLst>
+                                    <p:cond delay="0"/>
+                                  </p:stCondLst>
+                                  <p:childTnLst>
+                                    <p:set>
+                                      <p:cBhvr>
+                                        <p:cTn id="19" dur="1" fill="hold">
+                                          <p:stCondLst>
+                                            <p:cond delay="0"/>
+                                          </p:stCondLst>
+                                        </p:cTn>
+                                        <p:tgtEl>
+                                          <p:spTgt spid="14">
+                                            <p:txEl>
+                                              <p:pRg st="3" end="3"/>
+                                            </p:txEl>
+                                          </p:spTgt>
+                                        </p:tgtEl>
+                                        <p:attrNameLst>
+                                          <p:attrName>style.visibility</p:attrName>
+                                        </p:attrNameLst>
+                                      </p:cBhvr>
+                                      <p:to>
+                                        <p:strVal val="visible"/>
+                                      </p:to>
+                                    </p:set>
+                                    <p:animEffect transition="in" filter="dissolve">
+                                      <p:cBhvr>
+                                        <p:cTn id="20" dur="500"/>
+                                        <p:tgtEl>
+                                          <p:spTgt spid="14">
+                                            <p:txEl>
+                                              <p:pRg st="3" end="3"/>
+                                            </p:txEl>
+                                          </p:spTgt>
+                                        </p:tgtEl>
+                                      </p:cBhvr>
+                                    </p:animEffect>
+                                  </p:childTnLst>
+                                </p:cTn>
+                              </p:par>
+                            </p:childTnLst>
+                          </p:cTn>
+                        </p:par>
+                      </p:childTnLst>
+                    </p:cTn>
+                  </p:par>
+                  <p:par>
+                    <p:cTn id="21" fill="hold">
+                      <p:stCondLst>
+                        <p:cond delay="indefinite"/>
+                      </p:stCondLst>
+                      <p:childTnLst>
+                        <p:par>
+                          <p:cTn id="22" fill="hold">
+                            <p:stCondLst>
+                              <p:cond delay="0"/>
+                            </p:stCondLst>
+                            <p:childTnLst>
+                              <p:par>
+                                <p:cTn id="23" presetID="9" presetClass="entr" presetSubtype="0" fill="hold" grpId="0" nodeType="clickEffect">
+                                  <p:stCondLst>
+                                    <p:cond delay="0"/>
+                                  </p:stCondLst>
+                                  <p:childTnLst>
+                                    <p:set>
+                                      <p:cBhvr>
+                                        <p:cTn id="24" dur="1" fill="hold">
+                                          <p:stCondLst>
+                                            <p:cond delay="0"/>
+                                          </p:stCondLst>
+                                        </p:cTn>
+                                        <p:tgtEl>
+                                          <p:spTgt spid="14">
+                                            <p:txEl>
+                                              <p:pRg st="4" end="4"/>
+                                            </p:txEl>
+                                          </p:spTgt>
+                                        </p:tgtEl>
+                                        <p:attrNameLst>
+                                          <p:attrName>style.visibility</p:attrName>
+                                        </p:attrNameLst>
+                                      </p:cBhvr>
+                                      <p:to>
+                                        <p:strVal val="visible"/>
+                                      </p:to>
+                                    </p:set>
+                                    <p:animEffect transition="in" filter="dissolve">
+                                      <p:cBhvr>
+                                        <p:cTn id="25" dur="500"/>
+                                        <p:tgtEl>
+                                          <p:spTgt spid="14">
+                                            <p:txEl>
+                                              <p:pRg st="4" end="4"/>
+                                            </p:txEl>
+                                          </p:spTgt>
+                                        </p:tgtEl>
+                                      </p:cBhvr>
+                                    </p:animEffect>
+                                  </p:childTnLst>
+                                </p:cTn>
+                              </p:par>
+                            </p:childTnLst>
+                          </p:cTn>
+                        </p:par>
+                      </p:childTnLst>
+                    </p:cTn>
+                  </p:par>
+                  <p:par>
+                    <p:cTn id="26" fill="hold">
+                      <p:stCondLst>
+                        <p:cond delay="indefinite"/>
+                      </p:stCondLst>
+                      <p:childTnLst>
+                        <p:par>
+                          <p:cTn id="27" fill="hold">
+                            <p:stCondLst>
+                              <p:cond delay="0"/>
+                            </p:stCondLst>
+                            <p:childTnLst>
+                              <p:par>
+                                <p:cTn id="28" presetID="9" presetClass="exit" presetSubtype="0" fill="hold" grpId="1" nodeType="clickEffect">
+                                  <p:stCondLst>
+                                    <p:cond delay="0"/>
+                                  </p:stCondLst>
+                                  <p:childTnLst>
+                                    <p:animEffect transition="out" filter="dissolve">
+                                      <p:cBhvr>
+                                        <p:cTn id="29" dur="500"/>
+                                        <p:tgtEl>
+                                          <p:spTgt spid="14">
+                                            <p:txEl>
+                                              <p:pRg st="2" end="2"/>
+                                            </p:txEl>
+                                          </p:spTgt>
+                                        </p:tgtEl>
+                                      </p:cBhvr>
+                                    </p:animEffect>
+                                    <p:set>
+                                      <p:cBhvr>
+                                        <p:cTn id="30" dur="1" fill="hold">
+                                          <p:stCondLst>
+                                            <p:cond delay="499"/>
+                                          </p:stCondLst>
+                                        </p:cTn>
+                                        <p:tgtEl>
+                                          <p:spTgt spid="14">
+                                            <p:txEl>
+                                              <p:pRg st="2" end="2"/>
+                                            </p:txEl>
+                                          </p:spTgt>
+                                        </p:tgtEl>
+                                        <p:attrNameLst>
+                                          <p:attrName>style.visibility</p:attrName>
+                                        </p:attrNameLst>
+                                      </p:cBhvr>
+                                      <p:to>
+                                        <p:strVal val="hidden"/>
+                                      </p:to>
+                                    </p:set>
+                                  </p:childTnLst>
+                                </p:cTn>
+                              </p:par>
+                              <p:par>
+                                <p:cTn id="31" presetID="9" presetClass="exit" presetSubtype="0" fill="hold" grpId="1" nodeType="withEffect">
+                                  <p:stCondLst>
+                                    <p:cond delay="0"/>
+                                  </p:stCondLst>
+                                  <p:childTnLst>
+                                    <p:animEffect transition="out" filter="dissolve">
+                                      <p:cBhvr>
+                                        <p:cTn id="32" dur="500"/>
+                                        <p:tgtEl>
+                                          <p:spTgt spid="14">
+                                            <p:txEl>
+                                              <p:pRg st="3" end="3"/>
+                                            </p:txEl>
+                                          </p:spTgt>
+                                        </p:tgtEl>
+                                      </p:cBhvr>
+                                    </p:animEffect>
+                                    <p:set>
+                                      <p:cBhvr>
+                                        <p:cTn id="33" dur="1" fill="hold">
+                                          <p:stCondLst>
+                                            <p:cond delay="499"/>
+                                          </p:stCondLst>
+                                        </p:cTn>
+                                        <p:tgtEl>
+                                          <p:spTgt spid="14">
+                                            <p:txEl>
+                                              <p:pRg st="3" end="3"/>
+                                            </p:txEl>
+                                          </p:spTgt>
+                                        </p:tgtEl>
+                                        <p:attrNameLst>
+                                          <p:attrName>style.visibility</p:attrName>
+                                        </p:attrNameLst>
+                                      </p:cBhvr>
+                                      <p:to>
+                                        <p:strVal val="hidden"/>
+                                      </p:to>
+                                    </p:set>
+                                  </p:childTnLst>
+                                </p:cTn>
+                              </p:par>
+                              <p:par>
+                                <p:cTn id="34" presetID="9" presetClass="exit" presetSubtype="0" fill="hold" grpId="1" nodeType="withEffect">
+                                  <p:stCondLst>
+                                    <p:cond delay="0"/>
+                                  </p:stCondLst>
+                                  <p:childTnLst>
+                                    <p:animEffect transition="out" filter="dissolve">
+                                      <p:cBhvr>
+                                        <p:cTn id="35" dur="500"/>
+                                        <p:tgtEl>
+                                          <p:spTgt spid="14">
+                                            <p:txEl>
+                                              <p:pRg st="4" end="4"/>
+                                            </p:txEl>
+                                          </p:spTgt>
+                                        </p:tgtEl>
+                                      </p:cBhvr>
+                                    </p:animEffect>
+                                    <p:set>
+                                      <p:cBhvr>
+                                        <p:cTn id="36" dur="1" fill="hold">
+                                          <p:stCondLst>
+                                            <p:cond delay="499"/>
+                                          </p:stCondLst>
+                                        </p:cTn>
+                                        <p:tgtEl>
+                                          <p:spTgt spid="14">
+                                            <p:txEl>
+                                              <p:pRg st="4" end="4"/>
+                                            </p:txEl>
+                                          </p:spTgt>
+                                        </p:tgtEl>
+                                        <p:attrNameLst>
+                                          <p:attrName>style.visibility</p:attrName>
+                                        </p:attrNameLst>
+                                      </p:cBhvr>
+                                      <p:to>
+                                        <p:strVal val="hidden"/>
+                                      </p:to>
+                                    </p:set>
+                                  </p:childTnLst>
+                                </p:cTn>
+                              </p:par>
+                              <p:par>
+                                <p:cTn id="37" presetID="9" presetClass="entr" presetSubtype="0" fill="hold" grpId="0" nodeType="withEffect">
+                                  <p:stCondLst>
+                                    <p:cond delay="0"/>
+                                  </p:stCondLst>
+                                  <p:childTnLst>
+                                    <p:set>
+                                      <p:cBhvr>
+                                        <p:cTn id="38" dur="1" fill="hold">
+                                          <p:stCondLst>
+                                            <p:cond delay="0"/>
+                                          </p:stCondLst>
+                                        </p:cTn>
+                                        <p:tgtEl>
+                                          <p:spTgt spid="14">
+                                            <p:txEl>
+                                              <p:pRg st="5" end="5"/>
+                                            </p:txEl>
+                                          </p:spTgt>
+                                        </p:tgtEl>
+                                        <p:attrNameLst>
+                                          <p:attrName>style.visibility</p:attrName>
+                                        </p:attrNameLst>
+                                      </p:cBhvr>
+                                      <p:to>
+                                        <p:strVal val="visible"/>
+                                      </p:to>
+                                    </p:set>
+                                    <p:animEffect transition="in" filter="dissolve">
+                                      <p:cBhvr>
+                                        <p:cTn id="39" dur="500"/>
+                                        <p:tgtEl>
+                                          <p:spTgt spid="14">
+                                            <p:txEl>
+                                              <p:pRg st="5" end="5"/>
+                                            </p:txEl>
+                                          </p:spTgt>
+                                        </p:tgtEl>
+                                      </p:cBhvr>
+                                    </p:animEffect>
+                                  </p:childTnLst>
+                                </p:cTn>
+                              </p:par>
+                            </p:childTnLst>
+                          </p:cTn>
+                        </p:par>
+                      </p:childTnLst>
+                    </p:cTn>
+                  </p:par>
+                </p:childTnLst>
+              </p:cTn>
+              <p:prevCondLst>
+                <p:cond evt="onPrev" delay="0">
+                  <p:tgtEl>
+                    <p:sldTgt/>
+                  </p:tgtEl>
+                </p:cond>
+              </p:prevCondLst>
+              <p:nextCondLst>
+                <p:cond evt="onNext" delay="0">
+                  <p:tgtEl>
+                    <p:sldTgt/>
+                  </p:tgtEl>
+                </p:cond>
+              </p:nextCondLst>
+            </p:seq>
+          </p:childTnLst>
+        </p:cTn>
+      </p:par>
+    </p:tnLst>
+    <p:bldLst>
+      <p:bldP spid="14" grpId="0" uiExpand="1" build="p"/>
+      <p:bldP spid="14" grpId="1" uiExpand="1" build="allAtOnce"/>
+    </p:bldLst>
+  </p:timing>
+</p:sld>
+</file>
+
+<file path=ppt/slides/slide31.xml><?xml version="1.0" encoding="utf-8"?>
 <p:sld xmlns:a="http://schemas.openxmlformats.org/drawingml/2006/main" xmlns:r="http://schemas.openxmlformats.org/officeDocument/2006/relationships" xmlns:p="http://schemas.openxmlformats.org/presentationml/2006/main">
   <p:cSld>
     <p:spTree>
@@ -19723,7 +20506,7 @@
           <a:p>
             <a:fld id="{2183B7EE-0FBE-B749-875F-ED24F5ECD71F}" type="slidenum">
               <a:rPr lang="en-US" smtClean="0"/>
-              <a:t>30</a:t>
+              <a:t>31</a:t>
             </a:fld>
             <a:endParaRPr lang="en-US" dirty="0"/>
           </a:p>
@@ -20281,7 +21064,7 @@
 </p:sld>
 </file>
 
-<file path=ppt/slides/slide31.xml><?xml version="1.0" encoding="utf-8"?>
+<file path=ppt/slides/slide32.xml><?xml version="1.0" encoding="utf-8"?>
 <p:sld xmlns:a="http://schemas.openxmlformats.org/drawingml/2006/main" xmlns:r="http://schemas.openxmlformats.org/officeDocument/2006/relationships" xmlns:p="http://schemas.openxmlformats.org/presentationml/2006/main">
   <p:cSld>
     <p:spTree>
@@ -20359,7 +21142,7 @@
           <a:p>
             <a:fld id="{2183B7EE-0FBE-B749-875F-ED24F5ECD71F}" type="slidenum">
               <a:rPr lang="en-US" smtClean="0"/>
-              <a:t>31</a:t>
+              <a:t>32</a:t>
             </a:fld>
             <a:endParaRPr lang="en-US" dirty="0"/>
           </a:p>
@@ -20976,452 +21759,6 @@
 </p:sld>
 </file>
 
-<file path=ppt/slides/slide32.xml><?xml version="1.0" encoding="utf-8"?>
-<p:sld xmlns:a="http://schemas.openxmlformats.org/drawingml/2006/main" xmlns:r="http://schemas.openxmlformats.org/officeDocument/2006/relationships" xmlns:p="http://schemas.openxmlformats.org/presentationml/2006/main">
-  <p:cSld>
-    <p:spTree>
-      <p:nvGrpSpPr>
-        <p:cNvPr id="1" name=""/>
-        <p:cNvGrpSpPr/>
-        <p:nvPr/>
-      </p:nvGrpSpPr>
-      <p:grpSpPr>
-        <a:xfrm>
-          <a:off x="0" y="0"/>
-          <a:ext cx="0" cy="0"/>
-          <a:chOff x="0" y="0"/>
-          <a:chExt cx="0" cy="0"/>
-        </a:xfrm>
-      </p:grpSpPr>
-      <p:sp>
-        <p:nvSpPr>
-          <p:cNvPr id="3" name="Content Placeholder 2">
-            <a:extLst>
-              <a:ext uri="{FF2B5EF4-FFF2-40B4-BE49-F238E27FC236}">
-                <a16:creationId xmlns:a16="http://schemas.microsoft.com/office/drawing/2014/main" id="{C9044F89-E3C1-E349-B0DE-0B932821234C}"/>
-              </a:ext>
-            </a:extLst>
-          </p:cNvPr>
-          <p:cNvSpPr>
-            <a:spLocks noGrp="1"/>
-          </p:cNvSpPr>
-          <p:nvPr>
-            <p:ph idx="1"/>
-          </p:nvPr>
-        </p:nvSpPr>
-        <p:spPr>
-          <a:xfrm>
-            <a:off x="719527" y="1789043"/>
-            <a:ext cx="10785085" cy="4776650"/>
-          </a:xfrm>
-        </p:spPr>
-        <p:txBody>
-          <a:bodyPr>
-            <a:normAutofit/>
-          </a:bodyPr>
-          <a:lstStyle/>
-          <a:p>
-            <a:r>
-              <a:rPr lang="pt-BR" sz="2800" dirty="0"/>
-              <a:t>Dizemos que aplicações clientes consomem um WS quando usam o mesmo</a:t>
-            </a:r>
-          </a:p>
-          <a:p>
-            <a:r>
-              <a:rPr lang="pt-BR" sz="2800" dirty="0"/>
-              <a:t>Como um WS fornece um conjunto de métodos que podem ser acessados remotamente, é preciso conhecer quais são os métodos disponíveis</a:t>
-            </a:r>
-          </a:p>
-          <a:p>
-            <a:r>
-              <a:rPr lang="pt-BR" sz="2800" dirty="0"/>
-              <a:t>Para isso, é preciso saber qual o documento WSDL que descreve o serviço e os métodos disponibilizados</a:t>
-            </a:r>
-          </a:p>
-        </p:txBody>
-      </p:sp>
-      <p:sp>
-        <p:nvSpPr>
-          <p:cNvPr id="4" name="Slide Number Placeholder 3">
-            <a:extLst>
-              <a:ext uri="{FF2B5EF4-FFF2-40B4-BE49-F238E27FC236}">
-                <a16:creationId xmlns:a16="http://schemas.microsoft.com/office/drawing/2014/main" id="{2EA509C2-078C-DE4C-BE59-C32AF18E82D6}"/>
-              </a:ext>
-            </a:extLst>
-          </p:cNvPr>
-          <p:cNvSpPr>
-            <a:spLocks noGrp="1"/>
-          </p:cNvSpPr>
-          <p:nvPr>
-            <p:ph type="sldNum" sz="quarter" idx="12"/>
-          </p:nvPr>
-        </p:nvSpPr>
-        <p:spPr/>
-        <p:txBody>
-          <a:bodyPr/>
-          <a:lstStyle/>
-          <a:p>
-            <a:fld id="{2183B7EE-0FBE-B749-875F-ED24F5ECD71F}" type="slidenum">
-              <a:rPr lang="en-US" smtClean="0"/>
-              <a:t>32</a:t>
-            </a:fld>
-            <a:endParaRPr lang="en-US" dirty="0"/>
-          </a:p>
-        </p:txBody>
-      </p:sp>
-      <p:sp>
-        <p:nvSpPr>
-          <p:cNvPr id="7" name="Title 1">
-            <a:extLst>
-              <a:ext uri="{FF2B5EF4-FFF2-40B4-BE49-F238E27FC236}">
-                <a16:creationId xmlns:a16="http://schemas.microsoft.com/office/drawing/2014/main" id="{B7621E9A-A403-2E4F-903F-60CBC83A635F}"/>
-              </a:ext>
-            </a:extLst>
-          </p:cNvPr>
-          <p:cNvSpPr>
-            <a:spLocks noGrp="1"/>
-          </p:cNvSpPr>
-          <p:nvPr>
-            <p:ph type="title"/>
-          </p:nvPr>
-        </p:nvSpPr>
-        <p:spPr>
-          <a:xfrm>
-            <a:off x="1974575" y="624110"/>
-            <a:ext cx="9530038" cy="1164933"/>
-          </a:xfrm>
-        </p:spPr>
-        <p:txBody>
-          <a:bodyPr>
-            <a:normAutofit/>
-          </a:bodyPr>
-          <a:lstStyle/>
-          <a:p>
-            <a:pPr algn="ctr"/>
-            <a:r>
-              <a:rPr lang="pt-BR" b="1" i="1" dirty="0"/>
-              <a:t>Como consumir um WS SOAP</a:t>
-            </a:r>
-            <a:endParaRPr lang="pt-BR" dirty="0"/>
-          </a:p>
-        </p:txBody>
-      </p:sp>
-    </p:spTree>
-    <p:extLst>
-      <p:ext uri="{BB962C8B-B14F-4D97-AF65-F5344CB8AC3E}">
-        <p14:creationId xmlns:p14="http://schemas.microsoft.com/office/powerpoint/2010/main" val="332816113"/>
-      </p:ext>
-    </p:extLst>
-  </p:cSld>
-  <p:clrMapOvr>
-    <a:masterClrMapping/>
-  </p:clrMapOvr>
-  <p:timing>
-    <p:tnLst>
-      <p:par>
-        <p:cTn id="1" dur="indefinite" restart="never" nodeType="tmRoot">
-          <p:childTnLst>
-            <p:seq concurrent="1" nextAc="seek">
-              <p:cTn id="2" dur="indefinite" nodeType="mainSeq">
-                <p:childTnLst>
-                  <p:par>
-                    <p:cTn id="3" fill="hold">
-                      <p:stCondLst>
-                        <p:cond delay="indefinite"/>
-                      </p:stCondLst>
-                      <p:childTnLst>
-                        <p:par>
-                          <p:cTn id="4" fill="hold">
-                            <p:stCondLst>
-                              <p:cond delay="0"/>
-                            </p:stCondLst>
-                            <p:childTnLst>
-                              <p:par>
-                                <p:cTn id="5" presetID="9" presetClass="entr" presetSubtype="0" fill="hold" grpId="0" nodeType="clickEffect">
-                                  <p:stCondLst>
-                                    <p:cond delay="0"/>
-                                  </p:stCondLst>
-                                  <p:childTnLst>
-                                    <p:set>
-                                      <p:cBhvr>
-                                        <p:cTn id="6" dur="1" fill="hold">
-                                          <p:stCondLst>
-                                            <p:cond delay="0"/>
-                                          </p:stCondLst>
-                                        </p:cTn>
-                                        <p:tgtEl>
-                                          <p:spTgt spid="3">
-                                            <p:txEl>
-                                              <p:pRg st="0" end="0"/>
-                                            </p:txEl>
-                                          </p:spTgt>
-                                        </p:tgtEl>
-                                        <p:attrNameLst>
-                                          <p:attrName>style.visibility</p:attrName>
-                                        </p:attrNameLst>
-                                      </p:cBhvr>
-                                      <p:to>
-                                        <p:strVal val="visible"/>
-                                      </p:to>
-                                    </p:set>
-                                    <p:animEffect transition="in" filter="dissolve">
-                                      <p:cBhvr>
-                                        <p:cTn id="7" dur="500"/>
-                                        <p:tgtEl>
-                                          <p:spTgt spid="3">
-                                            <p:txEl>
-                                              <p:pRg st="0" end="0"/>
-                                            </p:txEl>
-                                          </p:spTgt>
-                                        </p:tgtEl>
-                                      </p:cBhvr>
-                                    </p:animEffect>
-                                  </p:childTnLst>
-                                </p:cTn>
-                              </p:par>
-                            </p:childTnLst>
-                          </p:cTn>
-                        </p:par>
-                      </p:childTnLst>
-                    </p:cTn>
-                  </p:par>
-                  <p:par>
-                    <p:cTn id="8" fill="hold">
-                      <p:stCondLst>
-                        <p:cond delay="indefinite"/>
-                      </p:stCondLst>
-                      <p:childTnLst>
-                        <p:par>
-                          <p:cTn id="9" fill="hold">
-                            <p:stCondLst>
-                              <p:cond delay="0"/>
-                            </p:stCondLst>
-                            <p:childTnLst>
-                              <p:par>
-                                <p:cTn id="10" presetID="9" presetClass="exit" presetSubtype="0" fill="hold" grpId="1" nodeType="clickEffect">
-                                  <p:stCondLst>
-                                    <p:cond delay="0"/>
-                                  </p:stCondLst>
-                                  <p:childTnLst>
-                                    <p:animEffect transition="out" filter="dissolve">
-                                      <p:cBhvr>
-                                        <p:cTn id="11" dur="500"/>
-                                        <p:tgtEl>
-                                          <p:spTgt spid="3">
-                                            <p:txEl>
-                                              <p:pRg st="0" end="0"/>
-                                            </p:txEl>
-                                          </p:spTgt>
-                                        </p:tgtEl>
-                                      </p:cBhvr>
-                                    </p:animEffect>
-                                    <p:set>
-                                      <p:cBhvr>
-                                        <p:cTn id="12" dur="1" fill="hold">
-                                          <p:stCondLst>
-                                            <p:cond delay="499"/>
-                                          </p:stCondLst>
-                                        </p:cTn>
-                                        <p:tgtEl>
-                                          <p:spTgt spid="3">
-                                            <p:txEl>
-                                              <p:pRg st="0" end="0"/>
-                                            </p:txEl>
-                                          </p:spTgt>
-                                        </p:tgtEl>
-                                        <p:attrNameLst>
-                                          <p:attrName>style.visibility</p:attrName>
-                                        </p:attrNameLst>
-                                      </p:cBhvr>
-                                      <p:to>
-                                        <p:strVal val="hidden"/>
-                                      </p:to>
-                                    </p:set>
-                                  </p:childTnLst>
-                                </p:cTn>
-                              </p:par>
-                              <p:par>
-                                <p:cTn id="13" presetID="9" presetClass="entr" presetSubtype="0" fill="hold" grpId="0" nodeType="withEffect">
-                                  <p:stCondLst>
-                                    <p:cond delay="0"/>
-                                  </p:stCondLst>
-                                  <p:childTnLst>
-                                    <p:set>
-                                      <p:cBhvr>
-                                        <p:cTn id="14" dur="1" fill="hold">
-                                          <p:stCondLst>
-                                            <p:cond delay="0"/>
-                                          </p:stCondLst>
-                                        </p:cTn>
-                                        <p:tgtEl>
-                                          <p:spTgt spid="3">
-                                            <p:txEl>
-                                              <p:pRg st="1" end="1"/>
-                                            </p:txEl>
-                                          </p:spTgt>
-                                        </p:tgtEl>
-                                        <p:attrNameLst>
-                                          <p:attrName>style.visibility</p:attrName>
-                                        </p:attrNameLst>
-                                      </p:cBhvr>
-                                      <p:to>
-                                        <p:strVal val="visible"/>
-                                      </p:to>
-                                    </p:set>
-                                    <p:animEffect transition="in" filter="dissolve">
-                                      <p:cBhvr>
-                                        <p:cTn id="15" dur="500"/>
-                                        <p:tgtEl>
-                                          <p:spTgt spid="3">
-                                            <p:txEl>
-                                              <p:pRg st="1" end="1"/>
-                                            </p:txEl>
-                                          </p:spTgt>
-                                        </p:tgtEl>
-                                      </p:cBhvr>
-                                    </p:animEffect>
-                                  </p:childTnLst>
-                                </p:cTn>
-                              </p:par>
-                            </p:childTnLst>
-                          </p:cTn>
-                        </p:par>
-                      </p:childTnLst>
-                    </p:cTn>
-                  </p:par>
-                  <p:par>
-                    <p:cTn id="16" fill="hold">
-                      <p:stCondLst>
-                        <p:cond delay="indefinite"/>
-                      </p:stCondLst>
-                      <p:childTnLst>
-                        <p:par>
-                          <p:cTn id="17" fill="hold">
-                            <p:stCondLst>
-                              <p:cond delay="0"/>
-                            </p:stCondLst>
-                            <p:childTnLst>
-                              <p:par>
-                                <p:cTn id="18" presetID="9" presetClass="exit" presetSubtype="0" fill="hold" grpId="1" nodeType="clickEffect">
-                                  <p:stCondLst>
-                                    <p:cond delay="0"/>
-                                  </p:stCondLst>
-                                  <p:childTnLst>
-                                    <p:animEffect transition="out" filter="dissolve">
-                                      <p:cBhvr>
-                                        <p:cTn id="19" dur="500"/>
-                                        <p:tgtEl>
-                                          <p:spTgt spid="3">
-                                            <p:txEl>
-                                              <p:pRg st="1" end="1"/>
-                                            </p:txEl>
-                                          </p:spTgt>
-                                        </p:tgtEl>
-                                      </p:cBhvr>
-                                    </p:animEffect>
-                                    <p:set>
-                                      <p:cBhvr>
-                                        <p:cTn id="20" dur="1" fill="hold">
-                                          <p:stCondLst>
-                                            <p:cond delay="499"/>
-                                          </p:stCondLst>
-                                        </p:cTn>
-                                        <p:tgtEl>
-                                          <p:spTgt spid="3">
-                                            <p:txEl>
-                                              <p:pRg st="1" end="1"/>
-                                            </p:txEl>
-                                          </p:spTgt>
-                                        </p:tgtEl>
-                                        <p:attrNameLst>
-                                          <p:attrName>style.visibility</p:attrName>
-                                        </p:attrNameLst>
-                                      </p:cBhvr>
-                                      <p:to>
-                                        <p:strVal val="hidden"/>
-                                      </p:to>
-                                    </p:set>
-                                  </p:childTnLst>
-                                </p:cTn>
-                              </p:par>
-                              <p:par>
-                                <p:cTn id="21" presetID="9" presetClass="entr" presetSubtype="0" fill="hold" grpId="0" nodeType="withEffect">
-                                  <p:stCondLst>
-                                    <p:cond delay="0"/>
-                                  </p:stCondLst>
-                                  <p:childTnLst>
-                                    <p:set>
-                                      <p:cBhvr>
-                                        <p:cTn id="22" dur="1" fill="hold">
-                                          <p:stCondLst>
-                                            <p:cond delay="0"/>
-                                          </p:stCondLst>
-                                        </p:cTn>
-                                        <p:tgtEl>
-                                          <p:spTgt spid="3">
-                                            <p:txEl>
-                                              <p:pRg st="2" end="2"/>
-                                            </p:txEl>
-                                          </p:spTgt>
-                                        </p:tgtEl>
-                                        <p:attrNameLst>
-                                          <p:attrName>style.visibility</p:attrName>
-                                        </p:attrNameLst>
-                                      </p:cBhvr>
-                                      <p:to>
-                                        <p:strVal val="visible"/>
-                                      </p:to>
-                                    </p:set>
-                                    <p:animEffect transition="in" filter="dissolve">
-                                      <p:cBhvr>
-                                        <p:cTn id="23" dur="500"/>
-                                        <p:tgtEl>
-                                          <p:spTgt spid="3">
-                                            <p:txEl>
-                                              <p:pRg st="2" end="2"/>
-                                            </p:txEl>
-                                          </p:spTgt>
-                                        </p:tgtEl>
-                                      </p:cBhvr>
-                                    </p:animEffect>
-                                  </p:childTnLst>
-                                </p:cTn>
-                              </p:par>
-                            </p:childTnLst>
-                          </p:cTn>
-                        </p:par>
-                      </p:childTnLst>
-                    </p:cTn>
-                  </p:par>
-                </p:childTnLst>
-              </p:cTn>
-              <p:prevCondLst>
-                <p:cond evt="onPrev" delay="0">
-                  <p:tgtEl>
-                    <p:sldTgt/>
-                  </p:tgtEl>
-                </p:cond>
-              </p:prevCondLst>
-              <p:nextCondLst>
-                <p:cond evt="onNext" delay="0">
-                  <p:tgtEl>
-                    <p:sldTgt/>
-                  </p:tgtEl>
-                </p:cond>
-              </p:nextCondLst>
-            </p:seq>
-          </p:childTnLst>
-        </p:cTn>
-      </p:par>
-    </p:tnLst>
-    <p:bldLst>
-      <p:bldP spid="3" grpId="0" uiExpand="1" build="p"/>
-      <p:bldP spid="3" grpId="1" uiExpand="1" build="p"/>
-    </p:bldLst>
-  </p:timing>
-</p:sld>
-</file>
-
 <file path=ppt/slides/slide33.xml><?xml version="1.0" encoding="utf-8"?>
 <p:sld xmlns:a="http://schemas.openxmlformats.org/drawingml/2006/main" xmlns:r="http://schemas.openxmlformats.org/officeDocument/2006/relationships" xmlns:p="http://schemas.openxmlformats.org/presentationml/2006/main">
   <p:cSld>
@@ -21469,39 +21806,19 @@
           <a:p>
             <a:r>
               <a:rPr lang="pt-BR" sz="2800" dirty="0"/>
-              <a:t>WSDL é a </a:t>
-            </a:r>
-            <a:r>
-              <a:rPr lang="pt-BR" sz="2800" b="1" i="1" dirty="0"/>
-              <a:t>Web Service </a:t>
-            </a:r>
-            <a:r>
-              <a:rPr lang="pt-BR" sz="2800" b="1" i="1" dirty="0" err="1"/>
-              <a:t>Description</a:t>
-            </a:r>
-            <a:r>
-              <a:rPr lang="pt-BR" sz="2800" b="1" i="1" dirty="0"/>
-              <a:t> </a:t>
-            </a:r>
-            <a:r>
-              <a:rPr lang="pt-BR" sz="2800" b="1" i="1" dirty="0" err="1"/>
-              <a:t>Language</a:t>
-            </a:r>
+              <a:t>Dizemos que aplicações clientes consomem um WS quando usam o mesmo</a:t>
+            </a:r>
+          </a:p>
+          <a:p>
             <a:r>
               <a:rPr lang="pt-BR" sz="2800" dirty="0"/>
-              <a:t>: Linguagem de Descrição de Web Service</a:t>
+              <a:t>Como um WS fornece um conjunto de métodos que podem ser acessados remotamente, é preciso conhecer quais são os métodos disponíveis</a:t>
             </a:r>
           </a:p>
           <a:p>
             <a:r>
               <a:rPr lang="pt-BR" sz="2800" dirty="0"/>
-              <a:t>Por meio da WSDL toda a definição de um WS, como métodos, parâmetros, tipos e retorno dos métodos são definidos</a:t>
-            </a:r>
-          </a:p>
-          <a:p>
-            <a:r>
-              <a:rPr lang="pt-BR" sz="2800" dirty="0"/>
-              <a:t>Tal definição é fornecida em um documento WSDL</a:t>
+              <a:t>Para isso, é preciso saber qual o documento WSDL que descreve o serviço e os métodos disponibilizados</a:t>
             </a:r>
           </a:p>
         </p:txBody>
@@ -21575,7 +21892,7 @@
     </p:spTree>
     <p:extLst>
       <p:ext uri="{BB962C8B-B14F-4D97-AF65-F5344CB8AC3E}">
-        <p14:creationId xmlns:p14="http://schemas.microsoft.com/office/powerpoint/2010/main" val="4131112282"/>
+        <p14:creationId xmlns:p14="http://schemas.microsoft.com/office/powerpoint/2010/main" val="332816113"/>
       </p:ext>
     </p:extLst>
   </p:cSld>
@@ -21929,54 +22246,46 @@
         </p:spPr>
         <p:txBody>
           <a:bodyPr>
-            <a:noAutofit/>
+            <a:normAutofit/>
           </a:bodyPr>
           <a:lstStyle/>
           <a:p>
             <a:r>
               <a:rPr lang="pt-BR" sz="2800" dirty="0"/>
-              <a:t>O documento WSDL é criado automaticamente pelo </a:t>
-            </a:r>
-            <a:r>
-              <a:rPr lang="pt-BR" sz="2800" i="1" dirty="0"/>
-              <a:t>framework</a:t>
+              <a:t>WSDL é a </a:t>
+            </a:r>
+            <a:r>
+              <a:rPr lang="pt-BR" sz="2800" b="1" i="1" dirty="0"/>
+              <a:t>Web Service </a:t>
+            </a:r>
+            <a:r>
+              <a:rPr lang="pt-BR" sz="2800" b="1" i="1" dirty="0" err="1"/>
+              <a:t>Description</a:t>
+            </a:r>
+            <a:r>
+              <a:rPr lang="pt-BR" sz="2800" b="1" i="1" dirty="0"/>
+              <a:t> </a:t>
+            </a:r>
+            <a:r>
+              <a:rPr lang="pt-BR" sz="2800" b="1" i="1" dirty="0" err="1"/>
+              <a:t>Language</a:t>
             </a:r>
             <a:r>
               <a:rPr lang="pt-BR" sz="2800" dirty="0"/>
-              <a:t> de WS que você estiver utilizando quando publicar o WS</a:t>
+              <a:t>: Linguagem de Descrição de Web Service</a:t>
             </a:r>
           </a:p>
           <a:p>
             <a:r>
               <a:rPr lang="pt-BR" sz="2800" dirty="0"/>
-              <a:t>Para obter tal documento WSDL, é preciso conhecer o URL do WS</a:t>
+              <a:t>Por meio da WSDL toda a definição de um WS, como métodos, parâmetros, tipos e retorno dos métodos são definidos</a:t>
             </a:r>
           </a:p>
           <a:p>
             <a:r>
               <a:rPr lang="pt-BR" sz="2800" dirty="0"/>
-              <a:t>O WSDL normalmente é acessado colocando-se um parâmetro </a:t>
-            </a:r>
-            <a:r>
-              <a:rPr lang="pt-BR" sz="2800" b="1" i="1" dirty="0">
-                <a:latin typeface="Courier" pitchFamily="2" charset="0"/>
-              </a:rPr>
-              <a:t>?</a:t>
-            </a:r>
-            <a:r>
-              <a:rPr lang="pt-BR" sz="2800" b="1" i="1" dirty="0" err="1">
-                <a:latin typeface="Courier" pitchFamily="2" charset="0"/>
-              </a:rPr>
-              <a:t>wsdl</a:t>
-            </a:r>
-            <a:r>
-              <a:rPr lang="pt-BR" sz="2800" dirty="0"/>
-              <a:t> no final do URL</a:t>
-            </a:r>
-            <a:endParaRPr lang="en-US" sz="2800" dirty="0"/>
-          </a:p>
-          <a:p>
-            <a:endParaRPr lang="pt-BR" sz="2800" dirty="0"/>
+              <a:t>Tal definição é fornecida em um documento WSDL</a:t>
+            </a:r>
           </a:p>
         </p:txBody>
       </p:sp>
@@ -22040,15 +22349,7 @@
             <a:pPr algn="ctr"/>
             <a:r>
               <a:rPr lang="pt-BR" b="1" i="1" dirty="0"/>
-              <a:t>Como consumir um </a:t>
-            </a:r>
-            <a:r>
-              <a:rPr lang="pt-BR" b="1" i="1" dirty="0" err="1"/>
-              <a:t>wS</a:t>
-            </a:r>
-            <a:r>
-              <a:rPr lang="pt-BR" b="1" i="1" dirty="0"/>
-              <a:t> SOAP</a:t>
+              <a:t>Como consumir um WS SOAP</a:t>
             </a:r>
             <a:endParaRPr lang="pt-BR" dirty="0"/>
           </a:p>
@@ -22057,7 +22358,7 @@
     </p:spTree>
     <p:extLst>
       <p:ext uri="{BB962C8B-B14F-4D97-AF65-F5344CB8AC3E}">
-        <p14:creationId xmlns:p14="http://schemas.microsoft.com/office/powerpoint/2010/main" val="3205919659"/>
+        <p14:creationId xmlns:p14="http://schemas.microsoft.com/office/powerpoint/2010/main" val="4131112282"/>
       </p:ext>
     </p:extLst>
   </p:cSld>
@@ -22416,44 +22717,45 @@
           <a:lstStyle/>
           <a:p>
             <a:r>
-              <a:rPr lang="en-US" sz="3000" dirty="0">
-                <a:hlinkClick r:id="rId2"/>
+              <a:rPr lang="pt-BR" sz="2800" dirty="0"/>
+              <a:t>O documento WSDL é criado automaticamente pelo </a:t>
+            </a:r>
+            <a:r>
+              <a:rPr lang="pt-BR" sz="2800" i="1" dirty="0"/>
+              <a:t>framework</a:t>
+            </a:r>
+            <a:r>
+              <a:rPr lang="pt-BR" sz="2800" dirty="0"/>
+              <a:t> de WS que você estiver utilizando quando publicar o WS</a:t>
+            </a:r>
+          </a:p>
+          <a:p>
+            <a:r>
+              <a:rPr lang="pt-BR" sz="2800" dirty="0"/>
+              <a:t>Para obter tal documento WSDL, é preciso conhecer o URL do WS</a:t>
+            </a:r>
+          </a:p>
+          <a:p>
+            <a:r>
+              <a:rPr lang="pt-BR" sz="2800" dirty="0"/>
+              <a:t>O WSDL normalmente é acessado colocando-se um parâmetro </a:t>
+            </a:r>
+            <a:r>
+              <a:rPr lang="pt-BR" sz="2800" b="1" i="1" dirty="0">
+                <a:latin typeface="Courier" pitchFamily="2" charset="0"/>
               </a:rPr>
-              <a:t>http://localhost:8080/LojaVirtual/Produtos</a:t>
-            </a:r>
-            <a:r>
-              <a:rPr lang="en-US" sz="3000" b="1" dirty="0">
-                <a:hlinkClick r:id="rId2"/>
+              <a:t>?</a:t>
+            </a:r>
+            <a:r>
+              <a:rPr lang="pt-BR" sz="2800" b="1" i="1" dirty="0" err="1">
+                <a:latin typeface="Courier" pitchFamily="2" charset="0"/>
               </a:rPr>
-              <a:t>?wsdl</a:t>
-            </a:r>
-            <a:r>
-              <a:rPr lang="en-US" sz="3000" dirty="0"/>
-              <a:t> </a:t>
-            </a:r>
-          </a:p>
-          <a:p>
-            <a:r>
-              <a:rPr lang="en-US" sz="3000" dirty="0">
-                <a:hlinkClick r:id="rId3"/>
-              </a:rPr>
-              <a:t>https://apps.correios.com.br/SigepMasterJPA/AtendeClienteService/AtendeCliente</a:t>
-            </a:r>
-            <a:r>
-              <a:rPr lang="en-US" sz="3000" b="1" dirty="0">
-                <a:hlinkClick r:id="rId3"/>
-              </a:rPr>
-              <a:t>?wsdl</a:t>
-            </a:r>
-            <a:r>
-              <a:rPr lang="en-US" sz="3000" dirty="0"/>
-              <a:t> </a:t>
-            </a:r>
-          </a:p>
-          <a:p>
-            <a:pPr marL="0" indent="0">
-              <a:buNone/>
-            </a:pPr>
+              <a:t>wsdl</a:t>
+            </a:r>
+            <a:r>
+              <a:rPr lang="pt-BR" sz="2800" dirty="0"/>
+              <a:t> no final do URL</a:t>
+            </a:r>
             <a:endParaRPr lang="en-US" sz="2800" dirty="0"/>
           </a:p>
           <a:p>
@@ -22485,6 +22787,490 @@
             <a:fld id="{2183B7EE-0FBE-B749-875F-ED24F5ECD71F}" type="slidenum">
               <a:rPr lang="en-US" smtClean="0"/>
               <a:t>35</a:t>
+            </a:fld>
+            <a:endParaRPr lang="en-US" dirty="0"/>
+          </a:p>
+        </p:txBody>
+      </p:sp>
+      <p:sp>
+        <p:nvSpPr>
+          <p:cNvPr id="7" name="Title 1">
+            <a:extLst>
+              <a:ext uri="{FF2B5EF4-FFF2-40B4-BE49-F238E27FC236}">
+                <a16:creationId xmlns:a16="http://schemas.microsoft.com/office/drawing/2014/main" id="{B7621E9A-A403-2E4F-903F-60CBC83A635F}"/>
+              </a:ext>
+            </a:extLst>
+          </p:cNvPr>
+          <p:cNvSpPr>
+            <a:spLocks noGrp="1"/>
+          </p:cNvSpPr>
+          <p:nvPr>
+            <p:ph type="title"/>
+          </p:nvPr>
+        </p:nvSpPr>
+        <p:spPr>
+          <a:xfrm>
+            <a:off x="1974575" y="624110"/>
+            <a:ext cx="9530038" cy="1164933"/>
+          </a:xfrm>
+        </p:spPr>
+        <p:txBody>
+          <a:bodyPr>
+            <a:normAutofit/>
+          </a:bodyPr>
+          <a:lstStyle/>
+          <a:p>
+            <a:pPr algn="ctr"/>
+            <a:r>
+              <a:rPr lang="pt-BR" b="1" i="1" dirty="0"/>
+              <a:t>Como consumir um </a:t>
+            </a:r>
+            <a:r>
+              <a:rPr lang="pt-BR" b="1" i="1" dirty="0" err="1"/>
+              <a:t>wS</a:t>
+            </a:r>
+            <a:r>
+              <a:rPr lang="pt-BR" b="1" i="1" dirty="0"/>
+              <a:t> SOAP</a:t>
+            </a:r>
+            <a:endParaRPr lang="pt-BR" dirty="0"/>
+          </a:p>
+        </p:txBody>
+      </p:sp>
+    </p:spTree>
+    <p:extLst>
+      <p:ext uri="{BB962C8B-B14F-4D97-AF65-F5344CB8AC3E}">
+        <p14:creationId xmlns:p14="http://schemas.microsoft.com/office/powerpoint/2010/main" val="3205919659"/>
+      </p:ext>
+    </p:extLst>
+  </p:cSld>
+  <p:clrMapOvr>
+    <a:masterClrMapping/>
+  </p:clrMapOvr>
+  <p:timing>
+    <p:tnLst>
+      <p:par>
+        <p:cTn id="1" dur="indefinite" restart="never" nodeType="tmRoot">
+          <p:childTnLst>
+            <p:seq concurrent="1" nextAc="seek">
+              <p:cTn id="2" dur="indefinite" nodeType="mainSeq">
+                <p:childTnLst>
+                  <p:par>
+                    <p:cTn id="3" fill="hold">
+                      <p:stCondLst>
+                        <p:cond delay="indefinite"/>
+                      </p:stCondLst>
+                      <p:childTnLst>
+                        <p:par>
+                          <p:cTn id="4" fill="hold">
+                            <p:stCondLst>
+                              <p:cond delay="0"/>
+                            </p:stCondLst>
+                            <p:childTnLst>
+                              <p:par>
+                                <p:cTn id="5" presetID="9" presetClass="entr" presetSubtype="0" fill="hold" grpId="0" nodeType="clickEffect">
+                                  <p:stCondLst>
+                                    <p:cond delay="0"/>
+                                  </p:stCondLst>
+                                  <p:childTnLst>
+                                    <p:set>
+                                      <p:cBhvr>
+                                        <p:cTn id="6" dur="1" fill="hold">
+                                          <p:stCondLst>
+                                            <p:cond delay="0"/>
+                                          </p:stCondLst>
+                                        </p:cTn>
+                                        <p:tgtEl>
+                                          <p:spTgt spid="3">
+                                            <p:txEl>
+                                              <p:pRg st="0" end="0"/>
+                                            </p:txEl>
+                                          </p:spTgt>
+                                        </p:tgtEl>
+                                        <p:attrNameLst>
+                                          <p:attrName>style.visibility</p:attrName>
+                                        </p:attrNameLst>
+                                      </p:cBhvr>
+                                      <p:to>
+                                        <p:strVal val="visible"/>
+                                      </p:to>
+                                    </p:set>
+                                    <p:animEffect transition="in" filter="dissolve">
+                                      <p:cBhvr>
+                                        <p:cTn id="7" dur="500"/>
+                                        <p:tgtEl>
+                                          <p:spTgt spid="3">
+                                            <p:txEl>
+                                              <p:pRg st="0" end="0"/>
+                                            </p:txEl>
+                                          </p:spTgt>
+                                        </p:tgtEl>
+                                      </p:cBhvr>
+                                    </p:animEffect>
+                                  </p:childTnLst>
+                                </p:cTn>
+                              </p:par>
+                            </p:childTnLst>
+                          </p:cTn>
+                        </p:par>
+                      </p:childTnLst>
+                    </p:cTn>
+                  </p:par>
+                  <p:par>
+                    <p:cTn id="8" fill="hold">
+                      <p:stCondLst>
+                        <p:cond delay="indefinite"/>
+                      </p:stCondLst>
+                      <p:childTnLst>
+                        <p:par>
+                          <p:cTn id="9" fill="hold">
+                            <p:stCondLst>
+                              <p:cond delay="0"/>
+                            </p:stCondLst>
+                            <p:childTnLst>
+                              <p:par>
+                                <p:cTn id="10" presetID="9" presetClass="exit" presetSubtype="0" fill="hold" grpId="1" nodeType="clickEffect">
+                                  <p:stCondLst>
+                                    <p:cond delay="0"/>
+                                  </p:stCondLst>
+                                  <p:childTnLst>
+                                    <p:animEffect transition="out" filter="dissolve">
+                                      <p:cBhvr>
+                                        <p:cTn id="11" dur="500"/>
+                                        <p:tgtEl>
+                                          <p:spTgt spid="3">
+                                            <p:txEl>
+                                              <p:pRg st="0" end="0"/>
+                                            </p:txEl>
+                                          </p:spTgt>
+                                        </p:tgtEl>
+                                      </p:cBhvr>
+                                    </p:animEffect>
+                                    <p:set>
+                                      <p:cBhvr>
+                                        <p:cTn id="12" dur="1" fill="hold">
+                                          <p:stCondLst>
+                                            <p:cond delay="499"/>
+                                          </p:stCondLst>
+                                        </p:cTn>
+                                        <p:tgtEl>
+                                          <p:spTgt spid="3">
+                                            <p:txEl>
+                                              <p:pRg st="0" end="0"/>
+                                            </p:txEl>
+                                          </p:spTgt>
+                                        </p:tgtEl>
+                                        <p:attrNameLst>
+                                          <p:attrName>style.visibility</p:attrName>
+                                        </p:attrNameLst>
+                                      </p:cBhvr>
+                                      <p:to>
+                                        <p:strVal val="hidden"/>
+                                      </p:to>
+                                    </p:set>
+                                  </p:childTnLst>
+                                </p:cTn>
+                              </p:par>
+                              <p:par>
+                                <p:cTn id="13" presetID="9" presetClass="entr" presetSubtype="0" fill="hold" grpId="0" nodeType="withEffect">
+                                  <p:stCondLst>
+                                    <p:cond delay="0"/>
+                                  </p:stCondLst>
+                                  <p:childTnLst>
+                                    <p:set>
+                                      <p:cBhvr>
+                                        <p:cTn id="14" dur="1" fill="hold">
+                                          <p:stCondLst>
+                                            <p:cond delay="0"/>
+                                          </p:stCondLst>
+                                        </p:cTn>
+                                        <p:tgtEl>
+                                          <p:spTgt spid="3">
+                                            <p:txEl>
+                                              <p:pRg st="1" end="1"/>
+                                            </p:txEl>
+                                          </p:spTgt>
+                                        </p:tgtEl>
+                                        <p:attrNameLst>
+                                          <p:attrName>style.visibility</p:attrName>
+                                        </p:attrNameLst>
+                                      </p:cBhvr>
+                                      <p:to>
+                                        <p:strVal val="visible"/>
+                                      </p:to>
+                                    </p:set>
+                                    <p:animEffect transition="in" filter="dissolve">
+                                      <p:cBhvr>
+                                        <p:cTn id="15" dur="500"/>
+                                        <p:tgtEl>
+                                          <p:spTgt spid="3">
+                                            <p:txEl>
+                                              <p:pRg st="1" end="1"/>
+                                            </p:txEl>
+                                          </p:spTgt>
+                                        </p:tgtEl>
+                                      </p:cBhvr>
+                                    </p:animEffect>
+                                  </p:childTnLst>
+                                </p:cTn>
+                              </p:par>
+                            </p:childTnLst>
+                          </p:cTn>
+                        </p:par>
+                      </p:childTnLst>
+                    </p:cTn>
+                  </p:par>
+                  <p:par>
+                    <p:cTn id="16" fill="hold">
+                      <p:stCondLst>
+                        <p:cond delay="indefinite"/>
+                      </p:stCondLst>
+                      <p:childTnLst>
+                        <p:par>
+                          <p:cTn id="17" fill="hold">
+                            <p:stCondLst>
+                              <p:cond delay="0"/>
+                            </p:stCondLst>
+                            <p:childTnLst>
+                              <p:par>
+                                <p:cTn id="18" presetID="9" presetClass="exit" presetSubtype="0" fill="hold" grpId="1" nodeType="clickEffect">
+                                  <p:stCondLst>
+                                    <p:cond delay="0"/>
+                                  </p:stCondLst>
+                                  <p:childTnLst>
+                                    <p:animEffect transition="out" filter="dissolve">
+                                      <p:cBhvr>
+                                        <p:cTn id="19" dur="500"/>
+                                        <p:tgtEl>
+                                          <p:spTgt spid="3">
+                                            <p:txEl>
+                                              <p:pRg st="1" end="1"/>
+                                            </p:txEl>
+                                          </p:spTgt>
+                                        </p:tgtEl>
+                                      </p:cBhvr>
+                                    </p:animEffect>
+                                    <p:set>
+                                      <p:cBhvr>
+                                        <p:cTn id="20" dur="1" fill="hold">
+                                          <p:stCondLst>
+                                            <p:cond delay="499"/>
+                                          </p:stCondLst>
+                                        </p:cTn>
+                                        <p:tgtEl>
+                                          <p:spTgt spid="3">
+                                            <p:txEl>
+                                              <p:pRg st="1" end="1"/>
+                                            </p:txEl>
+                                          </p:spTgt>
+                                        </p:tgtEl>
+                                        <p:attrNameLst>
+                                          <p:attrName>style.visibility</p:attrName>
+                                        </p:attrNameLst>
+                                      </p:cBhvr>
+                                      <p:to>
+                                        <p:strVal val="hidden"/>
+                                      </p:to>
+                                    </p:set>
+                                  </p:childTnLst>
+                                </p:cTn>
+                              </p:par>
+                              <p:par>
+                                <p:cTn id="21" presetID="9" presetClass="entr" presetSubtype="0" fill="hold" grpId="0" nodeType="withEffect">
+                                  <p:stCondLst>
+                                    <p:cond delay="0"/>
+                                  </p:stCondLst>
+                                  <p:childTnLst>
+                                    <p:set>
+                                      <p:cBhvr>
+                                        <p:cTn id="22" dur="1" fill="hold">
+                                          <p:stCondLst>
+                                            <p:cond delay="0"/>
+                                          </p:stCondLst>
+                                        </p:cTn>
+                                        <p:tgtEl>
+                                          <p:spTgt spid="3">
+                                            <p:txEl>
+                                              <p:pRg st="2" end="2"/>
+                                            </p:txEl>
+                                          </p:spTgt>
+                                        </p:tgtEl>
+                                        <p:attrNameLst>
+                                          <p:attrName>style.visibility</p:attrName>
+                                        </p:attrNameLst>
+                                      </p:cBhvr>
+                                      <p:to>
+                                        <p:strVal val="visible"/>
+                                      </p:to>
+                                    </p:set>
+                                    <p:animEffect transition="in" filter="dissolve">
+                                      <p:cBhvr>
+                                        <p:cTn id="23" dur="500"/>
+                                        <p:tgtEl>
+                                          <p:spTgt spid="3">
+                                            <p:txEl>
+                                              <p:pRg st="2" end="2"/>
+                                            </p:txEl>
+                                          </p:spTgt>
+                                        </p:tgtEl>
+                                      </p:cBhvr>
+                                    </p:animEffect>
+                                  </p:childTnLst>
+                                </p:cTn>
+                              </p:par>
+                            </p:childTnLst>
+                          </p:cTn>
+                        </p:par>
+                      </p:childTnLst>
+                    </p:cTn>
+                  </p:par>
+                </p:childTnLst>
+              </p:cTn>
+              <p:prevCondLst>
+                <p:cond evt="onPrev" delay="0">
+                  <p:tgtEl>
+                    <p:sldTgt/>
+                  </p:tgtEl>
+                </p:cond>
+              </p:prevCondLst>
+              <p:nextCondLst>
+                <p:cond evt="onNext" delay="0">
+                  <p:tgtEl>
+                    <p:sldTgt/>
+                  </p:tgtEl>
+                </p:cond>
+              </p:nextCondLst>
+            </p:seq>
+          </p:childTnLst>
+        </p:cTn>
+      </p:par>
+    </p:tnLst>
+    <p:bldLst>
+      <p:bldP spid="3" grpId="0" uiExpand="1" build="p"/>
+      <p:bldP spid="3" grpId="1" uiExpand="1" build="p"/>
+    </p:bldLst>
+  </p:timing>
+</p:sld>
+</file>
+
+<file path=ppt/slides/slide36.xml><?xml version="1.0" encoding="utf-8"?>
+<p:sld xmlns:a="http://schemas.openxmlformats.org/drawingml/2006/main" xmlns:r="http://schemas.openxmlformats.org/officeDocument/2006/relationships" xmlns:p="http://schemas.openxmlformats.org/presentationml/2006/main">
+  <p:cSld>
+    <p:spTree>
+      <p:nvGrpSpPr>
+        <p:cNvPr id="1" name=""/>
+        <p:cNvGrpSpPr/>
+        <p:nvPr/>
+      </p:nvGrpSpPr>
+      <p:grpSpPr>
+        <a:xfrm>
+          <a:off x="0" y="0"/>
+          <a:ext cx="0" cy="0"/>
+          <a:chOff x="0" y="0"/>
+          <a:chExt cx="0" cy="0"/>
+        </a:xfrm>
+      </p:grpSpPr>
+      <p:sp>
+        <p:nvSpPr>
+          <p:cNvPr id="3" name="Content Placeholder 2">
+            <a:extLst>
+              <a:ext uri="{FF2B5EF4-FFF2-40B4-BE49-F238E27FC236}">
+                <a16:creationId xmlns:a16="http://schemas.microsoft.com/office/drawing/2014/main" id="{C9044F89-E3C1-E349-B0DE-0B932821234C}"/>
+              </a:ext>
+            </a:extLst>
+          </p:cNvPr>
+          <p:cNvSpPr>
+            <a:spLocks noGrp="1"/>
+          </p:cNvSpPr>
+          <p:nvPr>
+            <p:ph idx="1"/>
+          </p:nvPr>
+        </p:nvSpPr>
+        <p:spPr>
+          <a:xfrm>
+            <a:off x="719527" y="2875721"/>
+            <a:ext cx="10785085" cy="3689971"/>
+          </a:xfrm>
+        </p:spPr>
+        <p:txBody>
+          <a:bodyPr>
+            <a:noAutofit/>
+          </a:bodyPr>
+          <a:lstStyle/>
+          <a:p>
+            <a:pPr marL="0" indent="0" algn="ctr">
+              <a:buNone/>
+            </a:pPr>
+            <a:r>
+              <a:rPr lang="en-US" sz="3000" dirty="0">
+                <a:hlinkClick r:id="rId2"/>
+              </a:rPr>
+              <a:t>http://localhost:8080/LojaVirtual/Produtos</a:t>
+            </a:r>
+            <a:r>
+              <a:rPr lang="en-US" sz="3000" b="1" dirty="0">
+                <a:hlinkClick r:id="rId2"/>
+              </a:rPr>
+              <a:t>?wsdl</a:t>
+            </a:r>
+            <a:r>
+              <a:rPr lang="en-US" sz="3000" dirty="0"/>
+              <a:t> </a:t>
+            </a:r>
+          </a:p>
+          <a:p>
+            <a:pPr marL="0" indent="0" algn="ctr">
+              <a:buNone/>
+            </a:pPr>
+            <a:endParaRPr lang="en-US" sz="3000" dirty="0"/>
+          </a:p>
+          <a:p>
+            <a:pPr marL="0" indent="0" algn="ctr">
+              <a:buNone/>
+            </a:pPr>
+            <a:r>
+              <a:rPr lang="en-US" sz="3000" dirty="0">
+                <a:hlinkClick r:id="rId3"/>
+              </a:rPr>
+              <a:t>https://apps.correios.com.br/SigepMasterJPA/AtendeClienteService/AtendeCliente</a:t>
+            </a:r>
+            <a:r>
+              <a:rPr lang="en-US" sz="3000" b="1" dirty="0">
+                <a:hlinkClick r:id="rId3"/>
+              </a:rPr>
+              <a:t>?wsdl</a:t>
+            </a:r>
+            <a:r>
+              <a:rPr lang="en-US" sz="3000" dirty="0"/>
+              <a:t> </a:t>
+            </a:r>
+          </a:p>
+        </p:txBody>
+      </p:sp>
+      <p:sp>
+        <p:nvSpPr>
+          <p:cNvPr id="4" name="Slide Number Placeholder 3">
+            <a:extLst>
+              <a:ext uri="{FF2B5EF4-FFF2-40B4-BE49-F238E27FC236}">
+                <a16:creationId xmlns:a16="http://schemas.microsoft.com/office/drawing/2014/main" id="{2EA509C2-078C-DE4C-BE59-C32AF18E82D6}"/>
+              </a:ext>
+            </a:extLst>
+          </p:cNvPr>
+          <p:cNvSpPr>
+            <a:spLocks noGrp="1"/>
+          </p:cNvSpPr>
+          <p:nvPr>
+            <p:ph type="sldNum" sz="quarter" idx="12"/>
+          </p:nvPr>
+        </p:nvSpPr>
+        <p:spPr/>
+        <p:txBody>
+          <a:bodyPr/>
+          <a:lstStyle/>
+          <a:p>
+            <a:fld id="{2183B7EE-0FBE-B749-875F-ED24F5ECD71F}" type="slidenum">
+              <a:rPr lang="en-US" smtClean="0"/>
+              <a:t>36</a:t>
             </a:fld>
             <a:endParaRPr lang="en-US" dirty="0"/>
           </a:p>
@@ -22646,7 +23432,7 @@
                                         <p:tgtEl>
                                           <p:spTgt spid="3">
                                             <p:txEl>
-                                              <p:pRg st="1" end="1"/>
+                                              <p:pRg st="2" end="2"/>
                                             </p:txEl>
                                           </p:spTgt>
                                         </p:tgtEl>
@@ -22664,7 +23450,7 @@
                                         <p:tgtEl>
                                           <p:spTgt spid="3">
                                             <p:txEl>
-                                              <p:pRg st="1" end="1"/>
+                                              <p:pRg st="2" end="2"/>
                                             </p:txEl>
                                           </p:spTgt>
                                         </p:tgtEl>
@@ -22707,7 +23493,7 @@
 </p:sld>
 </file>
 
-<file path=ppt/slides/slide36.xml><?xml version="1.0" encoding="utf-8"?>
+<file path=ppt/slides/slide37.xml><?xml version="1.0" encoding="utf-8"?>
 <p:sld xmlns:a="http://schemas.openxmlformats.org/drawingml/2006/main" xmlns:r="http://schemas.openxmlformats.org/officeDocument/2006/relationships" xmlns:p="http://schemas.openxmlformats.org/presentationml/2006/main">
   <p:cSld>
     <p:spTree>
@@ -23203,7 +23989,7 @@
 </p:sld>
 </file>
 
-<file path=ppt/slides/slide37.xml><?xml version="1.0" encoding="utf-8"?>
+<file path=ppt/slides/slide38.xml><?xml version="1.0" encoding="utf-8"?>
 <p:sld xmlns:a="http://schemas.openxmlformats.org/drawingml/2006/main" xmlns:r="http://schemas.openxmlformats.org/officeDocument/2006/relationships" xmlns:p="http://schemas.openxmlformats.org/presentationml/2006/main">
   <p:cSld>
     <p:spTree>
@@ -24636,29 +25422,29 @@
         <p:spPr>
           <a:xfrm>
             <a:off x="691806" y="1840977"/>
-            <a:ext cx="11182142" cy="2382620"/>
+            <a:ext cx="7334590" cy="4639336"/>
           </a:xfrm>
         </p:spPr>
         <p:txBody>
           <a:bodyPr>
-            <a:normAutofit/>
+            <a:noAutofit/>
           </a:bodyPr>
           <a:lstStyle/>
           <a:p>
             <a:r>
-              <a:rPr lang="pt-BR" sz="2400" dirty="0"/>
+              <a:rPr lang="pt-BR" sz="2800" dirty="0"/>
               <a:t>Em sistemas distribuídas existe troca de mensagens entre as aplicações</a:t>
             </a:r>
           </a:p>
           <a:p>
             <a:r>
-              <a:rPr lang="pt-BR" sz="2400" dirty="0"/>
+              <a:rPr lang="pt-BR" sz="2800" dirty="0"/>
               <a:t>Assim, a execução do código nem sempre é sequencial: determinadas funções podem ser executadas de forma assíncrona</a:t>
             </a:r>
           </a:p>
           <a:p>
             <a:r>
-              <a:rPr lang="pt-BR" sz="2400" dirty="0"/>
+              <a:rPr lang="pt-BR" sz="2800" dirty="0"/>
               <a:t>Assíncrona indica que tais funções são chamadas apenas quando um determinado evento ocorrer (como o recebimento de uma mensagem)</a:t>
             </a:r>
           </a:p>
@@ -25593,13 +26379,13 @@
           <a:lstStyle/>
           <a:p>
             <a:r>
-              <a:rPr lang="pt-BR" sz="2400" dirty="0"/>
+              <a:rPr lang="pt-BR" sz="2800" dirty="0"/>
               <a:t>O programador precisa incluir código para realizar conexão, tratar falhas de comunicação, enviar mensagens pela rede, aguardar resposta, etc.</a:t>
             </a:r>
           </a:p>
           <a:p>
             <a:r>
-              <a:rPr lang="pt-BR" sz="2400" dirty="0"/>
+              <a:rPr lang="pt-BR" sz="2800" dirty="0"/>
               <a:t>Não existe este tipo de preocupação em uma aplicação convencional</a:t>
             </a:r>
           </a:p>
@@ -26954,8 +27740,8 @@
         </p:nvSpPr>
         <p:spPr>
           <a:xfrm>
-            <a:off x="424070" y="1447859"/>
-            <a:ext cx="11080542" cy="5148409"/>
+            <a:off x="424070" y="1686398"/>
+            <a:ext cx="11080542" cy="4727654"/>
           </a:xfrm>
         </p:spPr>
         <p:txBody>

</xml_diff>